<commit_message>
Updated README with links, adding PDF containing all exercises
</commit_message>
<xml_diff>
--- a/Intermediate Git and GitHub.pptx
+++ b/Intermediate Git and GitHub.pptx
@@ -5,39 +5,40 @@
     <p:sldMasterId id="2147483648" r:id="rId1"/>
   </p:sldMasterIdLst>
   <p:notesMasterIdLst>
-    <p:notesMasterId r:id="rId26"/>
+    <p:notesMasterId r:id="rId27"/>
   </p:notesMasterIdLst>
   <p:handoutMasterIdLst>
-    <p:handoutMasterId r:id="rId27"/>
+    <p:handoutMasterId r:id="rId28"/>
   </p:handoutMasterIdLst>
   <p:sldIdLst>
     <p:sldId id="256" r:id="rId2"/>
-    <p:sldId id="261" r:id="rId3"/>
-    <p:sldId id="257" r:id="rId4"/>
-    <p:sldId id="262" r:id="rId5"/>
-    <p:sldId id="263" r:id="rId6"/>
-    <p:sldId id="264" r:id="rId7"/>
-    <p:sldId id="265" r:id="rId8"/>
-    <p:sldId id="266" r:id="rId9"/>
-    <p:sldId id="267" r:id="rId10"/>
-    <p:sldId id="268" r:id="rId11"/>
-    <p:sldId id="269" r:id="rId12"/>
-    <p:sldId id="270" r:id="rId13"/>
-    <p:sldId id="271" r:id="rId14"/>
-    <p:sldId id="272" r:id="rId15"/>
-    <p:sldId id="273" r:id="rId16"/>
-    <p:sldId id="274" r:id="rId17"/>
-    <p:sldId id="275" r:id="rId18"/>
-    <p:sldId id="276" r:id="rId19"/>
-    <p:sldId id="277" r:id="rId20"/>
-    <p:sldId id="278" r:id="rId21"/>
-    <p:sldId id="279" r:id="rId22"/>
-    <p:sldId id="280" r:id="rId23"/>
-    <p:sldId id="281" r:id="rId24"/>
-    <p:sldId id="282" r:id="rId25"/>
+    <p:sldId id="283" r:id="rId3"/>
+    <p:sldId id="261" r:id="rId4"/>
+    <p:sldId id="257" r:id="rId5"/>
+    <p:sldId id="262" r:id="rId6"/>
+    <p:sldId id="263" r:id="rId7"/>
+    <p:sldId id="264" r:id="rId8"/>
+    <p:sldId id="265" r:id="rId9"/>
+    <p:sldId id="266" r:id="rId10"/>
+    <p:sldId id="267" r:id="rId11"/>
+    <p:sldId id="268" r:id="rId12"/>
+    <p:sldId id="269" r:id="rId13"/>
+    <p:sldId id="270" r:id="rId14"/>
+    <p:sldId id="271" r:id="rId15"/>
+    <p:sldId id="272" r:id="rId16"/>
+    <p:sldId id="273" r:id="rId17"/>
+    <p:sldId id="274" r:id="rId18"/>
+    <p:sldId id="275" r:id="rId19"/>
+    <p:sldId id="276" r:id="rId20"/>
+    <p:sldId id="277" r:id="rId21"/>
+    <p:sldId id="278" r:id="rId22"/>
+    <p:sldId id="279" r:id="rId23"/>
+    <p:sldId id="280" r:id="rId24"/>
+    <p:sldId id="281" r:id="rId25"/>
+    <p:sldId id="282" r:id="rId26"/>
   </p:sldIdLst>
   <p:sldSz cx="9144000" cy="6858000" type="screen4x3"/>
-  <p:notesSz cx="6858000" cy="9144000"/>
+  <p:notesSz cx="7315200" cy="9601200"/>
   <p:defaultTextStyle>
     <a:defPPr>
       <a:defRPr lang="en-US"/>
@@ -187,17 +188,17 @@
         <p:spPr>
           <a:xfrm>
             <a:off x="0" y="0"/>
-            <a:ext cx="2971800" cy="457200"/>
+            <a:ext cx="3169920" cy="480060"/>
           </a:xfrm>
           <a:prstGeom prst="rect">
             <a:avLst/>
           </a:prstGeom>
         </p:spPr>
         <p:txBody>
-          <a:bodyPr vert="horz" lIns="91440" tIns="45720" rIns="91440" bIns="45720" rtlCol="0"/>
+          <a:bodyPr vert="horz" lIns="96661" tIns="48331" rIns="96661" bIns="48331" rtlCol="0"/>
           <a:lstStyle>
             <a:lvl1pPr algn="l">
-              <a:defRPr sz="1200"/>
+              <a:defRPr sz="1300"/>
             </a:lvl1pPr>
           </a:lstStyle>
           <a:p>
@@ -217,18 +218,18 @@
         </p:nvSpPr>
         <p:spPr>
           <a:xfrm>
-            <a:off x="3884613" y="0"/>
-            <a:ext cx="2971800" cy="457200"/>
+            <a:off x="4143587" y="0"/>
+            <a:ext cx="3169920" cy="480060"/>
           </a:xfrm>
           <a:prstGeom prst="rect">
             <a:avLst/>
           </a:prstGeom>
         </p:spPr>
         <p:txBody>
-          <a:bodyPr vert="horz" lIns="91440" tIns="45720" rIns="91440" bIns="45720" rtlCol="0"/>
+          <a:bodyPr vert="horz" lIns="96661" tIns="48331" rIns="96661" bIns="48331" rtlCol="0"/>
           <a:lstStyle>
             <a:lvl1pPr algn="r">
-              <a:defRPr sz="1200"/>
+              <a:defRPr sz="1300"/>
             </a:lvl1pPr>
           </a:lstStyle>
           <a:p>
@@ -252,18 +253,18 @@
         </p:nvSpPr>
         <p:spPr>
           <a:xfrm>
-            <a:off x="0" y="8685213"/>
-            <a:ext cx="2971800" cy="457200"/>
+            <a:off x="0" y="9119474"/>
+            <a:ext cx="3169920" cy="480060"/>
           </a:xfrm>
           <a:prstGeom prst="rect">
             <a:avLst/>
           </a:prstGeom>
         </p:spPr>
         <p:txBody>
-          <a:bodyPr vert="horz" lIns="91440" tIns="45720" rIns="91440" bIns="45720" rtlCol="0" anchor="b"/>
+          <a:bodyPr vert="horz" lIns="96661" tIns="48331" rIns="96661" bIns="48331" rtlCol="0" anchor="b"/>
           <a:lstStyle>
             <a:lvl1pPr algn="l">
-              <a:defRPr sz="1200"/>
+              <a:defRPr sz="1300"/>
             </a:lvl1pPr>
           </a:lstStyle>
           <a:p>
@@ -283,18 +284,18 @@
         </p:nvSpPr>
         <p:spPr>
           <a:xfrm>
-            <a:off x="3884613" y="8685213"/>
-            <a:ext cx="2971800" cy="457200"/>
+            <a:off x="4143587" y="9119474"/>
+            <a:ext cx="3169920" cy="480060"/>
           </a:xfrm>
           <a:prstGeom prst="rect">
             <a:avLst/>
           </a:prstGeom>
         </p:spPr>
         <p:txBody>
-          <a:bodyPr vert="horz" lIns="91440" tIns="45720" rIns="91440" bIns="45720" rtlCol="0" anchor="b"/>
+          <a:bodyPr vert="horz" lIns="96661" tIns="48331" rIns="96661" bIns="48331" rtlCol="0" anchor="b"/>
           <a:lstStyle>
             <a:lvl1pPr algn="r">
-              <a:defRPr sz="1200"/>
+              <a:defRPr sz="1300"/>
             </a:lvl1pPr>
           </a:lstStyle>
           <a:p>
@@ -353,17 +354,17 @@
         <p:spPr>
           <a:xfrm>
             <a:off x="0" y="0"/>
-            <a:ext cx="2971800" cy="457200"/>
+            <a:ext cx="3169920" cy="480060"/>
           </a:xfrm>
           <a:prstGeom prst="rect">
             <a:avLst/>
           </a:prstGeom>
         </p:spPr>
         <p:txBody>
-          <a:bodyPr vert="horz" lIns="91440" tIns="45720" rIns="91440" bIns="45720" rtlCol="0"/>
+          <a:bodyPr vert="horz" lIns="96661" tIns="48331" rIns="96661" bIns="48331" rtlCol="0"/>
           <a:lstStyle>
             <a:lvl1pPr algn="l">
-              <a:defRPr sz="1200"/>
+              <a:defRPr sz="1300"/>
             </a:lvl1pPr>
           </a:lstStyle>
           <a:p>
@@ -383,18 +384,18 @@
         </p:nvSpPr>
         <p:spPr>
           <a:xfrm>
-            <a:off x="3884613" y="0"/>
-            <a:ext cx="2971800" cy="457200"/>
+            <a:off x="4143587" y="0"/>
+            <a:ext cx="3169920" cy="480060"/>
           </a:xfrm>
           <a:prstGeom prst="rect">
             <a:avLst/>
           </a:prstGeom>
         </p:spPr>
         <p:txBody>
-          <a:bodyPr vert="horz" lIns="91440" tIns="45720" rIns="91440" bIns="45720" rtlCol="0"/>
+          <a:bodyPr vert="horz" lIns="96661" tIns="48331" rIns="96661" bIns="48331" rtlCol="0"/>
           <a:lstStyle>
             <a:lvl1pPr algn="r">
-              <a:defRPr sz="1200"/>
+              <a:defRPr sz="1300"/>
             </a:lvl1pPr>
           </a:lstStyle>
           <a:p>
@@ -418,8 +419,8 @@
         </p:nvSpPr>
         <p:spPr>
           <a:xfrm>
-            <a:off x="1143000" y="685800"/>
-            <a:ext cx="4572000" cy="3429000"/>
+            <a:off x="1257300" y="720725"/>
+            <a:ext cx="4800600" cy="3600450"/>
           </a:xfrm>
           <a:prstGeom prst="rect">
             <a:avLst/>
@@ -432,7 +433,7 @@
           </a:ln>
         </p:spPr>
         <p:txBody>
-          <a:bodyPr vert="horz" lIns="91440" tIns="45720" rIns="91440" bIns="45720" rtlCol="0" anchor="ctr"/>
+          <a:bodyPr vert="horz" lIns="96661" tIns="48331" rIns="96661" bIns="48331" rtlCol="0" anchor="ctr"/>
           <a:lstStyle/>
           <a:p>
             <a:endParaRPr lang="en-US"/>
@@ -451,15 +452,15 @@
         </p:nvSpPr>
         <p:spPr>
           <a:xfrm>
-            <a:off x="685800" y="4343400"/>
-            <a:ext cx="5486400" cy="4114800"/>
+            <a:off x="731520" y="4560570"/>
+            <a:ext cx="5852160" cy="4320540"/>
           </a:xfrm>
           <a:prstGeom prst="rect">
             <a:avLst/>
           </a:prstGeom>
         </p:spPr>
         <p:txBody>
-          <a:bodyPr vert="horz" lIns="91440" tIns="45720" rIns="91440" bIns="45720" rtlCol="0"/>
+          <a:bodyPr vert="horz" lIns="96661" tIns="48331" rIns="96661" bIns="48331" rtlCol="0"/>
           <a:lstStyle/>
           <a:p>
             <a:pPr lvl="0"/>
@@ -510,18 +511,18 @@
         </p:nvSpPr>
         <p:spPr>
           <a:xfrm>
-            <a:off x="0" y="8685213"/>
-            <a:ext cx="2971800" cy="457200"/>
+            <a:off x="0" y="9119474"/>
+            <a:ext cx="3169920" cy="480060"/>
           </a:xfrm>
           <a:prstGeom prst="rect">
             <a:avLst/>
           </a:prstGeom>
         </p:spPr>
         <p:txBody>
-          <a:bodyPr vert="horz" lIns="91440" tIns="45720" rIns="91440" bIns="45720" rtlCol="0" anchor="b"/>
+          <a:bodyPr vert="horz" lIns="96661" tIns="48331" rIns="96661" bIns="48331" rtlCol="0" anchor="b"/>
           <a:lstStyle>
             <a:lvl1pPr algn="l">
-              <a:defRPr sz="1200"/>
+              <a:defRPr sz="1300"/>
             </a:lvl1pPr>
           </a:lstStyle>
           <a:p>
@@ -541,18 +542,18 @@
         </p:nvSpPr>
         <p:spPr>
           <a:xfrm>
-            <a:off x="3884613" y="8685213"/>
-            <a:ext cx="2971800" cy="457200"/>
+            <a:off x="4143587" y="9119474"/>
+            <a:ext cx="3169920" cy="480060"/>
           </a:xfrm>
           <a:prstGeom prst="rect">
             <a:avLst/>
           </a:prstGeom>
         </p:spPr>
         <p:txBody>
-          <a:bodyPr vert="horz" lIns="91440" tIns="45720" rIns="91440" bIns="45720" rtlCol="0" anchor="b"/>
+          <a:bodyPr vert="horz" lIns="96661" tIns="48331" rIns="96661" bIns="48331" rtlCol="0" anchor="b"/>
           <a:lstStyle>
             <a:lvl1pPr algn="r">
-              <a:defRPr sz="1200"/>
+              <a:defRPr sz="1300"/>
             </a:lvl1pPr>
           </a:lstStyle>
           <a:p>
@@ -3083,6 +3084,344 @@
           <p:cNvPr id="2" name="Title 1">
             <a:extLst>
               <a:ext uri="{FF2B5EF4-FFF2-40B4-BE49-F238E27FC236}">
+                <a16:creationId xmlns:a16="http://schemas.microsoft.com/office/drawing/2014/main" id="{9707FE84-4F2B-4477-B350-8707EF4C0F73}"/>
+              </a:ext>
+            </a:extLst>
+          </p:cNvPr>
+          <p:cNvSpPr>
+            <a:spLocks noGrp="1"/>
+          </p:cNvSpPr>
+          <p:nvPr>
+            <p:ph type="title"/>
+          </p:nvPr>
+        </p:nvSpPr>
+        <p:spPr/>
+        <p:txBody>
+          <a:bodyPr/>
+          <a:lstStyle/>
+          <a:p>
+            <a:r>
+              <a:rPr lang="en-US" dirty="0"/>
+              <a:t>Remotes</a:t>
+            </a:r>
+          </a:p>
+        </p:txBody>
+      </p:sp>
+      <p:sp>
+        <p:nvSpPr>
+          <p:cNvPr id="3" name="Content Placeholder 2">
+            <a:extLst>
+              <a:ext uri="{FF2B5EF4-FFF2-40B4-BE49-F238E27FC236}">
+                <a16:creationId xmlns:a16="http://schemas.microsoft.com/office/drawing/2014/main" id="{A97684BD-312E-488E-9F4A-E1D75149EF2D}"/>
+              </a:ext>
+            </a:extLst>
+          </p:cNvPr>
+          <p:cNvSpPr>
+            <a:spLocks noGrp="1"/>
+          </p:cNvSpPr>
+          <p:nvPr>
+            <p:ph idx="1"/>
+          </p:nvPr>
+        </p:nvSpPr>
+        <p:spPr/>
+        <p:txBody>
+          <a:bodyPr/>
+          <a:lstStyle/>
+          <a:p>
+            <a:r>
+              <a:rPr lang="en-US" dirty="0"/>
+              <a:t>Commits from a remote are not merged in automatically!</a:t>
+            </a:r>
+          </a:p>
+          <a:p>
+            <a:r>
+              <a:rPr lang="en-US" dirty="0">
+                <a:cs typeface="Courier New" panose="02070309020205020404" pitchFamily="49" charset="0"/>
+              </a:rPr>
+              <a:t>You still need to merge them into your local branches with </a:t>
+            </a:r>
+            <a:r>
+              <a:rPr lang="en-US" sz="2800" dirty="0">
+                <a:latin typeface="Courier New" panose="02070309020205020404" pitchFamily="49" charset="0"/>
+                <a:cs typeface="Courier New" panose="02070309020205020404" pitchFamily="49" charset="0"/>
+              </a:rPr>
+              <a:t>git merge</a:t>
+            </a:r>
+            <a:r>
+              <a:rPr lang="en-US" dirty="0">
+                <a:cs typeface="Courier New" panose="02070309020205020404" pitchFamily="49" charset="0"/>
+              </a:rPr>
+              <a:t>.</a:t>
+            </a:r>
+          </a:p>
+          <a:p>
+            <a:r>
+              <a:rPr lang="en-US" dirty="0">
+                <a:cs typeface="Courier New" panose="02070309020205020404" pitchFamily="49" charset="0"/>
+              </a:rPr>
+              <a:t>(or use </a:t>
+            </a:r>
+            <a:r>
+              <a:rPr lang="en-US" sz="2800" dirty="0">
+                <a:latin typeface="Courier New" panose="02070309020205020404" pitchFamily="49" charset="0"/>
+                <a:cs typeface="Courier New" panose="02070309020205020404" pitchFamily="49" charset="0"/>
+              </a:rPr>
+              <a:t>git pull</a:t>
+            </a:r>
+            <a:r>
+              <a:rPr lang="en-US" dirty="0">
+                <a:cs typeface="Courier New" panose="02070309020205020404" pitchFamily="49" charset="0"/>
+              </a:rPr>
+              <a:t> which does fetch + merge)</a:t>
+            </a:r>
+          </a:p>
+        </p:txBody>
+      </p:sp>
+      <p:sp>
+        <p:nvSpPr>
+          <p:cNvPr id="4" name="Slide Number Placeholder 3">
+            <a:extLst>
+              <a:ext uri="{FF2B5EF4-FFF2-40B4-BE49-F238E27FC236}">
+                <a16:creationId xmlns:a16="http://schemas.microsoft.com/office/drawing/2014/main" id="{AF765A00-50C5-4EC9-BB04-83EBCFFFF9CC}"/>
+              </a:ext>
+            </a:extLst>
+          </p:cNvPr>
+          <p:cNvSpPr>
+            <a:spLocks noGrp="1"/>
+          </p:cNvSpPr>
+          <p:nvPr>
+            <p:ph type="sldNum" sz="quarter" idx="12"/>
+          </p:nvPr>
+        </p:nvSpPr>
+        <p:spPr/>
+        <p:txBody>
+          <a:bodyPr/>
+          <a:lstStyle/>
+          <a:p>
+            <a:fld id="{106E12CD-FCB1-464E-A775-0B83FDDACE03}" type="slidenum">
+              <a:rPr lang="en-US" smtClean="0"/>
+              <a:pPr/>
+              <a:t>9</a:t>
+            </a:fld>
+            <a:endParaRPr lang="en-US"/>
+          </a:p>
+        </p:txBody>
+      </p:sp>
+    </p:spTree>
+    <p:extLst>
+      <p:ext uri="{BB962C8B-B14F-4D97-AF65-F5344CB8AC3E}">
+        <p14:creationId xmlns:p14="http://schemas.microsoft.com/office/powerpoint/2010/main" val="327696006"/>
+      </p:ext>
+    </p:extLst>
+  </p:cSld>
+  <p:clrMapOvr>
+    <a:masterClrMapping/>
+  </p:clrMapOvr>
+  <p:timing>
+    <p:tnLst>
+      <p:par>
+        <p:cTn id="1" dur="indefinite" restart="never" nodeType="tmRoot">
+          <p:childTnLst>
+            <p:seq concurrent="1" nextAc="seek">
+              <p:cTn id="2" dur="indefinite" nodeType="mainSeq">
+                <p:childTnLst>
+                  <p:par>
+                    <p:cTn id="3" fill="hold">
+                      <p:stCondLst>
+                        <p:cond delay="indefinite"/>
+                      </p:stCondLst>
+                      <p:childTnLst>
+                        <p:par>
+                          <p:cTn id="4" fill="hold">
+                            <p:stCondLst>
+                              <p:cond delay="0"/>
+                            </p:stCondLst>
+                            <p:childTnLst>
+                              <p:par>
+                                <p:cTn id="5" presetID="1" presetClass="entr" presetSubtype="0" fill="hold" grpId="0" nodeType="clickEffect">
+                                  <p:stCondLst>
+                                    <p:cond delay="0"/>
+                                  </p:stCondLst>
+                                  <p:childTnLst>
+                                    <p:set>
+                                      <p:cBhvr>
+                                        <p:cTn id="6" dur="1" fill="hold">
+                                          <p:stCondLst>
+                                            <p:cond delay="0"/>
+                                          </p:stCondLst>
+                                        </p:cTn>
+                                        <p:tgtEl>
+                                          <p:spTgt spid="3">
+                                            <p:txEl>
+                                              <p:pRg st="0" end="0"/>
+                                            </p:txEl>
+                                          </p:spTgt>
+                                        </p:tgtEl>
+                                        <p:attrNameLst>
+                                          <p:attrName>style.visibility</p:attrName>
+                                        </p:attrNameLst>
+                                      </p:cBhvr>
+                                      <p:to>
+                                        <p:strVal val="visible"/>
+                                      </p:to>
+                                    </p:set>
+                                  </p:childTnLst>
+                                </p:cTn>
+                              </p:par>
+                            </p:childTnLst>
+                          </p:cTn>
+                        </p:par>
+                      </p:childTnLst>
+                    </p:cTn>
+                  </p:par>
+                  <p:par>
+                    <p:cTn id="7" fill="hold">
+                      <p:stCondLst>
+                        <p:cond delay="indefinite"/>
+                      </p:stCondLst>
+                      <p:childTnLst>
+                        <p:par>
+                          <p:cTn id="8" fill="hold">
+                            <p:stCondLst>
+                              <p:cond delay="0"/>
+                            </p:stCondLst>
+                            <p:childTnLst>
+                              <p:par>
+                                <p:cTn id="9" presetID="1" presetClass="entr" presetSubtype="0" fill="hold" grpId="0" nodeType="clickEffect">
+                                  <p:stCondLst>
+                                    <p:cond delay="0"/>
+                                  </p:stCondLst>
+                                  <p:childTnLst>
+                                    <p:set>
+                                      <p:cBhvr>
+                                        <p:cTn id="10" dur="1" fill="hold">
+                                          <p:stCondLst>
+                                            <p:cond delay="0"/>
+                                          </p:stCondLst>
+                                        </p:cTn>
+                                        <p:tgtEl>
+                                          <p:spTgt spid="3">
+                                            <p:txEl>
+                                              <p:pRg st="1" end="1"/>
+                                            </p:txEl>
+                                          </p:spTgt>
+                                        </p:tgtEl>
+                                        <p:attrNameLst>
+                                          <p:attrName>style.visibility</p:attrName>
+                                        </p:attrNameLst>
+                                      </p:cBhvr>
+                                      <p:to>
+                                        <p:strVal val="visible"/>
+                                      </p:to>
+                                    </p:set>
+                                  </p:childTnLst>
+                                </p:cTn>
+                              </p:par>
+                            </p:childTnLst>
+                          </p:cTn>
+                        </p:par>
+                      </p:childTnLst>
+                    </p:cTn>
+                  </p:par>
+                  <p:par>
+                    <p:cTn id="11" fill="hold">
+                      <p:stCondLst>
+                        <p:cond delay="indefinite"/>
+                      </p:stCondLst>
+                      <p:childTnLst>
+                        <p:par>
+                          <p:cTn id="12" fill="hold">
+                            <p:stCondLst>
+                              <p:cond delay="0"/>
+                            </p:stCondLst>
+                            <p:childTnLst>
+                              <p:par>
+                                <p:cTn id="13" presetID="1" presetClass="entr" presetSubtype="0" fill="hold" grpId="0" nodeType="clickEffect">
+                                  <p:stCondLst>
+                                    <p:cond delay="0"/>
+                                  </p:stCondLst>
+                                  <p:childTnLst>
+                                    <p:set>
+                                      <p:cBhvr>
+                                        <p:cTn id="14" dur="1" fill="hold">
+                                          <p:stCondLst>
+                                            <p:cond delay="0"/>
+                                          </p:stCondLst>
+                                        </p:cTn>
+                                        <p:tgtEl>
+                                          <p:spTgt spid="3">
+                                            <p:txEl>
+                                              <p:pRg st="2" end="2"/>
+                                            </p:txEl>
+                                          </p:spTgt>
+                                        </p:tgtEl>
+                                        <p:attrNameLst>
+                                          <p:attrName>style.visibility</p:attrName>
+                                        </p:attrNameLst>
+                                      </p:cBhvr>
+                                      <p:to>
+                                        <p:strVal val="visible"/>
+                                      </p:to>
+                                    </p:set>
+                                  </p:childTnLst>
+                                </p:cTn>
+                              </p:par>
+                            </p:childTnLst>
+                          </p:cTn>
+                        </p:par>
+                      </p:childTnLst>
+                    </p:cTn>
+                  </p:par>
+                </p:childTnLst>
+              </p:cTn>
+              <p:prevCondLst>
+                <p:cond evt="onPrev" delay="0">
+                  <p:tgtEl>
+                    <p:sldTgt/>
+                  </p:tgtEl>
+                </p:cond>
+              </p:prevCondLst>
+              <p:nextCondLst>
+                <p:cond evt="onNext" delay="0">
+                  <p:tgtEl>
+                    <p:sldTgt/>
+                  </p:tgtEl>
+                </p:cond>
+              </p:nextCondLst>
+            </p:seq>
+          </p:childTnLst>
+        </p:cTn>
+      </p:par>
+    </p:tnLst>
+    <p:bldLst>
+      <p:bldP spid="3" grpId="0" build="p"/>
+    </p:bldLst>
+  </p:timing>
+</p:sld>
+</file>
+
+<file path=ppt/slides/slide11.xml><?xml version="1.0" encoding="utf-8"?>
+<p:sld xmlns:a="http://schemas.openxmlformats.org/drawingml/2006/main" xmlns:r="http://schemas.openxmlformats.org/officeDocument/2006/relationships" xmlns:p="http://schemas.openxmlformats.org/presentationml/2006/main">
+  <p:cSld>
+    <p:spTree>
+      <p:nvGrpSpPr>
+        <p:cNvPr id="1" name=""/>
+        <p:cNvGrpSpPr/>
+        <p:nvPr/>
+      </p:nvGrpSpPr>
+      <p:grpSpPr>
+        <a:xfrm>
+          <a:off x="0" y="0"/>
+          <a:ext cx="0" cy="0"/>
+          <a:chOff x="0" y="0"/>
+          <a:chExt cx="0" cy="0"/>
+        </a:xfrm>
+      </p:grpSpPr>
+      <p:sp>
+        <p:nvSpPr>
+          <p:cNvPr id="2" name="Title 1">
+            <a:extLst>
+              <a:ext uri="{FF2B5EF4-FFF2-40B4-BE49-F238E27FC236}">
                 <a16:creationId xmlns:a16="http://schemas.microsoft.com/office/drawing/2014/main" id="{B206FF06-B57A-440A-BE88-CD9A6FC7320D}"/>
               </a:ext>
             </a:extLst>
@@ -3130,7 +3469,7 @@
             <a:fld id="{106E12CD-FCB1-464E-A775-0B83FDDACE03}" type="slidenum">
               <a:rPr lang="en-US" smtClean="0"/>
               <a:pPr/>
-              <a:t>9</a:t>
+              <a:t>10</a:t>
             </a:fld>
             <a:endParaRPr lang="en-US"/>
           </a:p>
@@ -3209,163 +3548,6 @@
 </p:sld>
 </file>
 
-<file path=ppt/slides/slide11.xml><?xml version="1.0" encoding="utf-8"?>
-<p:sld xmlns:a="http://schemas.openxmlformats.org/drawingml/2006/main" xmlns:r="http://schemas.openxmlformats.org/officeDocument/2006/relationships" xmlns:p="http://schemas.openxmlformats.org/presentationml/2006/main">
-  <p:cSld>
-    <p:spTree>
-      <p:nvGrpSpPr>
-        <p:cNvPr id="1" name=""/>
-        <p:cNvGrpSpPr/>
-        <p:nvPr/>
-      </p:nvGrpSpPr>
-      <p:grpSpPr>
-        <a:xfrm>
-          <a:off x="0" y="0"/>
-          <a:ext cx="0" cy="0"/>
-          <a:chOff x="0" y="0"/>
-          <a:chExt cx="0" cy="0"/>
-        </a:xfrm>
-      </p:grpSpPr>
-      <p:sp>
-        <p:nvSpPr>
-          <p:cNvPr id="2" name="Title 1">
-            <a:extLst>
-              <a:ext uri="{FF2B5EF4-FFF2-40B4-BE49-F238E27FC236}">
-                <a16:creationId xmlns:a16="http://schemas.microsoft.com/office/drawing/2014/main" id="{6393BA9C-C7B2-44F5-9720-C227A63507DC}"/>
-              </a:ext>
-            </a:extLst>
-          </p:cNvPr>
-          <p:cNvSpPr>
-            <a:spLocks noGrp="1"/>
-          </p:cNvSpPr>
-          <p:nvPr>
-            <p:ph type="title"/>
-          </p:nvPr>
-        </p:nvSpPr>
-        <p:spPr/>
-        <p:txBody>
-          <a:bodyPr/>
-          <a:lstStyle/>
-          <a:p>
-            <a:r>
-              <a:rPr lang="en-US" dirty="0"/>
-              <a:t>Remote-related commands</a:t>
-            </a:r>
-          </a:p>
-        </p:txBody>
-      </p:sp>
-      <p:sp>
-        <p:nvSpPr>
-          <p:cNvPr id="3" name="Content Placeholder 2">
-            <a:extLst>
-              <a:ext uri="{FF2B5EF4-FFF2-40B4-BE49-F238E27FC236}">
-                <a16:creationId xmlns:a16="http://schemas.microsoft.com/office/drawing/2014/main" id="{7EC390B8-95D5-4CF0-A364-633A3B5CB74F}"/>
-              </a:ext>
-            </a:extLst>
-          </p:cNvPr>
-          <p:cNvSpPr>
-            <a:spLocks noGrp="1"/>
-          </p:cNvSpPr>
-          <p:nvPr>
-            <p:ph idx="1"/>
-          </p:nvPr>
-        </p:nvSpPr>
-        <p:spPr/>
-        <p:txBody>
-          <a:bodyPr>
-            <a:normAutofit/>
-          </a:bodyPr>
-          <a:lstStyle/>
-          <a:p>
-            <a:r>
-              <a:rPr lang="en-US" sz="2400" dirty="0">
-                <a:latin typeface="Courier New" panose="02070309020205020404" pitchFamily="49" charset="0"/>
-                <a:cs typeface="Courier New" panose="02070309020205020404" pitchFamily="49" charset="0"/>
-              </a:rPr>
-              <a:t>git fetch &lt;remote&gt; # gets updates</a:t>
-            </a:r>
-          </a:p>
-          <a:p>
-            <a:r>
-              <a:rPr lang="en-US" sz="2400" dirty="0">
-                <a:latin typeface="Courier New" panose="02070309020205020404" pitchFamily="49" charset="0"/>
-                <a:cs typeface="Courier New" panose="02070309020205020404" pitchFamily="49" charset="0"/>
-              </a:rPr>
-              <a:t>git merge &lt;remote&gt;/&lt;branch&gt;</a:t>
-            </a:r>
-          </a:p>
-          <a:p>
-            <a:r>
-              <a:rPr lang="en-US" sz="2400" dirty="0">
-                <a:latin typeface="Courier New" panose="02070309020205020404" pitchFamily="49" charset="0"/>
-                <a:cs typeface="Courier New" panose="02070309020205020404" pitchFamily="49" charset="0"/>
-              </a:rPr>
-              <a:t>git pull &lt;remote&gt; &lt;branch&gt; # fetch + merge</a:t>
-            </a:r>
-          </a:p>
-          <a:p>
-            <a:r>
-              <a:rPr lang="en-US" sz="2400" dirty="0">
-                <a:latin typeface="Courier New" panose="02070309020205020404" pitchFamily="49" charset="0"/>
-                <a:cs typeface="Courier New" panose="02070309020205020404" pitchFamily="49" charset="0"/>
-              </a:rPr>
-              <a:t>git push &lt;remote&gt; &lt;branch&gt;</a:t>
-            </a:r>
-          </a:p>
-          <a:p>
-            <a:r>
-              <a:rPr lang="en-US" sz="2400" dirty="0">
-                <a:latin typeface="Courier New" panose="02070309020205020404" pitchFamily="49" charset="0"/>
-                <a:cs typeface="Courier New" panose="02070309020205020404" pitchFamily="49" charset="0"/>
-              </a:rPr>
-              <a:t>git checkout --track &lt;remote&gt;/&lt;branch&gt;</a:t>
-            </a:r>
-          </a:p>
-        </p:txBody>
-      </p:sp>
-      <p:sp>
-        <p:nvSpPr>
-          <p:cNvPr id="4" name="Slide Number Placeholder 3">
-            <a:extLst>
-              <a:ext uri="{FF2B5EF4-FFF2-40B4-BE49-F238E27FC236}">
-                <a16:creationId xmlns:a16="http://schemas.microsoft.com/office/drawing/2014/main" id="{5470C049-9B23-4CE1-8856-17591F29625B}"/>
-              </a:ext>
-            </a:extLst>
-          </p:cNvPr>
-          <p:cNvSpPr>
-            <a:spLocks noGrp="1"/>
-          </p:cNvSpPr>
-          <p:nvPr>
-            <p:ph type="sldNum" sz="quarter" idx="12"/>
-          </p:nvPr>
-        </p:nvSpPr>
-        <p:spPr/>
-        <p:txBody>
-          <a:bodyPr/>
-          <a:lstStyle/>
-          <a:p>
-            <a:fld id="{106E12CD-FCB1-464E-A775-0B83FDDACE03}" type="slidenum">
-              <a:rPr lang="en-US" smtClean="0"/>
-              <a:pPr/>
-              <a:t>10</a:t>
-            </a:fld>
-            <a:endParaRPr lang="en-US"/>
-          </a:p>
-        </p:txBody>
-      </p:sp>
-    </p:spTree>
-    <p:extLst>
-      <p:ext uri="{BB962C8B-B14F-4D97-AF65-F5344CB8AC3E}">
-        <p14:creationId xmlns:p14="http://schemas.microsoft.com/office/powerpoint/2010/main" val="548003698"/>
-      </p:ext>
-    </p:extLst>
-  </p:cSld>
-  <p:clrMapOvr>
-    <a:masterClrMapping/>
-  </p:clrMapOvr>
-</p:sld>
-</file>
-
 <file path=ppt/slides/slide12.xml><?xml version="1.0" encoding="utf-8"?>
 <p:sld xmlns:a="http://schemas.openxmlformats.org/drawingml/2006/main" xmlns:r="http://schemas.openxmlformats.org/officeDocument/2006/relationships" xmlns:p="http://schemas.openxmlformats.org/presentationml/2006/main">
   <p:cSld>
@@ -3388,7 +3570,7 @@
           <p:cNvPr id="2" name="Title 1">
             <a:extLst>
               <a:ext uri="{FF2B5EF4-FFF2-40B4-BE49-F238E27FC236}">
-                <a16:creationId xmlns:a16="http://schemas.microsoft.com/office/drawing/2014/main" id="{C84527BE-33CE-45AD-A9D1-AC3F293BAD21}"/>
+                <a16:creationId xmlns:a16="http://schemas.microsoft.com/office/drawing/2014/main" id="{6393BA9C-C7B2-44F5-9720-C227A63507DC}"/>
               </a:ext>
             </a:extLst>
           </p:cNvPr>
@@ -3406,7 +3588,7 @@
           <a:p>
             <a:r>
               <a:rPr lang="en-US" dirty="0"/>
-              <a:t>Exercise 3: Remotes</a:t>
+              <a:t>Remote-related commands</a:t>
             </a:r>
           </a:p>
         </p:txBody>
@@ -3416,7 +3598,7 @@
           <p:cNvPr id="3" name="Content Placeholder 2">
             <a:extLst>
               <a:ext uri="{FF2B5EF4-FFF2-40B4-BE49-F238E27FC236}">
-                <a16:creationId xmlns:a16="http://schemas.microsoft.com/office/drawing/2014/main" id="{662F4B0B-B133-43A5-98CF-6ED5A64071E5}"/>
+                <a16:creationId xmlns:a16="http://schemas.microsoft.com/office/drawing/2014/main" id="{7EC390B8-95D5-4CF0-A364-633A3B5CB74F}"/>
               </a:ext>
             </a:extLst>
           </p:cNvPr>
@@ -3435,77 +3617,48 @@
           <a:lstStyle/>
           <a:p>
             <a:r>
-              <a:rPr lang="en-US" sz="2800" dirty="0"/>
-              <a:t>Create a new repository with a README in GitHub.</a:t>
-            </a:r>
-          </a:p>
-          <a:p>
-            <a:r>
-              <a:rPr lang="en-US" sz="2800" dirty="0"/>
-              <a:t>Clone the repository locally.</a:t>
-            </a:r>
-          </a:p>
-          <a:p>
-            <a:r>
-              <a:rPr lang="en-US" sz="2800" dirty="0"/>
-              <a:t>In GitHub, edit the README file and save (commit).</a:t>
-            </a:r>
-          </a:p>
-          <a:p>
-            <a:r>
-              <a:rPr lang="en-US" sz="2800" dirty="0"/>
-              <a:t>Use </a:t>
-            </a:r>
-            <a:r>
               <a:rPr lang="en-US" sz="2400" dirty="0">
                 <a:latin typeface="Courier New" panose="02070309020205020404" pitchFamily="49" charset="0"/>
                 <a:cs typeface="Courier New" panose="02070309020205020404" pitchFamily="49" charset="0"/>
               </a:rPr>
-              <a:t>git fetch</a:t>
-            </a:r>
-            <a:r>
-              <a:rPr lang="en-US" sz="2800" dirty="0"/>
-              <a:t> to get the new commit. Did your local copy of README change? What is the output of </a:t>
-            </a:r>
+              <a:t>git fetch &lt;remote&gt; # gets updates</a:t>
+            </a:r>
+          </a:p>
+          <a:p>
             <a:r>
               <a:rPr lang="en-US" sz="2400" dirty="0">
                 <a:latin typeface="Courier New" panose="02070309020205020404" pitchFamily="49" charset="0"/>
                 <a:cs typeface="Courier New" panose="02070309020205020404" pitchFamily="49" charset="0"/>
               </a:rPr>
-              <a:t>git log</a:t>
-            </a:r>
-            <a:r>
-              <a:rPr lang="en-US" sz="2800" dirty="0">
-                <a:cs typeface="Courier New" panose="02070309020205020404" pitchFamily="49" charset="0"/>
-              </a:rPr>
-              <a:t> and </a:t>
-            </a:r>
+              <a:t>git merge &lt;remote&gt;/&lt;branch&gt;</a:t>
+            </a:r>
+          </a:p>
+          <a:p>
             <a:r>
               <a:rPr lang="en-US" sz="2400" dirty="0">
                 <a:latin typeface="Courier New" panose="02070309020205020404" pitchFamily="49" charset="0"/>
                 <a:cs typeface="Courier New" panose="02070309020205020404" pitchFamily="49" charset="0"/>
               </a:rPr>
-              <a:t>git log --remotes</a:t>
-            </a:r>
-            <a:r>
-              <a:rPr lang="en-US" sz="2800" dirty="0"/>
-              <a:t>?</a:t>
-            </a:r>
-          </a:p>
-          <a:p>
-            <a:r>
-              <a:rPr lang="en-US" sz="2800" dirty="0"/>
-              <a:t>Merge in the new commit.</a:t>
-            </a:r>
-          </a:p>
-          <a:p>
-            <a:r>
-              <a:rPr lang="en-US" sz="2800" dirty="0"/>
-              <a:t>On your computer, edit README again, commit, and push to GitHub.</a:t>
-            </a:r>
-          </a:p>
-          <a:p>
-            <a:endParaRPr lang="en-US" sz="2800" dirty="0"/>
+              <a:t>git pull &lt;remote&gt; &lt;branch&gt; # fetch + merge</a:t>
+            </a:r>
+          </a:p>
+          <a:p>
+            <a:r>
+              <a:rPr lang="en-US" sz="2400" dirty="0">
+                <a:latin typeface="Courier New" panose="02070309020205020404" pitchFamily="49" charset="0"/>
+                <a:cs typeface="Courier New" panose="02070309020205020404" pitchFamily="49" charset="0"/>
+              </a:rPr>
+              <a:t>git push &lt;remote&gt; &lt;branch&gt;</a:t>
+            </a:r>
+          </a:p>
+          <a:p>
+            <a:r>
+              <a:rPr lang="en-US" sz="2400" dirty="0">
+                <a:latin typeface="Courier New" panose="02070309020205020404" pitchFamily="49" charset="0"/>
+                <a:cs typeface="Courier New" panose="02070309020205020404" pitchFamily="49" charset="0"/>
+              </a:rPr>
+              <a:t>git checkout --track &lt;remote&gt;/&lt;branch&gt;</a:t>
+            </a:r>
           </a:p>
         </p:txBody>
       </p:sp>
@@ -3514,7 +3667,7 @@
           <p:cNvPr id="4" name="Slide Number Placeholder 3">
             <a:extLst>
               <a:ext uri="{FF2B5EF4-FFF2-40B4-BE49-F238E27FC236}">
-                <a16:creationId xmlns:a16="http://schemas.microsoft.com/office/drawing/2014/main" id="{7A4FE1F8-6E58-4B5B-AF4B-87DC156DC10B}"/>
+                <a16:creationId xmlns:a16="http://schemas.microsoft.com/office/drawing/2014/main" id="{5470C049-9B23-4CE1-8856-17591F29625B}"/>
               </a:ext>
             </a:extLst>
           </p:cNvPr>
@@ -3542,7 +3695,7 @@
     </p:spTree>
     <p:extLst>
       <p:ext uri="{BB962C8B-B14F-4D97-AF65-F5344CB8AC3E}">
-        <p14:creationId xmlns:p14="http://schemas.microsoft.com/office/powerpoint/2010/main" val="3006902498"/>
+        <p14:creationId xmlns:p14="http://schemas.microsoft.com/office/powerpoint/2010/main" val="548003698"/>
       </p:ext>
     </p:extLst>
   </p:cSld>
@@ -3574,7 +3727,7 @@
           <p:cNvPr id="2" name="Title 1">
             <a:extLst>
               <a:ext uri="{FF2B5EF4-FFF2-40B4-BE49-F238E27FC236}">
-                <a16:creationId xmlns:a16="http://schemas.microsoft.com/office/drawing/2014/main" id="{3CD93EE8-B37A-4924-856E-AD7CFEBCBA4E}"/>
+                <a16:creationId xmlns:a16="http://schemas.microsoft.com/office/drawing/2014/main" id="{C84527BE-33CE-45AD-A9D1-AC3F293BAD21}"/>
               </a:ext>
             </a:extLst>
           </p:cNvPr>
@@ -3592,7 +3745,7 @@
           <a:p>
             <a:r>
               <a:rPr lang="en-US" dirty="0"/>
-              <a:t>Rebasing</a:t>
+              <a:t>Exercise 3: Remotes</a:t>
             </a:r>
           </a:p>
         </p:txBody>
@@ -3602,7 +3755,7 @@
           <p:cNvPr id="3" name="Content Placeholder 2">
             <a:extLst>
               <a:ext uri="{FF2B5EF4-FFF2-40B4-BE49-F238E27FC236}">
-                <a16:creationId xmlns:a16="http://schemas.microsoft.com/office/drawing/2014/main" id="{B0637073-35B5-4FFA-9576-0A00FB094E13}"/>
+                <a16:creationId xmlns:a16="http://schemas.microsoft.com/office/drawing/2014/main" id="{662F4B0B-B133-43A5-98CF-6ED5A64071E5}"/>
               </a:ext>
             </a:extLst>
           </p:cNvPr>
@@ -3615,39 +3768,83 @@
         </p:nvSpPr>
         <p:spPr/>
         <p:txBody>
-          <a:bodyPr/>
+          <a:bodyPr>
+            <a:normAutofit/>
+          </a:bodyPr>
           <a:lstStyle/>
           <a:p>
             <a:r>
-              <a:rPr lang="en-US" sz="2800" dirty="0">
+              <a:rPr lang="en-US" sz="2800" dirty="0"/>
+              <a:t>Create a new repository with a README in GitHub.</a:t>
+            </a:r>
+          </a:p>
+          <a:p>
+            <a:r>
+              <a:rPr lang="en-US" sz="2800" dirty="0"/>
+              <a:t>Clone the repository locally.</a:t>
+            </a:r>
+          </a:p>
+          <a:p>
+            <a:r>
+              <a:rPr lang="en-US" sz="2800" dirty="0"/>
+              <a:t>In GitHub, edit the README file and save (commit).</a:t>
+            </a:r>
+          </a:p>
+          <a:p>
+            <a:r>
+              <a:rPr lang="en-US" sz="2800" dirty="0"/>
+              <a:t>Use </a:t>
+            </a:r>
+            <a:r>
+              <a:rPr lang="en-US" sz="2400" dirty="0">
                 <a:latin typeface="Courier New" panose="02070309020205020404" pitchFamily="49" charset="0"/>
                 <a:cs typeface="Courier New" panose="02070309020205020404" pitchFamily="49" charset="0"/>
               </a:rPr>
-              <a:t>git merge</a:t>
-            </a:r>
-            <a:r>
-              <a:rPr lang="en-US" dirty="0"/>
-              <a:t> keeps all commit parents and combines changes together in a new commit.</a:t>
-            </a:r>
-          </a:p>
-          <a:p>
-            <a:r>
-              <a:rPr lang="en-US" sz="2800" dirty="0">
+              <a:t>git fetch</a:t>
+            </a:r>
+            <a:r>
+              <a:rPr lang="en-US" sz="2800" dirty="0"/>
+              <a:t> to get the new commit. Did your local copy of README change? What is the output of </a:t>
+            </a:r>
+            <a:r>
+              <a:rPr lang="en-US" sz="2400" dirty="0">
                 <a:latin typeface="Courier New" panose="02070309020205020404" pitchFamily="49" charset="0"/>
                 <a:cs typeface="Courier New" panose="02070309020205020404" pitchFamily="49" charset="0"/>
               </a:rPr>
-              <a:t>git rebase</a:t>
-            </a:r>
-            <a:r>
-              <a:rPr lang="en-US" dirty="0"/>
-              <a:t> calculates changes from one branch and “replays” them on another.</a:t>
-            </a:r>
-          </a:p>
-          <a:p>
-            <a:r>
-              <a:rPr lang="en-US" dirty="0"/>
-              <a:t>Use rebase to change the “base” of a branch, e.g. when you want to incorporate changes that occurred on master into a feature branch.</a:t>
-            </a:r>
+              <a:t>git log</a:t>
+            </a:r>
+            <a:r>
+              <a:rPr lang="en-US" sz="2800" dirty="0">
+                <a:cs typeface="Courier New" panose="02070309020205020404" pitchFamily="49" charset="0"/>
+              </a:rPr>
+              <a:t> and </a:t>
+            </a:r>
+            <a:r>
+              <a:rPr lang="en-US" sz="2400" dirty="0">
+                <a:latin typeface="Courier New" panose="02070309020205020404" pitchFamily="49" charset="0"/>
+                <a:cs typeface="Courier New" panose="02070309020205020404" pitchFamily="49" charset="0"/>
+              </a:rPr>
+              <a:t>git log --remotes</a:t>
+            </a:r>
+            <a:r>
+              <a:rPr lang="en-US" sz="2800" dirty="0"/>
+              <a:t>?</a:t>
+            </a:r>
+          </a:p>
+          <a:p>
+            <a:r>
+              <a:rPr lang="en-US" sz="2800" dirty="0"/>
+              <a:t>Merge in the new commit.</a:t>
+            </a:r>
+          </a:p>
+          <a:p>
+            <a:r>
+              <a:rPr lang="en-US" sz="2800" dirty="0"/>
+              <a:t>On your computer, edit README again, commit, and push to GitHub.</a:t>
+            </a:r>
+          </a:p>
+          <a:p>
+            <a:endParaRPr lang="en-US" sz="2800" dirty="0"/>
           </a:p>
         </p:txBody>
       </p:sp>
@@ -3656,7 +3853,7 @@
           <p:cNvPr id="4" name="Slide Number Placeholder 3">
             <a:extLst>
               <a:ext uri="{FF2B5EF4-FFF2-40B4-BE49-F238E27FC236}">
-                <a16:creationId xmlns:a16="http://schemas.microsoft.com/office/drawing/2014/main" id="{22E17235-8C8E-459C-A988-54CA3F12ACCD}"/>
+                <a16:creationId xmlns:a16="http://schemas.microsoft.com/office/drawing/2014/main" id="{7A4FE1F8-6E58-4B5B-AF4B-87DC156DC10B}"/>
               </a:ext>
             </a:extLst>
           </p:cNvPr>
@@ -3684,7 +3881,7 @@
     </p:spTree>
     <p:extLst>
       <p:ext uri="{BB962C8B-B14F-4D97-AF65-F5344CB8AC3E}">
-        <p14:creationId xmlns:p14="http://schemas.microsoft.com/office/powerpoint/2010/main" val="1681425879"/>
+        <p14:creationId xmlns:p14="http://schemas.microsoft.com/office/powerpoint/2010/main" val="3006902498"/>
       </p:ext>
     </p:extLst>
   </p:cSld>
@@ -3716,7 +3913,7 @@
           <p:cNvPr id="2" name="Title 1">
             <a:extLst>
               <a:ext uri="{FF2B5EF4-FFF2-40B4-BE49-F238E27FC236}">
-                <a16:creationId xmlns:a16="http://schemas.microsoft.com/office/drawing/2014/main" id="{A4EE015A-4542-4A91-ABA1-75A6BE57C843}"/>
+                <a16:creationId xmlns:a16="http://schemas.microsoft.com/office/drawing/2014/main" id="{3CD93EE8-B37A-4924-856E-AD7CFEBCBA4E}"/>
               </a:ext>
             </a:extLst>
           </p:cNvPr>
@@ -3734,7 +3931,7 @@
           <a:p>
             <a:r>
               <a:rPr lang="en-US" dirty="0"/>
-              <a:t>Simple rebase workflow</a:t>
+              <a:t>Rebasing</a:t>
             </a:r>
           </a:p>
         </p:txBody>
@@ -3744,7 +3941,7 @@
           <p:cNvPr id="3" name="Content Placeholder 2">
             <a:extLst>
               <a:ext uri="{FF2B5EF4-FFF2-40B4-BE49-F238E27FC236}">
-                <a16:creationId xmlns:a16="http://schemas.microsoft.com/office/drawing/2014/main" id="{47100679-1DFF-4347-8418-07CDF3151FD2}"/>
+                <a16:creationId xmlns:a16="http://schemas.microsoft.com/office/drawing/2014/main" id="{B0637073-35B5-4FFA-9576-0A00FB094E13}"/>
               </a:ext>
             </a:extLst>
           </p:cNvPr>
@@ -3765,65 +3962,31 @@
                 <a:latin typeface="Courier New" panose="02070309020205020404" pitchFamily="49" charset="0"/>
                 <a:cs typeface="Courier New" panose="02070309020205020404" pitchFamily="49" charset="0"/>
               </a:rPr>
-              <a:t>git checkout -b feature # do work</a:t>
-            </a:r>
-          </a:p>
-          <a:p>
-            <a:r>
-              <a:rPr lang="en-US" dirty="0"/>
-              <a:t>(other commits happen on master we wish to incorporate into </a:t>
-            </a:r>
+              <a:t>git merge</a:t>
+            </a:r>
+            <a:r>
+              <a:rPr lang="en-US" dirty="0"/>
+              <a:t> keeps all commit parents and combines changes together in a new commit.</a:t>
+            </a:r>
+          </a:p>
+          <a:p>
             <a:r>
               <a:rPr lang="en-US" sz="2800" dirty="0">
                 <a:latin typeface="Courier New" panose="02070309020205020404" pitchFamily="49" charset="0"/>
                 <a:cs typeface="Courier New" panose="02070309020205020404" pitchFamily="49" charset="0"/>
               </a:rPr>
-              <a:t>feature</a:t>
-            </a:r>
-            <a:r>
-              <a:rPr lang="en-US" dirty="0">
-                <a:latin typeface="Courier New" panose="02070309020205020404" pitchFamily="49" charset="0"/>
-                <a:cs typeface="Courier New" panose="02070309020205020404" pitchFamily="49" charset="0"/>
-              </a:rPr>
-              <a:t> </a:t>
-            </a:r>
-            <a:r>
-              <a:rPr lang="en-US" dirty="0"/>
-              <a:t>before merging)</a:t>
-            </a:r>
-          </a:p>
-          <a:p>
-            <a:r>
-              <a:rPr lang="en-US" sz="2800" dirty="0">
-                <a:latin typeface="Courier New" panose="02070309020205020404" pitchFamily="49" charset="0"/>
-                <a:cs typeface="Courier New" panose="02070309020205020404" pitchFamily="49" charset="0"/>
-              </a:rPr>
-              <a:t>git rebase master feature</a:t>
-            </a:r>
-          </a:p>
-          <a:p>
-            <a:r>
-              <a:rPr lang="en-US" sz="2800" dirty="0">
-                <a:latin typeface="Courier New" panose="02070309020205020404" pitchFamily="49" charset="0"/>
-                <a:cs typeface="Courier New" panose="02070309020205020404" pitchFamily="49" charset="0"/>
-              </a:rPr>
-              <a:t>git checkout master</a:t>
-            </a:r>
-          </a:p>
-          <a:p>
-            <a:r>
-              <a:rPr lang="en-US" sz="2800" dirty="0">
-                <a:latin typeface="Courier New" panose="02070309020205020404" pitchFamily="49" charset="0"/>
-                <a:cs typeface="Courier New" panose="02070309020205020404" pitchFamily="49" charset="0"/>
-              </a:rPr>
-              <a:t>git merge feature # fast-forward</a:t>
-            </a:r>
-          </a:p>
-          <a:p>
-            <a:endParaRPr lang="en-US" dirty="0"/>
-          </a:p>
-          <a:p>
-            <a:endParaRPr lang="en-US" dirty="0"/>
+              <a:t>git rebase</a:t>
+            </a:r>
+            <a:r>
+              <a:rPr lang="en-US" dirty="0"/>
+              <a:t> calculates changes from one branch and “replays” them on another.</a:t>
+            </a:r>
+          </a:p>
+          <a:p>
+            <a:r>
+              <a:rPr lang="en-US" dirty="0"/>
+              <a:t>Use rebase to change the “base” of a branch, e.g. when you want to incorporate changes that occurred on master into a feature branch.</a:t>
+            </a:r>
           </a:p>
         </p:txBody>
       </p:sp>
@@ -3832,7 +3995,7 @@
           <p:cNvPr id="4" name="Slide Number Placeholder 3">
             <a:extLst>
               <a:ext uri="{FF2B5EF4-FFF2-40B4-BE49-F238E27FC236}">
-                <a16:creationId xmlns:a16="http://schemas.microsoft.com/office/drawing/2014/main" id="{183C977B-0681-45B8-BCD4-1078F81C8331}"/>
+                <a16:creationId xmlns:a16="http://schemas.microsoft.com/office/drawing/2014/main" id="{22E17235-8C8E-459C-A988-54CA3F12ACCD}"/>
               </a:ext>
             </a:extLst>
           </p:cNvPr>
@@ -3860,7 +4023,7 @@
     </p:spTree>
     <p:extLst>
       <p:ext uri="{BB962C8B-B14F-4D97-AF65-F5344CB8AC3E}">
-        <p14:creationId xmlns:p14="http://schemas.microsoft.com/office/powerpoint/2010/main" val="2262711796"/>
+        <p14:creationId xmlns:p14="http://schemas.microsoft.com/office/powerpoint/2010/main" val="1681425879"/>
       </p:ext>
     </p:extLst>
   </p:cSld>
@@ -3892,7 +4055,7 @@
           <p:cNvPr id="2" name="Title 1">
             <a:extLst>
               <a:ext uri="{FF2B5EF4-FFF2-40B4-BE49-F238E27FC236}">
-                <a16:creationId xmlns:a16="http://schemas.microsoft.com/office/drawing/2014/main" id="{F9C3943F-347B-44DF-B888-F77466D4AB96}"/>
+                <a16:creationId xmlns:a16="http://schemas.microsoft.com/office/drawing/2014/main" id="{A4EE015A-4542-4A91-ABA1-75A6BE57C843}"/>
               </a:ext>
             </a:extLst>
           </p:cNvPr>
@@ -3910,7 +4073,7 @@
           <a:p>
             <a:r>
               <a:rPr lang="en-US" dirty="0"/>
-              <a:t>Rebasing tips</a:t>
+              <a:t>Simple rebase workflow</a:t>
             </a:r>
           </a:p>
         </p:txBody>
@@ -3920,7 +4083,7 @@
           <p:cNvPr id="3" name="Content Placeholder 2">
             <a:extLst>
               <a:ext uri="{FF2B5EF4-FFF2-40B4-BE49-F238E27FC236}">
-                <a16:creationId xmlns:a16="http://schemas.microsoft.com/office/drawing/2014/main" id="{6F0DAFE7-CCB6-4178-A013-5AE8F9FCB35E}"/>
+                <a16:creationId xmlns:a16="http://schemas.microsoft.com/office/drawing/2014/main" id="{47100679-1DFF-4347-8418-07CDF3151FD2}"/>
               </a:ext>
             </a:extLst>
           </p:cNvPr>
@@ -3937,21 +4100,69 @@
           <a:lstStyle/>
           <a:p>
             <a:r>
-              <a:rPr lang="en-US" dirty="0"/>
-              <a:t>DO NOT REBASE COMMITS THAT EXIST OUTSIDE YOUR REPOSITORY (I.E. that have been pushed or pulled).</a:t>
-            </a:r>
-          </a:p>
-          <a:p>
-            <a:r>
-              <a:rPr lang="en-US" dirty="0"/>
-              <a:t>Do use rebase to clean your local history before pushing.</a:t>
-            </a:r>
-          </a:p>
-          <a:p>
-            <a:r>
-              <a:rPr lang="en-US" dirty="0"/>
-              <a:t>Rebase can also be used to combine, reorder, and remove commits.</a:t>
-            </a:r>
+              <a:rPr lang="en-US" sz="2800" dirty="0">
+                <a:latin typeface="Courier New" panose="02070309020205020404" pitchFamily="49" charset="0"/>
+                <a:cs typeface="Courier New" panose="02070309020205020404" pitchFamily="49" charset="0"/>
+              </a:rPr>
+              <a:t>git checkout -b feature # do work</a:t>
+            </a:r>
+          </a:p>
+          <a:p>
+            <a:r>
+              <a:rPr lang="en-US" dirty="0"/>
+              <a:t>(other commits happen on master we wish to incorporate into </a:t>
+            </a:r>
+            <a:r>
+              <a:rPr lang="en-US" sz="2800" dirty="0">
+                <a:latin typeface="Courier New" panose="02070309020205020404" pitchFamily="49" charset="0"/>
+                <a:cs typeface="Courier New" panose="02070309020205020404" pitchFamily="49" charset="0"/>
+              </a:rPr>
+              <a:t>feature</a:t>
+            </a:r>
+            <a:r>
+              <a:rPr lang="en-US" dirty="0">
+                <a:latin typeface="Courier New" panose="02070309020205020404" pitchFamily="49" charset="0"/>
+                <a:cs typeface="Courier New" panose="02070309020205020404" pitchFamily="49" charset="0"/>
+              </a:rPr>
+              <a:t> </a:t>
+            </a:r>
+            <a:r>
+              <a:rPr lang="en-US" dirty="0"/>
+              <a:t>before merging)</a:t>
+            </a:r>
+          </a:p>
+          <a:p>
+            <a:r>
+              <a:rPr lang="en-US" sz="2800" dirty="0">
+                <a:latin typeface="Courier New" panose="02070309020205020404" pitchFamily="49" charset="0"/>
+                <a:cs typeface="Courier New" panose="02070309020205020404" pitchFamily="49" charset="0"/>
+              </a:rPr>
+              <a:t>git rebase master feature</a:t>
+            </a:r>
+          </a:p>
+          <a:p>
+            <a:r>
+              <a:rPr lang="en-US" sz="2800" dirty="0">
+                <a:latin typeface="Courier New" panose="02070309020205020404" pitchFamily="49" charset="0"/>
+                <a:cs typeface="Courier New" panose="02070309020205020404" pitchFamily="49" charset="0"/>
+              </a:rPr>
+              <a:t>git checkout master</a:t>
+            </a:r>
+          </a:p>
+          <a:p>
+            <a:r>
+              <a:rPr lang="en-US" sz="2800" dirty="0">
+                <a:latin typeface="Courier New" panose="02070309020205020404" pitchFamily="49" charset="0"/>
+                <a:cs typeface="Courier New" panose="02070309020205020404" pitchFamily="49" charset="0"/>
+              </a:rPr>
+              <a:t>git merge feature # fast-forward</a:t>
+            </a:r>
+          </a:p>
+          <a:p>
+            <a:endParaRPr lang="en-US" dirty="0"/>
+          </a:p>
+          <a:p>
+            <a:endParaRPr lang="en-US" dirty="0"/>
           </a:p>
         </p:txBody>
       </p:sp>
@@ -3960,7 +4171,7 @@
           <p:cNvPr id="4" name="Slide Number Placeholder 3">
             <a:extLst>
               <a:ext uri="{FF2B5EF4-FFF2-40B4-BE49-F238E27FC236}">
-                <a16:creationId xmlns:a16="http://schemas.microsoft.com/office/drawing/2014/main" id="{CC8CDDDF-4816-40E4-9DB4-EBB2CFE635AB}"/>
+                <a16:creationId xmlns:a16="http://schemas.microsoft.com/office/drawing/2014/main" id="{183C977B-0681-45B8-BCD4-1078F81C8331}"/>
               </a:ext>
             </a:extLst>
           </p:cNvPr>
@@ -3988,7 +4199,7 @@
     </p:spTree>
     <p:extLst>
       <p:ext uri="{BB962C8B-B14F-4D97-AF65-F5344CB8AC3E}">
-        <p14:creationId xmlns:p14="http://schemas.microsoft.com/office/powerpoint/2010/main" val="90409000"/>
+        <p14:creationId xmlns:p14="http://schemas.microsoft.com/office/powerpoint/2010/main" val="2262711796"/>
       </p:ext>
     </p:extLst>
   </p:cSld>
@@ -4020,7 +4231,7 @@
           <p:cNvPr id="2" name="Title 1">
             <a:extLst>
               <a:ext uri="{FF2B5EF4-FFF2-40B4-BE49-F238E27FC236}">
-                <a16:creationId xmlns:a16="http://schemas.microsoft.com/office/drawing/2014/main" id="{C84527BE-33CE-45AD-A9D1-AC3F293BAD21}"/>
+                <a16:creationId xmlns:a16="http://schemas.microsoft.com/office/drawing/2014/main" id="{F9C3943F-347B-44DF-B888-F77466D4AB96}"/>
               </a:ext>
             </a:extLst>
           </p:cNvPr>
@@ -4038,7 +4249,7 @@
           <a:p>
             <a:r>
               <a:rPr lang="en-US" dirty="0"/>
-              <a:t>Exercise 4: Simple Rebase</a:t>
+              <a:t>Rebasing tips</a:t>
             </a:r>
           </a:p>
         </p:txBody>
@@ -4048,7 +4259,7 @@
           <p:cNvPr id="3" name="Content Placeholder 2">
             <a:extLst>
               <a:ext uri="{FF2B5EF4-FFF2-40B4-BE49-F238E27FC236}">
-                <a16:creationId xmlns:a16="http://schemas.microsoft.com/office/drawing/2014/main" id="{662F4B0B-B133-43A5-98CF-6ED5A64071E5}"/>
+                <a16:creationId xmlns:a16="http://schemas.microsoft.com/office/drawing/2014/main" id="{6F0DAFE7-CCB6-4178-A013-5AE8F9FCB35E}"/>
               </a:ext>
             </a:extLst>
           </p:cNvPr>
@@ -4061,113 +4272,24 @@
         </p:nvSpPr>
         <p:spPr/>
         <p:txBody>
-          <a:bodyPr>
-            <a:normAutofit/>
-          </a:bodyPr>
+          <a:bodyPr/>
           <a:lstStyle/>
           <a:p>
             <a:r>
-              <a:rPr lang="en-US" sz="2800" dirty="0"/>
-              <a:t>In any local repo, create and checkout a new branch called </a:t>
-            </a:r>
-            <a:r>
-              <a:rPr lang="en-US" sz="2400" dirty="0">
-                <a:latin typeface="Courier New" panose="02070309020205020404" pitchFamily="49" charset="0"/>
-                <a:cs typeface="Courier New" panose="02070309020205020404" pitchFamily="49" charset="0"/>
-              </a:rPr>
-              <a:t>feature</a:t>
-            </a:r>
-          </a:p>
-          <a:p>
-            <a:r>
-              <a:rPr lang="en-US" sz="2800" dirty="0"/>
-              <a:t>Create a file and commit to the </a:t>
-            </a:r>
-            <a:r>
-              <a:rPr lang="en-US" sz="2400" dirty="0">
-                <a:latin typeface="Courier New" panose="02070309020205020404" pitchFamily="49" charset="0"/>
-                <a:cs typeface="Courier New" panose="02070309020205020404" pitchFamily="49" charset="0"/>
-              </a:rPr>
-              <a:t>feature</a:t>
-            </a:r>
-            <a:r>
-              <a:rPr lang="en-US" sz="2800" dirty="0"/>
-              <a:t> branch.</a:t>
-            </a:r>
-          </a:p>
-          <a:p>
-            <a:r>
-              <a:rPr lang="en-US" sz="2800" dirty="0"/>
-              <a:t>Check out </a:t>
-            </a:r>
-            <a:r>
-              <a:rPr lang="en-US" sz="2400" dirty="0">
-                <a:latin typeface="Courier New" panose="02070309020205020404" pitchFamily="49" charset="0"/>
-                <a:cs typeface="Courier New" panose="02070309020205020404" pitchFamily="49" charset="0"/>
-              </a:rPr>
-              <a:t>master</a:t>
-            </a:r>
-            <a:r>
-              <a:rPr lang="en-US" sz="2800" dirty="0"/>
-              <a:t>, create another file, and commit.</a:t>
-            </a:r>
-          </a:p>
-          <a:p>
-            <a:r>
-              <a:rPr lang="en-US" sz="2800" dirty="0"/>
-              <a:t>Switch back to </a:t>
-            </a:r>
-            <a:r>
-              <a:rPr lang="en-US" sz="2400" dirty="0">
-                <a:latin typeface="Courier New" panose="02070309020205020404" pitchFamily="49" charset="0"/>
-                <a:cs typeface="Courier New" panose="02070309020205020404" pitchFamily="49" charset="0"/>
-              </a:rPr>
-              <a:t>feature</a:t>
-            </a:r>
-            <a:r>
-              <a:rPr lang="en-US" sz="2800" dirty="0"/>
-              <a:t> and rebase it onto </a:t>
-            </a:r>
-            <a:r>
-              <a:rPr lang="en-US" sz="2400" dirty="0">
-                <a:latin typeface="Courier New" panose="02070309020205020404" pitchFamily="49" charset="0"/>
-                <a:cs typeface="Courier New" panose="02070309020205020404" pitchFamily="49" charset="0"/>
-              </a:rPr>
-              <a:t>master (git rebase master feature)</a:t>
-            </a:r>
-          </a:p>
-          <a:p>
-            <a:r>
-              <a:rPr lang="en-US" sz="2800" dirty="0">
-                <a:cs typeface="Courier New" panose="02070309020205020404" pitchFamily="49" charset="0"/>
-              </a:rPr>
-              <a:t>Check out </a:t>
-            </a:r>
-            <a:r>
-              <a:rPr lang="en-US" sz="2400" dirty="0">
-                <a:latin typeface="Courier New" panose="02070309020205020404" pitchFamily="49" charset="0"/>
-                <a:cs typeface="Courier New" panose="02070309020205020404" pitchFamily="49" charset="0"/>
-              </a:rPr>
-              <a:t>master</a:t>
-            </a:r>
-            <a:r>
-              <a:rPr lang="en-US" sz="2800" dirty="0">
-                <a:cs typeface="Courier New" panose="02070309020205020404" pitchFamily="49" charset="0"/>
-              </a:rPr>
-              <a:t>, and merge the </a:t>
-            </a:r>
-            <a:r>
-              <a:rPr lang="en-US" sz="2400" dirty="0">
-                <a:latin typeface="Courier New" panose="02070309020205020404" pitchFamily="49" charset="0"/>
-                <a:cs typeface="Courier New" panose="02070309020205020404" pitchFamily="49" charset="0"/>
-              </a:rPr>
-              <a:t>feature</a:t>
-            </a:r>
-            <a:r>
-              <a:rPr lang="en-US" sz="2800" dirty="0">
-                <a:cs typeface="Courier New" panose="02070309020205020404" pitchFamily="49" charset="0"/>
-              </a:rPr>
-              <a:t> branch back in. Did git use a merge commit or did it fast-forward?</a:t>
+              <a:rPr lang="en-US" dirty="0"/>
+              <a:t>DO NOT REBASE COMMITS THAT EXIST OUTSIDE YOUR REPOSITORY (I.E. that have been pushed or pulled).</a:t>
+            </a:r>
+          </a:p>
+          <a:p>
+            <a:r>
+              <a:rPr lang="en-US" dirty="0"/>
+              <a:t>Do use rebase to clean your local history before pushing.</a:t>
+            </a:r>
+          </a:p>
+          <a:p>
+            <a:r>
+              <a:rPr lang="en-US" dirty="0"/>
+              <a:t>Rebase can also be used to combine, reorder, and remove commits.</a:t>
             </a:r>
           </a:p>
         </p:txBody>
@@ -4177,7 +4299,7 @@
           <p:cNvPr id="4" name="Slide Number Placeholder 3">
             <a:extLst>
               <a:ext uri="{FF2B5EF4-FFF2-40B4-BE49-F238E27FC236}">
-                <a16:creationId xmlns:a16="http://schemas.microsoft.com/office/drawing/2014/main" id="{7A4FE1F8-6E58-4B5B-AF4B-87DC156DC10B}"/>
+                <a16:creationId xmlns:a16="http://schemas.microsoft.com/office/drawing/2014/main" id="{CC8CDDDF-4816-40E4-9DB4-EBB2CFE635AB}"/>
               </a:ext>
             </a:extLst>
           </p:cNvPr>
@@ -4205,7 +4327,7 @@
     </p:spTree>
     <p:extLst>
       <p:ext uri="{BB962C8B-B14F-4D97-AF65-F5344CB8AC3E}">
-        <p14:creationId xmlns:p14="http://schemas.microsoft.com/office/powerpoint/2010/main" val="2122704316"/>
+        <p14:creationId xmlns:p14="http://schemas.microsoft.com/office/powerpoint/2010/main" val="90409000"/>
       </p:ext>
     </p:extLst>
   </p:cSld>
@@ -4237,7 +4359,7 @@
           <p:cNvPr id="2" name="Title 1">
             <a:extLst>
               <a:ext uri="{FF2B5EF4-FFF2-40B4-BE49-F238E27FC236}">
-                <a16:creationId xmlns:a16="http://schemas.microsoft.com/office/drawing/2014/main" id="{46A3E878-0ED3-41F4-AD91-DD16D0A43699}"/>
+                <a16:creationId xmlns:a16="http://schemas.microsoft.com/office/drawing/2014/main" id="{C84527BE-33CE-45AD-A9D1-AC3F293BAD21}"/>
               </a:ext>
             </a:extLst>
           </p:cNvPr>
@@ -4255,7 +4377,7 @@
           <a:p>
             <a:r>
               <a:rPr lang="en-US" dirty="0"/>
-              <a:t>Changing History</a:t>
+              <a:t>Exercise 4: Simple Rebase</a:t>
             </a:r>
           </a:p>
         </p:txBody>
@@ -4265,7 +4387,7 @@
           <p:cNvPr id="3" name="Content Placeholder 2">
             <a:extLst>
               <a:ext uri="{FF2B5EF4-FFF2-40B4-BE49-F238E27FC236}">
-                <a16:creationId xmlns:a16="http://schemas.microsoft.com/office/drawing/2014/main" id="{589952C0-10F3-4CCF-80B2-087D7A72EB8E}"/>
+                <a16:creationId xmlns:a16="http://schemas.microsoft.com/office/drawing/2014/main" id="{662F4B0B-B133-43A5-98CF-6ED5A64071E5}"/>
               </a:ext>
             </a:extLst>
           </p:cNvPr>
@@ -4278,91 +4400,113 @@
         </p:nvSpPr>
         <p:spPr/>
         <p:txBody>
-          <a:bodyPr/>
+          <a:bodyPr>
+            <a:normAutofit/>
+          </a:bodyPr>
           <a:lstStyle/>
           <a:p>
             <a:r>
-              <a:rPr lang="en-US" dirty="0"/>
-              <a:t>Sometimes you need to undo a previous commit.</a:t>
-            </a:r>
-          </a:p>
-          <a:p>
-            <a:r>
-              <a:rPr lang="en-US" sz="2800" dirty="0">
-                <a:solidFill>
-                  <a:srgbClr val="00B050"/>
-                </a:solidFill>
-                <a:latin typeface="Courier New" panose="02070309020205020404" pitchFamily="49" charset="0"/>
-                <a:cs typeface="Courier New" panose="02070309020205020404" pitchFamily="49" charset="0"/>
-              </a:rPr>
-              <a:t>git revert</a:t>
-            </a:r>
-            <a:r>
-              <a:rPr lang="en-US" dirty="0">
-                <a:solidFill>
-                  <a:srgbClr val="00B050"/>
-                </a:solidFill>
-              </a:rPr>
-              <a:t> creates commits that undo changes in previous commits.</a:t>
-            </a:r>
-          </a:p>
-          <a:p>
-            <a:r>
-              <a:rPr lang="en-US" sz="2800" dirty="0">
-                <a:solidFill>
-                  <a:srgbClr val="FF0000"/>
-                </a:solidFill>
-                <a:latin typeface="Courier New" panose="02070309020205020404" pitchFamily="49" charset="0"/>
-                <a:cs typeface="Courier New" panose="02070309020205020404" pitchFamily="49" charset="0"/>
-              </a:rPr>
-              <a:t>git rebase -</a:t>
-            </a:r>
-            <a:r>
-              <a:rPr lang="en-US" sz="2800" dirty="0" err="1">
-                <a:solidFill>
-                  <a:srgbClr val="FF0000"/>
-                </a:solidFill>
-                <a:latin typeface="Courier New" panose="02070309020205020404" pitchFamily="49" charset="0"/>
-                <a:cs typeface="Courier New" panose="02070309020205020404" pitchFamily="49" charset="0"/>
-              </a:rPr>
-              <a:t>i</a:t>
-            </a:r>
-            <a:r>
-              <a:rPr lang="en-US" dirty="0">
-                <a:solidFill>
-                  <a:srgbClr val="FF0000"/>
-                </a:solidFill>
-              </a:rPr>
-              <a:t> allows you to remove commits from your repository’s history.</a:t>
-            </a:r>
-          </a:p>
-          <a:p>
-            <a:pPr lvl="1"/>
-            <a:r>
-              <a:rPr lang="en-US" dirty="0"/>
-              <a:t>You must use the </a:t>
+              <a:rPr lang="en-US" sz="2800" dirty="0"/>
+              <a:t>In any local repo, create and checkout a new branch called </a:t>
             </a:r>
             <a:r>
               <a:rPr lang="en-US" sz="2400" dirty="0">
                 <a:latin typeface="Courier New" panose="02070309020205020404" pitchFamily="49" charset="0"/>
                 <a:cs typeface="Courier New" panose="02070309020205020404" pitchFamily="49" charset="0"/>
               </a:rPr>
-              <a:t>-f</a:t>
-            </a:r>
-            <a:r>
-              <a:rPr lang="en-US" dirty="0"/>
-              <a:t> (force) to push after removing commits with </a:t>
+              <a:t>feature</a:t>
+            </a:r>
+          </a:p>
+          <a:p>
+            <a:r>
+              <a:rPr lang="en-US" sz="2800" dirty="0"/>
+              <a:t>Create a file and commit to the </a:t>
             </a:r>
             <a:r>
               <a:rPr lang="en-US" sz="2400" dirty="0">
                 <a:latin typeface="Courier New" panose="02070309020205020404" pitchFamily="49" charset="0"/>
                 <a:cs typeface="Courier New" panose="02070309020205020404" pitchFamily="49" charset="0"/>
               </a:rPr>
-              <a:t>git rebase</a:t>
-            </a:r>
-            <a:r>
-              <a:rPr lang="en-US" dirty="0"/>
-              <a:t>. Be careful!</a:t>
+              <a:t>feature</a:t>
+            </a:r>
+            <a:r>
+              <a:rPr lang="en-US" sz="2800" dirty="0"/>
+              <a:t> branch.</a:t>
+            </a:r>
+          </a:p>
+          <a:p>
+            <a:r>
+              <a:rPr lang="en-US" sz="2800" dirty="0"/>
+              <a:t>Check out </a:t>
+            </a:r>
+            <a:r>
+              <a:rPr lang="en-US" sz="2400" dirty="0">
+                <a:latin typeface="Courier New" panose="02070309020205020404" pitchFamily="49" charset="0"/>
+                <a:cs typeface="Courier New" panose="02070309020205020404" pitchFamily="49" charset="0"/>
+              </a:rPr>
+              <a:t>master</a:t>
+            </a:r>
+            <a:r>
+              <a:rPr lang="en-US" sz="2800" dirty="0"/>
+              <a:t>, create another file, and commit.</a:t>
+            </a:r>
+          </a:p>
+          <a:p>
+            <a:r>
+              <a:rPr lang="en-US" sz="2800" dirty="0"/>
+              <a:t>Switch back to </a:t>
+            </a:r>
+            <a:r>
+              <a:rPr lang="en-US" sz="2400" dirty="0">
+                <a:latin typeface="Courier New" panose="02070309020205020404" pitchFamily="49" charset="0"/>
+                <a:cs typeface="Courier New" panose="02070309020205020404" pitchFamily="49" charset="0"/>
+              </a:rPr>
+              <a:t>feature</a:t>
+            </a:r>
+            <a:r>
+              <a:rPr lang="en-US" sz="2800" dirty="0"/>
+              <a:t> and rebase it onto </a:t>
+            </a:r>
+            <a:r>
+              <a:rPr lang="en-US" sz="2400" dirty="0">
+                <a:latin typeface="Courier New" panose="02070309020205020404" pitchFamily="49" charset="0"/>
+                <a:cs typeface="Courier New" panose="02070309020205020404" pitchFamily="49" charset="0"/>
+              </a:rPr>
+              <a:t>master (git rebase master feature)</a:t>
+            </a:r>
+          </a:p>
+          <a:p>
+            <a:r>
+              <a:rPr lang="en-US" sz="2800" dirty="0">
+                <a:cs typeface="Courier New" panose="02070309020205020404" pitchFamily="49" charset="0"/>
+              </a:rPr>
+              <a:t>Check out </a:t>
+            </a:r>
+            <a:r>
+              <a:rPr lang="en-US" sz="2400" dirty="0">
+                <a:latin typeface="Courier New" panose="02070309020205020404" pitchFamily="49" charset="0"/>
+                <a:cs typeface="Courier New" panose="02070309020205020404" pitchFamily="49" charset="0"/>
+              </a:rPr>
+              <a:t>master</a:t>
+            </a:r>
+            <a:r>
+              <a:rPr lang="en-US" sz="2800" dirty="0">
+                <a:cs typeface="Courier New" panose="02070309020205020404" pitchFamily="49" charset="0"/>
+              </a:rPr>
+              <a:t>, and merge the </a:t>
+            </a:r>
+            <a:r>
+              <a:rPr lang="en-US" sz="2400" dirty="0">
+                <a:latin typeface="Courier New" panose="02070309020205020404" pitchFamily="49" charset="0"/>
+                <a:cs typeface="Courier New" panose="02070309020205020404" pitchFamily="49" charset="0"/>
+              </a:rPr>
+              <a:t>feature</a:t>
+            </a:r>
+            <a:r>
+              <a:rPr lang="en-US" sz="2800" dirty="0">
+                <a:cs typeface="Courier New" panose="02070309020205020404" pitchFamily="49" charset="0"/>
+              </a:rPr>
+              <a:t> branch back in. Did git use a merge commit or did it fast-forward?</a:t>
             </a:r>
           </a:p>
         </p:txBody>
@@ -4372,7 +4516,7 @@
           <p:cNvPr id="4" name="Slide Number Placeholder 3">
             <a:extLst>
               <a:ext uri="{FF2B5EF4-FFF2-40B4-BE49-F238E27FC236}">
-                <a16:creationId xmlns:a16="http://schemas.microsoft.com/office/drawing/2014/main" id="{970EE2EA-A0C9-4C77-8773-FE14B7ADAEA4}"/>
+                <a16:creationId xmlns:a16="http://schemas.microsoft.com/office/drawing/2014/main" id="{7A4FE1F8-6E58-4B5B-AF4B-87DC156DC10B}"/>
               </a:ext>
             </a:extLst>
           </p:cNvPr>
@@ -4400,7 +4544,7 @@
     </p:spTree>
     <p:extLst>
       <p:ext uri="{BB962C8B-B14F-4D97-AF65-F5344CB8AC3E}">
-        <p14:creationId xmlns:p14="http://schemas.microsoft.com/office/powerpoint/2010/main" val="67268875"/>
+        <p14:creationId xmlns:p14="http://schemas.microsoft.com/office/powerpoint/2010/main" val="2122704316"/>
       </p:ext>
     </p:extLst>
   </p:cSld>
@@ -4432,7 +4576,7 @@
           <p:cNvPr id="2" name="Title 1">
             <a:extLst>
               <a:ext uri="{FF2B5EF4-FFF2-40B4-BE49-F238E27FC236}">
-                <a16:creationId xmlns:a16="http://schemas.microsoft.com/office/drawing/2014/main" id="{C84527BE-33CE-45AD-A9D1-AC3F293BAD21}"/>
+                <a16:creationId xmlns:a16="http://schemas.microsoft.com/office/drawing/2014/main" id="{46A3E878-0ED3-41F4-AD91-DD16D0A43699}"/>
               </a:ext>
             </a:extLst>
           </p:cNvPr>
@@ -4450,7 +4594,7 @@
           <a:p>
             <a:r>
               <a:rPr lang="en-US" dirty="0"/>
-              <a:t>Exercise 5: Removing Commits</a:t>
+              <a:t>Changing History</a:t>
             </a:r>
           </a:p>
         </p:txBody>
@@ -4460,7 +4604,7 @@
           <p:cNvPr id="3" name="Content Placeholder 2">
             <a:extLst>
               <a:ext uri="{FF2B5EF4-FFF2-40B4-BE49-F238E27FC236}">
-                <a16:creationId xmlns:a16="http://schemas.microsoft.com/office/drawing/2014/main" id="{662F4B0B-B133-43A5-98CF-6ED5A64071E5}"/>
+                <a16:creationId xmlns:a16="http://schemas.microsoft.com/office/drawing/2014/main" id="{589952C0-10F3-4CCF-80B2-087D7A72EB8E}"/>
               </a:ext>
             </a:extLst>
           </p:cNvPr>
@@ -4473,90 +4617,92 @@
         </p:nvSpPr>
         <p:spPr/>
         <p:txBody>
-          <a:bodyPr>
-            <a:normAutofit/>
-          </a:bodyPr>
+          <a:bodyPr/>
           <a:lstStyle/>
           <a:p>
             <a:r>
-              <a:rPr lang="en-US" sz="2800" dirty="0"/>
-              <a:t>In any local repo, create a file called “sensitive.txt” and commit.</a:t>
-            </a:r>
-            <a:endParaRPr lang="en-US" sz="2400" dirty="0">
-              <a:latin typeface="Courier New" panose="02070309020205020404" pitchFamily="49" charset="0"/>
-              <a:cs typeface="Courier New" panose="02070309020205020404" pitchFamily="49" charset="0"/>
-            </a:endParaRPr>
-          </a:p>
-          <a:p>
-            <a:r>
-              <a:rPr lang="en-US" sz="2800" dirty="0"/>
-              <a:t>Edit a different, non-sensitive file and commit again.</a:t>
-            </a:r>
-          </a:p>
-          <a:p>
-            <a:r>
-              <a:rPr lang="en-US" sz="2800" dirty="0"/>
-              <a:t>Use </a:t>
+              <a:rPr lang="en-US" dirty="0"/>
+              <a:t>Sometimes you need to undo a previous commit.</a:t>
+            </a:r>
+          </a:p>
+          <a:p>
+            <a:r>
+              <a:rPr lang="en-US" sz="2800" dirty="0">
+                <a:solidFill>
+                  <a:srgbClr val="00B050"/>
+                </a:solidFill>
+                <a:latin typeface="Courier New" panose="02070309020205020404" pitchFamily="49" charset="0"/>
+                <a:cs typeface="Courier New" panose="02070309020205020404" pitchFamily="49" charset="0"/>
+              </a:rPr>
+              <a:t>git revert</a:t>
+            </a:r>
+            <a:r>
+              <a:rPr lang="en-US" dirty="0">
+                <a:solidFill>
+                  <a:srgbClr val="00B050"/>
+                </a:solidFill>
+              </a:rPr>
+              <a:t> creates commits that undo changes in previous commits.</a:t>
+            </a:r>
+          </a:p>
+          <a:p>
+            <a:r>
+              <a:rPr lang="en-US" sz="2800" dirty="0">
+                <a:solidFill>
+                  <a:srgbClr val="FF0000"/>
+                </a:solidFill>
+                <a:latin typeface="Courier New" panose="02070309020205020404" pitchFamily="49" charset="0"/>
+                <a:cs typeface="Courier New" panose="02070309020205020404" pitchFamily="49" charset="0"/>
+              </a:rPr>
+              <a:t>git rebase -</a:t>
+            </a:r>
+            <a:r>
+              <a:rPr lang="en-US" sz="2800" dirty="0" err="1">
+                <a:solidFill>
+                  <a:srgbClr val="FF0000"/>
+                </a:solidFill>
+                <a:latin typeface="Courier New" panose="02070309020205020404" pitchFamily="49" charset="0"/>
+                <a:cs typeface="Courier New" panose="02070309020205020404" pitchFamily="49" charset="0"/>
+              </a:rPr>
+              <a:t>i</a:t>
+            </a:r>
+            <a:r>
+              <a:rPr lang="en-US" dirty="0">
+                <a:solidFill>
+                  <a:srgbClr val="FF0000"/>
+                </a:solidFill>
+              </a:rPr>
+              <a:t> allows you to remove commits from your repository’s history.</a:t>
+            </a:r>
+          </a:p>
+          <a:p>
+            <a:pPr lvl="1"/>
+            <a:r>
+              <a:rPr lang="en-US" dirty="0"/>
+              <a:t>You must use the </a:t>
             </a:r>
             <a:r>
               <a:rPr lang="en-US" sz="2400" dirty="0">
                 <a:latin typeface="Courier New" panose="02070309020205020404" pitchFamily="49" charset="0"/>
                 <a:cs typeface="Courier New" panose="02070309020205020404" pitchFamily="49" charset="0"/>
               </a:rPr>
-              <a:t>git rebase –</a:t>
-            </a:r>
-            <a:r>
-              <a:rPr lang="en-US" sz="2400" dirty="0" err="1">
-                <a:latin typeface="Courier New" panose="02070309020205020404" pitchFamily="49" charset="0"/>
-                <a:cs typeface="Courier New" panose="02070309020205020404" pitchFamily="49" charset="0"/>
-              </a:rPr>
-              <a:t>i</a:t>
-            </a:r>
-            <a:r>
-              <a:rPr lang="en-US" sz="2800" dirty="0"/>
-              <a:t> to remove the commit that created the file sensitive.txt.</a:t>
-            </a:r>
-          </a:p>
-          <a:p>
-            <a:r>
-              <a:rPr lang="en-US" sz="2800" dirty="0"/>
-              <a:t>Run </a:t>
+              <a:t>-f</a:t>
+            </a:r>
+            <a:r>
+              <a:rPr lang="en-US" dirty="0"/>
+              <a:t> (force) to push after removing commits with </a:t>
             </a:r>
             <a:r>
               <a:rPr lang="en-US" sz="2400" dirty="0">
                 <a:latin typeface="Courier New" panose="02070309020205020404" pitchFamily="49" charset="0"/>
                 <a:cs typeface="Courier New" panose="02070309020205020404" pitchFamily="49" charset="0"/>
               </a:rPr>
-              <a:t>git log --</a:t>
-            </a:r>
-            <a:r>
-              <a:rPr lang="en-US" sz="2400" dirty="0" err="1">
-                <a:latin typeface="Courier New" panose="02070309020205020404" pitchFamily="49" charset="0"/>
-                <a:cs typeface="Courier New" panose="02070309020205020404" pitchFamily="49" charset="0"/>
-              </a:rPr>
-              <a:t>oneline</a:t>
-            </a:r>
-            <a:r>
-              <a:rPr lang="en-US" sz="2400" dirty="0">
-                <a:latin typeface="Courier New" panose="02070309020205020404" pitchFamily="49" charset="0"/>
-                <a:cs typeface="Courier New" panose="02070309020205020404" pitchFamily="49" charset="0"/>
-              </a:rPr>
-              <a:t> --graph --all</a:t>
-            </a:r>
-            <a:r>
-              <a:rPr lang="en-US" sz="2800" dirty="0"/>
-              <a:t>. What happened to the first commit? Was the other file you edited affected by the rebase?</a:t>
-            </a:r>
-            <a:endParaRPr lang="en-US" sz="2400" dirty="0">
-              <a:latin typeface="Courier New" panose="02070309020205020404" pitchFamily="49" charset="0"/>
-              <a:cs typeface="Courier New" panose="02070309020205020404" pitchFamily="49" charset="0"/>
-            </a:endParaRPr>
-          </a:p>
-          <a:p>
-            <a:endParaRPr lang="en-US" sz="2400" dirty="0"/>
-          </a:p>
-          <a:p>
-            <a:endParaRPr lang="en-US" sz="2800" dirty="0"/>
+              <a:t>git rebase</a:t>
+            </a:r>
+            <a:r>
+              <a:rPr lang="en-US" dirty="0"/>
+              <a:t>. Be careful!</a:t>
+            </a:r>
           </a:p>
         </p:txBody>
       </p:sp>
@@ -4565,7 +4711,7 @@
           <p:cNvPr id="4" name="Slide Number Placeholder 3">
             <a:extLst>
               <a:ext uri="{FF2B5EF4-FFF2-40B4-BE49-F238E27FC236}">
-                <a16:creationId xmlns:a16="http://schemas.microsoft.com/office/drawing/2014/main" id="{7A4FE1F8-6E58-4B5B-AF4B-87DC156DC10B}"/>
+                <a16:creationId xmlns:a16="http://schemas.microsoft.com/office/drawing/2014/main" id="{970EE2EA-A0C9-4C77-8773-FE14B7ADAEA4}"/>
               </a:ext>
             </a:extLst>
           </p:cNvPr>
@@ -4593,7 +4739,7 @@
     </p:spTree>
     <p:extLst>
       <p:ext uri="{BB962C8B-B14F-4D97-AF65-F5344CB8AC3E}">
-        <p14:creationId xmlns:p14="http://schemas.microsoft.com/office/powerpoint/2010/main" val="2938286914"/>
+        <p14:creationId xmlns:p14="http://schemas.microsoft.com/office/powerpoint/2010/main" val="67268875"/>
       </p:ext>
     </p:extLst>
   </p:cSld>
@@ -4625,7 +4771,7 @@
           <p:cNvPr id="2" name="Title 1">
             <a:extLst>
               <a:ext uri="{FF2B5EF4-FFF2-40B4-BE49-F238E27FC236}">
-                <a16:creationId xmlns:a16="http://schemas.microsoft.com/office/drawing/2014/main" id="{C40DF9F4-C919-4360-B857-0E492E77FA23}"/>
+                <a16:creationId xmlns:a16="http://schemas.microsoft.com/office/drawing/2014/main" id="{C84527BE-33CE-45AD-A9D1-AC3F293BAD21}"/>
               </a:ext>
             </a:extLst>
           </p:cNvPr>
@@ -4643,7 +4789,7 @@
           <a:p>
             <a:r>
               <a:rPr lang="en-US" dirty="0"/>
-              <a:t>GitHub Issues</a:t>
+              <a:t>Exercise 5: Removing Commits</a:t>
             </a:r>
           </a:p>
         </p:txBody>
@@ -4653,7 +4799,7 @@
           <p:cNvPr id="3" name="Content Placeholder 2">
             <a:extLst>
               <a:ext uri="{FF2B5EF4-FFF2-40B4-BE49-F238E27FC236}">
-                <a16:creationId xmlns:a16="http://schemas.microsoft.com/office/drawing/2014/main" id="{B0392339-BC20-4DEC-A3B5-468ACCC45CD4}"/>
+                <a16:creationId xmlns:a16="http://schemas.microsoft.com/office/drawing/2014/main" id="{662F4B0B-B133-43A5-98CF-6ED5A64071E5}"/>
               </a:ext>
             </a:extLst>
           </p:cNvPr>
@@ -4666,25 +4812,90 @@
         </p:nvSpPr>
         <p:spPr/>
         <p:txBody>
-          <a:bodyPr/>
+          <a:bodyPr>
+            <a:normAutofit/>
+          </a:bodyPr>
           <a:lstStyle/>
           <a:p>
             <a:r>
-              <a:rPr lang="en-US" dirty="0"/>
-              <a:t>Issues in GitHub are a place to discuss problems, bugs, feature proposals, etc.</a:t>
-            </a:r>
-          </a:p>
-          <a:p>
-            <a:r>
-              <a:rPr lang="en-US" dirty="0"/>
-              <a:t>They can have assignees (people responsible for fixing) and labels (“bug”, “enhancement”, “help wanted”, etc.)</a:t>
-            </a:r>
-          </a:p>
-          <a:p>
-            <a:r>
-              <a:rPr lang="en-US" dirty="0"/>
-              <a:t>Many other GitHub features integrate with Issues.</a:t>
-            </a:r>
+              <a:rPr lang="en-US" sz="2800" dirty="0"/>
+              <a:t>In any local repo, create a file called “sensitive.txt” and commit.</a:t>
+            </a:r>
+            <a:endParaRPr lang="en-US" sz="2400" dirty="0">
+              <a:latin typeface="Courier New" panose="02070309020205020404" pitchFamily="49" charset="0"/>
+              <a:cs typeface="Courier New" panose="02070309020205020404" pitchFamily="49" charset="0"/>
+            </a:endParaRPr>
+          </a:p>
+          <a:p>
+            <a:r>
+              <a:rPr lang="en-US" sz="2800" dirty="0"/>
+              <a:t>Edit a different, non-sensitive file and commit again.</a:t>
+            </a:r>
+          </a:p>
+          <a:p>
+            <a:r>
+              <a:rPr lang="en-US" sz="2800" dirty="0"/>
+              <a:t>Use </a:t>
+            </a:r>
+            <a:r>
+              <a:rPr lang="en-US" sz="2400" dirty="0">
+                <a:latin typeface="Courier New" panose="02070309020205020404" pitchFamily="49" charset="0"/>
+                <a:cs typeface="Courier New" panose="02070309020205020404" pitchFamily="49" charset="0"/>
+              </a:rPr>
+              <a:t>git rebase –</a:t>
+            </a:r>
+            <a:r>
+              <a:rPr lang="en-US" sz="2400" dirty="0" err="1">
+                <a:latin typeface="Courier New" panose="02070309020205020404" pitchFamily="49" charset="0"/>
+                <a:cs typeface="Courier New" panose="02070309020205020404" pitchFamily="49" charset="0"/>
+              </a:rPr>
+              <a:t>i</a:t>
+            </a:r>
+            <a:r>
+              <a:rPr lang="en-US" sz="2800" dirty="0"/>
+              <a:t> to remove the commit that created the file sensitive.txt.</a:t>
+            </a:r>
+          </a:p>
+          <a:p>
+            <a:r>
+              <a:rPr lang="en-US" sz="2800" dirty="0"/>
+              <a:t>Run </a:t>
+            </a:r>
+            <a:r>
+              <a:rPr lang="en-US" sz="2400" dirty="0">
+                <a:latin typeface="Courier New" panose="02070309020205020404" pitchFamily="49" charset="0"/>
+                <a:cs typeface="Courier New" panose="02070309020205020404" pitchFamily="49" charset="0"/>
+              </a:rPr>
+              <a:t>git log --</a:t>
+            </a:r>
+            <a:r>
+              <a:rPr lang="en-US" sz="2400" dirty="0" err="1">
+                <a:latin typeface="Courier New" panose="02070309020205020404" pitchFamily="49" charset="0"/>
+                <a:cs typeface="Courier New" panose="02070309020205020404" pitchFamily="49" charset="0"/>
+              </a:rPr>
+              <a:t>oneline</a:t>
+            </a:r>
+            <a:r>
+              <a:rPr lang="en-US" sz="2400" dirty="0">
+                <a:latin typeface="Courier New" panose="02070309020205020404" pitchFamily="49" charset="0"/>
+                <a:cs typeface="Courier New" panose="02070309020205020404" pitchFamily="49" charset="0"/>
+              </a:rPr>
+              <a:t> --graph --all</a:t>
+            </a:r>
+            <a:r>
+              <a:rPr lang="en-US" sz="2800" dirty="0"/>
+              <a:t>. What happened to the first commit? Was the other file you edited affected by the rebase?</a:t>
+            </a:r>
+            <a:endParaRPr lang="en-US" sz="2400" dirty="0">
+              <a:latin typeface="Courier New" panose="02070309020205020404" pitchFamily="49" charset="0"/>
+              <a:cs typeface="Courier New" panose="02070309020205020404" pitchFamily="49" charset="0"/>
+            </a:endParaRPr>
+          </a:p>
+          <a:p>
+            <a:endParaRPr lang="en-US" sz="2400" dirty="0"/>
+          </a:p>
+          <a:p>
+            <a:endParaRPr lang="en-US" sz="2800" dirty="0"/>
           </a:p>
         </p:txBody>
       </p:sp>
@@ -4693,7 +4904,7 @@
           <p:cNvPr id="4" name="Slide Number Placeholder 3">
             <a:extLst>
               <a:ext uri="{FF2B5EF4-FFF2-40B4-BE49-F238E27FC236}">
-                <a16:creationId xmlns:a16="http://schemas.microsoft.com/office/drawing/2014/main" id="{56941E58-D72E-44EF-A0B1-97F28E9EF960}"/>
+                <a16:creationId xmlns:a16="http://schemas.microsoft.com/office/drawing/2014/main" id="{7A4FE1F8-6E58-4B5B-AF4B-87DC156DC10B}"/>
               </a:ext>
             </a:extLst>
           </p:cNvPr>
@@ -4721,7 +4932,7 @@
     </p:spTree>
     <p:extLst>
       <p:ext uri="{BB962C8B-B14F-4D97-AF65-F5344CB8AC3E}">
-        <p14:creationId xmlns:p14="http://schemas.microsoft.com/office/powerpoint/2010/main" val="2067495763"/>
+        <p14:creationId xmlns:p14="http://schemas.microsoft.com/office/powerpoint/2010/main" val="2938286914"/>
       </p:ext>
     </p:extLst>
   </p:cSld>
@@ -4750,6 +4961,970 @@
       </p:grpSpPr>
       <p:sp>
         <p:nvSpPr>
+          <p:cNvPr id="2" name="Title 1"/>
+          <p:cNvSpPr>
+            <a:spLocks noGrp="1"/>
+          </p:cNvSpPr>
+          <p:nvPr>
+            <p:ph type="title"/>
+          </p:nvPr>
+        </p:nvSpPr>
+        <p:spPr>
+          <a:xfrm>
+            <a:off x="0" y="2056080"/>
+            <a:ext cx="9144000" cy="2738880"/>
+          </a:xfrm>
+        </p:spPr>
+        <p:txBody>
+          <a:bodyPr>
+            <a:normAutofit/>
+          </a:bodyPr>
+          <a:lstStyle/>
+          <a:p>
+            <a:r>
+              <a:rPr lang="en-US" sz="2800" dirty="0"/>
+              <a:t>Slides, links, and exercises:</a:t>
+            </a:r>
+            <a:br>
+              <a:rPr lang="en-US" sz="2800" dirty="0"/>
+            </a:br>
+            <a:br>
+              <a:rPr lang="en-US" sz="2800" dirty="0"/>
+            </a:br>
+            <a:r>
+              <a:rPr lang="en-US" sz="2800" dirty="0"/>
+              <a:t>https://github.com/nuitrcs/intermediate-git-workshop</a:t>
+            </a:r>
+          </a:p>
+        </p:txBody>
+      </p:sp>
+    </p:spTree>
+    <p:extLst>
+      <p:ext uri="{BB962C8B-B14F-4D97-AF65-F5344CB8AC3E}">
+        <p14:creationId xmlns:p14="http://schemas.microsoft.com/office/powerpoint/2010/main" val="381686776"/>
+      </p:ext>
+    </p:extLst>
+  </p:cSld>
+  <p:clrMapOvr>
+    <a:masterClrMapping/>
+  </p:clrMapOvr>
+</p:sld>
+</file>
+
+<file path=ppt/slides/slide20.xml><?xml version="1.0" encoding="utf-8"?>
+<p:sld xmlns:a="http://schemas.openxmlformats.org/drawingml/2006/main" xmlns:r="http://schemas.openxmlformats.org/officeDocument/2006/relationships" xmlns:p="http://schemas.openxmlformats.org/presentationml/2006/main">
+  <p:cSld>
+    <p:spTree>
+      <p:nvGrpSpPr>
+        <p:cNvPr id="1" name=""/>
+        <p:cNvGrpSpPr/>
+        <p:nvPr/>
+      </p:nvGrpSpPr>
+      <p:grpSpPr>
+        <a:xfrm>
+          <a:off x="0" y="0"/>
+          <a:ext cx="0" cy="0"/>
+          <a:chOff x="0" y="0"/>
+          <a:chExt cx="0" cy="0"/>
+        </a:xfrm>
+      </p:grpSpPr>
+      <p:sp>
+        <p:nvSpPr>
+          <p:cNvPr id="2" name="Title 1">
+            <a:extLst>
+              <a:ext uri="{FF2B5EF4-FFF2-40B4-BE49-F238E27FC236}">
+                <a16:creationId xmlns:a16="http://schemas.microsoft.com/office/drawing/2014/main" id="{C40DF9F4-C919-4360-B857-0E492E77FA23}"/>
+              </a:ext>
+            </a:extLst>
+          </p:cNvPr>
+          <p:cNvSpPr>
+            <a:spLocks noGrp="1"/>
+          </p:cNvSpPr>
+          <p:nvPr>
+            <p:ph type="title"/>
+          </p:nvPr>
+        </p:nvSpPr>
+        <p:spPr/>
+        <p:txBody>
+          <a:bodyPr/>
+          <a:lstStyle/>
+          <a:p>
+            <a:r>
+              <a:rPr lang="en-US" dirty="0"/>
+              <a:t>GitHub Issues</a:t>
+            </a:r>
+          </a:p>
+        </p:txBody>
+      </p:sp>
+      <p:sp>
+        <p:nvSpPr>
+          <p:cNvPr id="3" name="Content Placeholder 2">
+            <a:extLst>
+              <a:ext uri="{FF2B5EF4-FFF2-40B4-BE49-F238E27FC236}">
+                <a16:creationId xmlns:a16="http://schemas.microsoft.com/office/drawing/2014/main" id="{B0392339-BC20-4DEC-A3B5-468ACCC45CD4}"/>
+              </a:ext>
+            </a:extLst>
+          </p:cNvPr>
+          <p:cNvSpPr>
+            <a:spLocks noGrp="1"/>
+          </p:cNvSpPr>
+          <p:nvPr>
+            <p:ph idx="1"/>
+          </p:nvPr>
+        </p:nvSpPr>
+        <p:spPr/>
+        <p:txBody>
+          <a:bodyPr/>
+          <a:lstStyle/>
+          <a:p>
+            <a:r>
+              <a:rPr lang="en-US" dirty="0"/>
+              <a:t>Issues in GitHub are a place to discuss problems, bugs, feature proposals, etc.</a:t>
+            </a:r>
+          </a:p>
+          <a:p>
+            <a:r>
+              <a:rPr lang="en-US" dirty="0"/>
+              <a:t>They can have assignees (people responsible for fixing) and labels (“bug”, “enhancement”, “help wanted”, etc.)</a:t>
+            </a:r>
+          </a:p>
+          <a:p>
+            <a:r>
+              <a:rPr lang="en-US" dirty="0"/>
+              <a:t>Many other GitHub features integrate with Issues.</a:t>
+            </a:r>
+          </a:p>
+        </p:txBody>
+      </p:sp>
+      <p:sp>
+        <p:nvSpPr>
+          <p:cNvPr id="4" name="Slide Number Placeholder 3">
+            <a:extLst>
+              <a:ext uri="{FF2B5EF4-FFF2-40B4-BE49-F238E27FC236}">
+                <a16:creationId xmlns:a16="http://schemas.microsoft.com/office/drawing/2014/main" id="{56941E58-D72E-44EF-A0B1-97F28E9EF960}"/>
+              </a:ext>
+            </a:extLst>
+          </p:cNvPr>
+          <p:cNvSpPr>
+            <a:spLocks noGrp="1"/>
+          </p:cNvSpPr>
+          <p:nvPr>
+            <p:ph type="sldNum" sz="quarter" idx="12"/>
+          </p:nvPr>
+        </p:nvSpPr>
+        <p:spPr/>
+        <p:txBody>
+          <a:bodyPr/>
+          <a:lstStyle/>
+          <a:p>
+            <a:fld id="{106E12CD-FCB1-464E-A775-0B83FDDACE03}" type="slidenum">
+              <a:rPr lang="en-US" smtClean="0"/>
+              <a:pPr/>
+              <a:t>19</a:t>
+            </a:fld>
+            <a:endParaRPr lang="en-US"/>
+          </a:p>
+        </p:txBody>
+      </p:sp>
+    </p:spTree>
+    <p:extLst>
+      <p:ext uri="{BB962C8B-B14F-4D97-AF65-F5344CB8AC3E}">
+        <p14:creationId xmlns:p14="http://schemas.microsoft.com/office/powerpoint/2010/main" val="2067495763"/>
+      </p:ext>
+    </p:extLst>
+  </p:cSld>
+  <p:clrMapOvr>
+    <a:masterClrMapping/>
+  </p:clrMapOvr>
+</p:sld>
+</file>
+
+<file path=ppt/slides/slide21.xml><?xml version="1.0" encoding="utf-8"?>
+<p:sld xmlns:a="http://schemas.openxmlformats.org/drawingml/2006/main" xmlns:r="http://schemas.openxmlformats.org/officeDocument/2006/relationships" xmlns:p="http://schemas.openxmlformats.org/presentationml/2006/main">
+  <p:cSld>
+    <p:spTree>
+      <p:nvGrpSpPr>
+        <p:cNvPr id="1" name=""/>
+        <p:cNvGrpSpPr/>
+        <p:nvPr/>
+      </p:nvGrpSpPr>
+      <p:grpSpPr>
+        <a:xfrm>
+          <a:off x="0" y="0"/>
+          <a:ext cx="0" cy="0"/>
+          <a:chOff x="0" y="0"/>
+          <a:chExt cx="0" cy="0"/>
+        </a:xfrm>
+      </p:grpSpPr>
+      <p:sp>
+        <p:nvSpPr>
+          <p:cNvPr id="2" name="Title 1">
+            <a:extLst>
+              <a:ext uri="{FF2B5EF4-FFF2-40B4-BE49-F238E27FC236}">
+                <a16:creationId xmlns:a16="http://schemas.microsoft.com/office/drawing/2014/main" id="{C84527BE-33CE-45AD-A9D1-AC3F293BAD21}"/>
+              </a:ext>
+            </a:extLst>
+          </p:cNvPr>
+          <p:cNvSpPr>
+            <a:spLocks noGrp="1"/>
+          </p:cNvSpPr>
+          <p:nvPr>
+            <p:ph type="title"/>
+          </p:nvPr>
+        </p:nvSpPr>
+        <p:spPr/>
+        <p:txBody>
+          <a:bodyPr/>
+          <a:lstStyle/>
+          <a:p>
+            <a:r>
+              <a:rPr lang="en-US" dirty="0"/>
+              <a:t>Exercise 6: GitHub Issues</a:t>
+            </a:r>
+          </a:p>
+        </p:txBody>
+      </p:sp>
+      <p:sp>
+        <p:nvSpPr>
+          <p:cNvPr id="3" name="Content Placeholder 2">
+            <a:extLst>
+              <a:ext uri="{FF2B5EF4-FFF2-40B4-BE49-F238E27FC236}">
+                <a16:creationId xmlns:a16="http://schemas.microsoft.com/office/drawing/2014/main" id="{662F4B0B-B133-43A5-98CF-6ED5A64071E5}"/>
+              </a:ext>
+            </a:extLst>
+          </p:cNvPr>
+          <p:cNvSpPr>
+            <a:spLocks noGrp="1"/>
+          </p:cNvSpPr>
+          <p:nvPr>
+            <p:ph idx="1"/>
+          </p:nvPr>
+        </p:nvSpPr>
+        <p:spPr/>
+        <p:txBody>
+          <a:bodyPr>
+            <a:normAutofit lnSpcReduction="10000"/>
+          </a:bodyPr>
+          <a:lstStyle/>
+          <a:p>
+            <a:r>
+              <a:rPr lang="en-US" sz="2800" dirty="0"/>
+              <a:t>In a GitHub repository you own, create an issue and assign it to yourself. Copy the issue number.</a:t>
+            </a:r>
+            <a:endParaRPr lang="en-US" sz="2400" dirty="0">
+              <a:latin typeface="Courier New" panose="02070309020205020404" pitchFamily="49" charset="0"/>
+              <a:cs typeface="Courier New" panose="02070309020205020404" pitchFamily="49" charset="0"/>
+            </a:endParaRPr>
+          </a:p>
+          <a:p>
+            <a:r>
+              <a:rPr lang="en-US" sz="2800" dirty="0"/>
+              <a:t>Clone the repository locally (if you haven’t already) and create a branch for your issue.</a:t>
+            </a:r>
+          </a:p>
+          <a:p>
+            <a:r>
+              <a:rPr lang="en-US" sz="2800" dirty="0"/>
+              <a:t>Create a commit on that branch, and include “Closes #&lt;issue number&gt;” in the commit message. (e.g. “Closes #1”)</a:t>
+            </a:r>
+          </a:p>
+          <a:p>
+            <a:r>
+              <a:rPr lang="en-US" sz="2800" dirty="0"/>
+              <a:t>Check out </a:t>
+            </a:r>
+            <a:r>
+              <a:rPr lang="en-US" sz="2400" dirty="0">
+                <a:latin typeface="Courier New" panose="02070309020205020404" pitchFamily="49" charset="0"/>
+                <a:cs typeface="Courier New" panose="02070309020205020404" pitchFamily="49" charset="0"/>
+              </a:rPr>
+              <a:t>master</a:t>
+            </a:r>
+            <a:r>
+              <a:rPr lang="en-US" sz="2800" dirty="0"/>
+              <a:t> and merge in your issue branch, then push.</a:t>
+            </a:r>
+          </a:p>
+          <a:p>
+            <a:r>
+              <a:rPr lang="en-US" sz="2800" dirty="0">
+                <a:cs typeface="Courier New" panose="02070309020205020404" pitchFamily="49" charset="0"/>
+              </a:rPr>
+              <a:t>Check the issue in GitHub. Did anything change?</a:t>
+            </a:r>
+            <a:endParaRPr lang="en-US" sz="2400" dirty="0">
+              <a:cs typeface="Courier New" panose="02070309020205020404" pitchFamily="49" charset="0"/>
+            </a:endParaRPr>
+          </a:p>
+          <a:p>
+            <a:endParaRPr lang="en-US" sz="2400" dirty="0"/>
+          </a:p>
+          <a:p>
+            <a:endParaRPr lang="en-US" sz="2800" dirty="0"/>
+          </a:p>
+        </p:txBody>
+      </p:sp>
+      <p:sp>
+        <p:nvSpPr>
+          <p:cNvPr id="4" name="Slide Number Placeholder 3">
+            <a:extLst>
+              <a:ext uri="{FF2B5EF4-FFF2-40B4-BE49-F238E27FC236}">
+                <a16:creationId xmlns:a16="http://schemas.microsoft.com/office/drawing/2014/main" id="{7A4FE1F8-6E58-4B5B-AF4B-87DC156DC10B}"/>
+              </a:ext>
+            </a:extLst>
+          </p:cNvPr>
+          <p:cNvSpPr>
+            <a:spLocks noGrp="1"/>
+          </p:cNvSpPr>
+          <p:nvPr>
+            <p:ph type="sldNum" sz="quarter" idx="12"/>
+          </p:nvPr>
+        </p:nvSpPr>
+        <p:spPr/>
+        <p:txBody>
+          <a:bodyPr/>
+          <a:lstStyle/>
+          <a:p>
+            <a:fld id="{106E12CD-FCB1-464E-A775-0B83FDDACE03}" type="slidenum">
+              <a:rPr lang="en-US" smtClean="0"/>
+              <a:pPr/>
+              <a:t>20</a:t>
+            </a:fld>
+            <a:endParaRPr lang="en-US"/>
+          </a:p>
+        </p:txBody>
+      </p:sp>
+    </p:spTree>
+    <p:extLst>
+      <p:ext uri="{BB962C8B-B14F-4D97-AF65-F5344CB8AC3E}">
+        <p14:creationId xmlns:p14="http://schemas.microsoft.com/office/powerpoint/2010/main" val="3070136670"/>
+      </p:ext>
+    </p:extLst>
+  </p:cSld>
+  <p:clrMapOvr>
+    <a:masterClrMapping/>
+  </p:clrMapOvr>
+</p:sld>
+</file>
+
+<file path=ppt/slides/slide22.xml><?xml version="1.0" encoding="utf-8"?>
+<p:sld xmlns:a="http://schemas.openxmlformats.org/drawingml/2006/main" xmlns:r="http://schemas.openxmlformats.org/officeDocument/2006/relationships" xmlns:p="http://schemas.openxmlformats.org/presentationml/2006/main">
+  <p:cSld>
+    <p:spTree>
+      <p:nvGrpSpPr>
+        <p:cNvPr id="1" name=""/>
+        <p:cNvGrpSpPr/>
+        <p:nvPr/>
+      </p:nvGrpSpPr>
+      <p:grpSpPr>
+        <a:xfrm>
+          <a:off x="0" y="0"/>
+          <a:ext cx="0" cy="0"/>
+          <a:chOff x="0" y="0"/>
+          <a:chExt cx="0" cy="0"/>
+        </a:xfrm>
+      </p:grpSpPr>
+      <p:sp>
+        <p:nvSpPr>
+          <p:cNvPr id="2" name="Title 1">
+            <a:extLst>
+              <a:ext uri="{FF2B5EF4-FFF2-40B4-BE49-F238E27FC236}">
+                <a16:creationId xmlns:a16="http://schemas.microsoft.com/office/drawing/2014/main" id="{10D811A8-B810-4455-B0FC-ABFEF7BC021F}"/>
+              </a:ext>
+            </a:extLst>
+          </p:cNvPr>
+          <p:cNvSpPr>
+            <a:spLocks noGrp="1"/>
+          </p:cNvSpPr>
+          <p:nvPr>
+            <p:ph type="title"/>
+          </p:nvPr>
+        </p:nvSpPr>
+        <p:spPr/>
+        <p:txBody>
+          <a:bodyPr/>
+          <a:lstStyle/>
+          <a:p>
+            <a:r>
+              <a:rPr lang="en-US" dirty="0"/>
+              <a:t>GitHub Forks</a:t>
+            </a:r>
+          </a:p>
+        </p:txBody>
+      </p:sp>
+      <p:sp>
+        <p:nvSpPr>
+          <p:cNvPr id="3" name="Content Placeholder 2">
+            <a:extLst>
+              <a:ext uri="{FF2B5EF4-FFF2-40B4-BE49-F238E27FC236}">
+                <a16:creationId xmlns:a16="http://schemas.microsoft.com/office/drawing/2014/main" id="{721E01CD-06A0-4FE6-BD7B-FE233F59E2B6}"/>
+              </a:ext>
+            </a:extLst>
+          </p:cNvPr>
+          <p:cNvSpPr>
+            <a:spLocks noGrp="1"/>
+          </p:cNvSpPr>
+          <p:nvPr>
+            <p:ph idx="1"/>
+          </p:nvPr>
+        </p:nvSpPr>
+        <p:spPr/>
+        <p:txBody>
+          <a:bodyPr/>
+          <a:lstStyle/>
+          <a:p>
+            <a:r>
+              <a:rPr lang="en-US" dirty="0"/>
+              <a:t>A Fork in GitHub is a repository that is a copy of an “upstream” repository, and can track changes in the upstream repository.</a:t>
+            </a:r>
+          </a:p>
+          <a:p>
+            <a:r>
+              <a:rPr lang="en-US" dirty="0"/>
+              <a:t>Useful for contributing to large projects, or making your own customizations to a project.</a:t>
+            </a:r>
+          </a:p>
+        </p:txBody>
+      </p:sp>
+      <p:sp>
+        <p:nvSpPr>
+          <p:cNvPr id="4" name="Slide Number Placeholder 3">
+            <a:extLst>
+              <a:ext uri="{FF2B5EF4-FFF2-40B4-BE49-F238E27FC236}">
+                <a16:creationId xmlns:a16="http://schemas.microsoft.com/office/drawing/2014/main" id="{E1F161B3-354D-4A70-BD86-8DBD5CF43F8B}"/>
+              </a:ext>
+            </a:extLst>
+          </p:cNvPr>
+          <p:cNvSpPr>
+            <a:spLocks noGrp="1"/>
+          </p:cNvSpPr>
+          <p:nvPr>
+            <p:ph type="sldNum" sz="quarter" idx="12"/>
+          </p:nvPr>
+        </p:nvSpPr>
+        <p:spPr/>
+        <p:txBody>
+          <a:bodyPr/>
+          <a:lstStyle/>
+          <a:p>
+            <a:fld id="{106E12CD-FCB1-464E-A775-0B83FDDACE03}" type="slidenum">
+              <a:rPr lang="en-US" smtClean="0"/>
+              <a:pPr/>
+              <a:t>21</a:t>
+            </a:fld>
+            <a:endParaRPr lang="en-US"/>
+          </a:p>
+        </p:txBody>
+      </p:sp>
+    </p:spTree>
+    <p:extLst>
+      <p:ext uri="{BB962C8B-B14F-4D97-AF65-F5344CB8AC3E}">
+        <p14:creationId xmlns:p14="http://schemas.microsoft.com/office/powerpoint/2010/main" val="985377529"/>
+      </p:ext>
+    </p:extLst>
+  </p:cSld>
+  <p:clrMapOvr>
+    <a:masterClrMapping/>
+  </p:clrMapOvr>
+</p:sld>
+</file>
+
+<file path=ppt/slides/slide23.xml><?xml version="1.0" encoding="utf-8"?>
+<p:sld xmlns:a="http://schemas.openxmlformats.org/drawingml/2006/main" xmlns:r="http://schemas.openxmlformats.org/officeDocument/2006/relationships" xmlns:p="http://schemas.openxmlformats.org/presentationml/2006/main">
+  <p:cSld>
+    <p:spTree>
+      <p:nvGrpSpPr>
+        <p:cNvPr id="1" name=""/>
+        <p:cNvGrpSpPr/>
+        <p:nvPr/>
+      </p:nvGrpSpPr>
+      <p:grpSpPr>
+        <a:xfrm>
+          <a:off x="0" y="0"/>
+          <a:ext cx="0" cy="0"/>
+          <a:chOff x="0" y="0"/>
+          <a:chExt cx="0" cy="0"/>
+        </a:xfrm>
+      </p:grpSpPr>
+      <p:sp>
+        <p:nvSpPr>
+          <p:cNvPr id="2" name="Title 1">
+            <a:extLst>
+              <a:ext uri="{FF2B5EF4-FFF2-40B4-BE49-F238E27FC236}">
+                <a16:creationId xmlns:a16="http://schemas.microsoft.com/office/drawing/2014/main" id="{C84527BE-33CE-45AD-A9D1-AC3F293BAD21}"/>
+              </a:ext>
+            </a:extLst>
+          </p:cNvPr>
+          <p:cNvSpPr>
+            <a:spLocks noGrp="1"/>
+          </p:cNvSpPr>
+          <p:nvPr>
+            <p:ph type="title"/>
+          </p:nvPr>
+        </p:nvSpPr>
+        <p:spPr/>
+        <p:txBody>
+          <a:bodyPr/>
+          <a:lstStyle/>
+          <a:p>
+            <a:r>
+              <a:rPr lang="en-US" dirty="0"/>
+              <a:t>Exercise 7: GitHub Forks</a:t>
+            </a:r>
+          </a:p>
+        </p:txBody>
+      </p:sp>
+      <p:sp>
+        <p:nvSpPr>
+          <p:cNvPr id="3" name="Content Placeholder 2">
+            <a:extLst>
+              <a:ext uri="{FF2B5EF4-FFF2-40B4-BE49-F238E27FC236}">
+                <a16:creationId xmlns:a16="http://schemas.microsoft.com/office/drawing/2014/main" id="{662F4B0B-B133-43A5-98CF-6ED5A64071E5}"/>
+              </a:ext>
+            </a:extLst>
+          </p:cNvPr>
+          <p:cNvSpPr>
+            <a:spLocks noGrp="1"/>
+          </p:cNvSpPr>
+          <p:nvPr>
+            <p:ph idx="1"/>
+          </p:nvPr>
+        </p:nvSpPr>
+        <p:spPr/>
+        <p:txBody>
+          <a:bodyPr>
+            <a:normAutofit lnSpcReduction="10000"/>
+          </a:bodyPr>
+          <a:lstStyle/>
+          <a:p>
+            <a:r>
+              <a:rPr lang="en-US" sz="2800" dirty="0"/>
+              <a:t>Create a fork of </a:t>
+            </a:r>
+            <a:r>
+              <a:rPr lang="en-US" sz="2400" dirty="0" err="1">
+                <a:latin typeface="Courier New" panose="02070309020205020404" pitchFamily="49" charset="0"/>
+                <a:cs typeface="Courier New" panose="02070309020205020404" pitchFamily="49" charset="0"/>
+              </a:rPr>
+              <a:t>nuitrcs</a:t>
+            </a:r>
+            <a:r>
+              <a:rPr lang="en-US" sz="2400" dirty="0">
+                <a:latin typeface="Courier New" panose="02070309020205020404" pitchFamily="49" charset="0"/>
+                <a:cs typeface="Courier New" panose="02070309020205020404" pitchFamily="49" charset="0"/>
+              </a:rPr>
+              <a:t>/</a:t>
+            </a:r>
+            <a:r>
+              <a:rPr lang="en-US" sz="2400" dirty="0" err="1">
+                <a:latin typeface="Courier New" panose="02070309020205020404" pitchFamily="49" charset="0"/>
+                <a:cs typeface="Courier New" panose="02070309020205020404" pitchFamily="49" charset="0"/>
+              </a:rPr>
+              <a:t>github</a:t>
+            </a:r>
+            <a:r>
+              <a:rPr lang="en-US" sz="2400" dirty="0">
+                <a:latin typeface="Courier New" panose="02070309020205020404" pitchFamily="49" charset="0"/>
+                <a:cs typeface="Courier New" panose="02070309020205020404" pitchFamily="49" charset="0"/>
+              </a:rPr>
+              <a:t>-playground</a:t>
+            </a:r>
+            <a:r>
+              <a:rPr lang="en-US" sz="2800" dirty="0"/>
+              <a:t> in your own account and clone the fork to your computer.</a:t>
+            </a:r>
+          </a:p>
+          <a:p>
+            <a:r>
+              <a:rPr lang="en-US" sz="2800" dirty="0"/>
+              <a:t>Add the original repository as a remote called “upstream”:</a:t>
+            </a:r>
+          </a:p>
+          <a:p>
+            <a:pPr lvl="1"/>
+            <a:r>
+              <a:rPr lang="en-US" sz="1800" dirty="0">
+                <a:latin typeface="Courier New" panose="02070309020205020404" pitchFamily="49" charset="0"/>
+                <a:cs typeface="Courier New" panose="02070309020205020404" pitchFamily="49" charset="0"/>
+              </a:rPr>
+              <a:t>git remote add upstream \  https://github.com/nuitrcs/github-playground.git</a:t>
+            </a:r>
+          </a:p>
+          <a:p>
+            <a:r>
+              <a:rPr lang="en-US" sz="2800" dirty="0"/>
+              <a:t>Wait for the instructor to push to the upstream repo, then pull in the change:</a:t>
+            </a:r>
+          </a:p>
+          <a:p>
+            <a:pPr lvl="1"/>
+            <a:r>
+              <a:rPr lang="en-US" sz="2000" dirty="0">
+                <a:latin typeface="Courier New" panose="02070309020205020404" pitchFamily="49" charset="0"/>
+                <a:cs typeface="Courier New" panose="02070309020205020404" pitchFamily="49" charset="0"/>
+              </a:rPr>
+              <a:t>git checkout master</a:t>
+            </a:r>
+          </a:p>
+          <a:p>
+            <a:pPr lvl="1"/>
+            <a:r>
+              <a:rPr lang="en-US" sz="2000" dirty="0">
+                <a:latin typeface="Courier New" panose="02070309020205020404" pitchFamily="49" charset="0"/>
+                <a:cs typeface="Courier New" panose="02070309020205020404" pitchFamily="49" charset="0"/>
+              </a:rPr>
+              <a:t>git pull upstream master</a:t>
+            </a:r>
+          </a:p>
+          <a:p>
+            <a:endParaRPr lang="en-US" sz="2800" dirty="0"/>
+          </a:p>
+        </p:txBody>
+      </p:sp>
+      <p:sp>
+        <p:nvSpPr>
+          <p:cNvPr id="4" name="Slide Number Placeholder 3">
+            <a:extLst>
+              <a:ext uri="{FF2B5EF4-FFF2-40B4-BE49-F238E27FC236}">
+                <a16:creationId xmlns:a16="http://schemas.microsoft.com/office/drawing/2014/main" id="{7A4FE1F8-6E58-4B5B-AF4B-87DC156DC10B}"/>
+              </a:ext>
+            </a:extLst>
+          </p:cNvPr>
+          <p:cNvSpPr>
+            <a:spLocks noGrp="1"/>
+          </p:cNvSpPr>
+          <p:nvPr>
+            <p:ph type="sldNum" sz="quarter" idx="12"/>
+          </p:nvPr>
+        </p:nvSpPr>
+        <p:spPr/>
+        <p:txBody>
+          <a:bodyPr/>
+          <a:lstStyle/>
+          <a:p>
+            <a:fld id="{106E12CD-FCB1-464E-A775-0B83FDDACE03}" type="slidenum">
+              <a:rPr lang="en-US" smtClean="0"/>
+              <a:pPr/>
+              <a:t>22</a:t>
+            </a:fld>
+            <a:endParaRPr lang="en-US"/>
+          </a:p>
+        </p:txBody>
+      </p:sp>
+    </p:spTree>
+    <p:extLst>
+      <p:ext uri="{BB962C8B-B14F-4D97-AF65-F5344CB8AC3E}">
+        <p14:creationId xmlns:p14="http://schemas.microsoft.com/office/powerpoint/2010/main" val="2534167975"/>
+      </p:ext>
+    </p:extLst>
+  </p:cSld>
+  <p:clrMapOvr>
+    <a:masterClrMapping/>
+  </p:clrMapOvr>
+</p:sld>
+</file>
+
+<file path=ppt/slides/slide24.xml><?xml version="1.0" encoding="utf-8"?>
+<p:sld xmlns:a="http://schemas.openxmlformats.org/drawingml/2006/main" xmlns:r="http://schemas.openxmlformats.org/officeDocument/2006/relationships" xmlns:p="http://schemas.openxmlformats.org/presentationml/2006/main">
+  <p:cSld>
+    <p:spTree>
+      <p:nvGrpSpPr>
+        <p:cNvPr id="1" name=""/>
+        <p:cNvGrpSpPr/>
+        <p:nvPr/>
+      </p:nvGrpSpPr>
+      <p:grpSpPr>
+        <a:xfrm>
+          <a:off x="0" y="0"/>
+          <a:ext cx="0" cy="0"/>
+          <a:chOff x="0" y="0"/>
+          <a:chExt cx="0" cy="0"/>
+        </a:xfrm>
+      </p:grpSpPr>
+      <p:sp>
+        <p:nvSpPr>
+          <p:cNvPr id="2" name="Title 1">
+            <a:extLst>
+              <a:ext uri="{FF2B5EF4-FFF2-40B4-BE49-F238E27FC236}">
+                <a16:creationId xmlns:a16="http://schemas.microsoft.com/office/drawing/2014/main" id="{10D811A8-B810-4455-B0FC-ABFEF7BC021F}"/>
+              </a:ext>
+            </a:extLst>
+          </p:cNvPr>
+          <p:cNvSpPr>
+            <a:spLocks noGrp="1"/>
+          </p:cNvSpPr>
+          <p:nvPr>
+            <p:ph type="title"/>
+          </p:nvPr>
+        </p:nvSpPr>
+        <p:spPr/>
+        <p:txBody>
+          <a:bodyPr/>
+          <a:lstStyle/>
+          <a:p>
+            <a:r>
+              <a:rPr lang="en-US" dirty="0"/>
+              <a:t>Pull Requests</a:t>
+            </a:r>
+          </a:p>
+        </p:txBody>
+      </p:sp>
+      <p:sp>
+        <p:nvSpPr>
+          <p:cNvPr id="3" name="Content Placeholder 2">
+            <a:extLst>
+              <a:ext uri="{FF2B5EF4-FFF2-40B4-BE49-F238E27FC236}">
+                <a16:creationId xmlns:a16="http://schemas.microsoft.com/office/drawing/2014/main" id="{721E01CD-06A0-4FE6-BD7B-FE233F59E2B6}"/>
+              </a:ext>
+            </a:extLst>
+          </p:cNvPr>
+          <p:cNvSpPr>
+            <a:spLocks noGrp="1"/>
+          </p:cNvSpPr>
+          <p:nvPr>
+            <p:ph idx="1"/>
+          </p:nvPr>
+        </p:nvSpPr>
+        <p:spPr/>
+        <p:txBody>
+          <a:bodyPr/>
+          <a:lstStyle/>
+          <a:p>
+            <a:r>
+              <a:rPr lang="en-US" dirty="0"/>
+              <a:t>Pull requests let you tell others about changes you’ve pushed to GitHub.</a:t>
+            </a:r>
+          </a:p>
+          <a:p>
+            <a:r>
+              <a:rPr lang="en-US" dirty="0"/>
+              <a:t>They offer a place to discuss and review changes before they are accepted.</a:t>
+            </a:r>
+          </a:p>
+          <a:p>
+            <a:r>
+              <a:rPr lang="en-US" dirty="0"/>
+              <a:t>You can add commits to a pull request after it has been opened.</a:t>
+            </a:r>
+          </a:p>
+          <a:p>
+            <a:r>
+              <a:rPr lang="en-US" dirty="0"/>
+              <a:t>All the commits will be merged if/when the pull request is accepted.</a:t>
+            </a:r>
+          </a:p>
+        </p:txBody>
+      </p:sp>
+      <p:sp>
+        <p:nvSpPr>
+          <p:cNvPr id="4" name="Slide Number Placeholder 3">
+            <a:extLst>
+              <a:ext uri="{FF2B5EF4-FFF2-40B4-BE49-F238E27FC236}">
+                <a16:creationId xmlns:a16="http://schemas.microsoft.com/office/drawing/2014/main" id="{E1F161B3-354D-4A70-BD86-8DBD5CF43F8B}"/>
+              </a:ext>
+            </a:extLst>
+          </p:cNvPr>
+          <p:cNvSpPr>
+            <a:spLocks noGrp="1"/>
+          </p:cNvSpPr>
+          <p:nvPr>
+            <p:ph type="sldNum" sz="quarter" idx="12"/>
+          </p:nvPr>
+        </p:nvSpPr>
+        <p:spPr/>
+        <p:txBody>
+          <a:bodyPr/>
+          <a:lstStyle/>
+          <a:p>
+            <a:fld id="{106E12CD-FCB1-464E-A775-0B83FDDACE03}" type="slidenum">
+              <a:rPr lang="en-US" smtClean="0"/>
+              <a:pPr/>
+              <a:t>23</a:t>
+            </a:fld>
+            <a:endParaRPr lang="en-US"/>
+          </a:p>
+        </p:txBody>
+      </p:sp>
+    </p:spTree>
+    <p:extLst>
+      <p:ext uri="{BB962C8B-B14F-4D97-AF65-F5344CB8AC3E}">
+        <p14:creationId xmlns:p14="http://schemas.microsoft.com/office/powerpoint/2010/main" val="3262534954"/>
+      </p:ext>
+    </p:extLst>
+  </p:cSld>
+  <p:clrMapOvr>
+    <a:masterClrMapping/>
+  </p:clrMapOvr>
+</p:sld>
+</file>
+
+<file path=ppt/slides/slide25.xml><?xml version="1.0" encoding="utf-8"?>
+<p:sld xmlns:a="http://schemas.openxmlformats.org/drawingml/2006/main" xmlns:r="http://schemas.openxmlformats.org/officeDocument/2006/relationships" xmlns:p="http://schemas.openxmlformats.org/presentationml/2006/main">
+  <p:cSld>
+    <p:spTree>
+      <p:nvGrpSpPr>
+        <p:cNvPr id="1" name=""/>
+        <p:cNvGrpSpPr/>
+        <p:nvPr/>
+      </p:nvGrpSpPr>
+      <p:grpSpPr>
+        <a:xfrm>
+          <a:off x="0" y="0"/>
+          <a:ext cx="0" cy="0"/>
+          <a:chOff x="0" y="0"/>
+          <a:chExt cx="0" cy="0"/>
+        </a:xfrm>
+      </p:grpSpPr>
+      <p:sp>
+        <p:nvSpPr>
+          <p:cNvPr id="2" name="Title 1">
+            <a:extLst>
+              <a:ext uri="{FF2B5EF4-FFF2-40B4-BE49-F238E27FC236}">
+                <a16:creationId xmlns:a16="http://schemas.microsoft.com/office/drawing/2014/main" id="{C84527BE-33CE-45AD-A9D1-AC3F293BAD21}"/>
+              </a:ext>
+            </a:extLst>
+          </p:cNvPr>
+          <p:cNvSpPr>
+            <a:spLocks noGrp="1"/>
+          </p:cNvSpPr>
+          <p:nvPr>
+            <p:ph type="title"/>
+          </p:nvPr>
+        </p:nvSpPr>
+        <p:spPr/>
+        <p:txBody>
+          <a:bodyPr/>
+          <a:lstStyle/>
+          <a:p>
+            <a:r>
+              <a:rPr lang="en-US" dirty="0"/>
+              <a:t>Exercise 8: Pull Requests</a:t>
+            </a:r>
+          </a:p>
+        </p:txBody>
+      </p:sp>
+      <p:sp>
+        <p:nvSpPr>
+          <p:cNvPr id="3" name="Content Placeholder 2">
+            <a:extLst>
+              <a:ext uri="{FF2B5EF4-FFF2-40B4-BE49-F238E27FC236}">
+                <a16:creationId xmlns:a16="http://schemas.microsoft.com/office/drawing/2014/main" id="{662F4B0B-B133-43A5-98CF-6ED5A64071E5}"/>
+              </a:ext>
+            </a:extLst>
+          </p:cNvPr>
+          <p:cNvSpPr>
+            <a:spLocks noGrp="1"/>
+          </p:cNvSpPr>
+          <p:nvPr>
+            <p:ph idx="1"/>
+          </p:nvPr>
+        </p:nvSpPr>
+        <p:spPr/>
+        <p:txBody>
+          <a:bodyPr>
+            <a:normAutofit/>
+          </a:bodyPr>
+          <a:lstStyle/>
+          <a:p>
+            <a:r>
+              <a:rPr lang="en-US" sz="2800" dirty="0"/>
+              <a:t>Pair up with a partner.</a:t>
+            </a:r>
+          </a:p>
+          <a:p>
+            <a:r>
+              <a:rPr lang="en-US" sz="2800" dirty="0"/>
+              <a:t>Partner A creates a public repository with a README file. Partner B forks and clones this repository.</a:t>
+            </a:r>
+          </a:p>
+          <a:p>
+            <a:r>
+              <a:rPr lang="en-US" sz="2800" dirty="0"/>
+              <a:t>Partner B edits the README and commits, then pushes to their fork.</a:t>
+            </a:r>
+          </a:p>
+          <a:p>
+            <a:r>
+              <a:rPr lang="en-US" sz="2800" dirty="0"/>
+              <a:t>Partner B creates a pull request.</a:t>
+            </a:r>
+          </a:p>
+          <a:p>
+            <a:r>
+              <a:rPr lang="en-US" sz="2800" dirty="0"/>
+              <a:t>Partner A accepts and merges the pull request.</a:t>
+            </a:r>
+          </a:p>
+          <a:p>
+            <a:r>
+              <a:rPr lang="en-US" sz="2800" dirty="0"/>
+              <a:t>Switch roles and do it again! Try commenting on the pull request this time.</a:t>
+            </a:r>
+          </a:p>
+        </p:txBody>
+      </p:sp>
+      <p:sp>
+        <p:nvSpPr>
+          <p:cNvPr id="4" name="Slide Number Placeholder 3">
+            <a:extLst>
+              <a:ext uri="{FF2B5EF4-FFF2-40B4-BE49-F238E27FC236}">
+                <a16:creationId xmlns:a16="http://schemas.microsoft.com/office/drawing/2014/main" id="{7A4FE1F8-6E58-4B5B-AF4B-87DC156DC10B}"/>
+              </a:ext>
+            </a:extLst>
+          </p:cNvPr>
+          <p:cNvSpPr>
+            <a:spLocks noGrp="1"/>
+          </p:cNvSpPr>
+          <p:nvPr>
+            <p:ph type="sldNum" sz="quarter" idx="12"/>
+          </p:nvPr>
+        </p:nvSpPr>
+        <p:spPr/>
+        <p:txBody>
+          <a:bodyPr/>
+          <a:lstStyle/>
+          <a:p>
+            <a:fld id="{106E12CD-FCB1-464E-A775-0B83FDDACE03}" type="slidenum">
+              <a:rPr lang="en-US" smtClean="0"/>
+              <a:pPr/>
+              <a:t>24</a:t>
+            </a:fld>
+            <a:endParaRPr lang="en-US"/>
+          </a:p>
+        </p:txBody>
+      </p:sp>
+    </p:spTree>
+    <p:extLst>
+      <p:ext uri="{BB962C8B-B14F-4D97-AF65-F5344CB8AC3E}">
+        <p14:creationId xmlns:p14="http://schemas.microsoft.com/office/powerpoint/2010/main" val="2116540745"/>
+      </p:ext>
+    </p:extLst>
+  </p:cSld>
+  <p:clrMapOvr>
+    <a:masterClrMapping/>
+  </p:clrMapOvr>
+</p:sld>
+</file>
+
+<file path=ppt/slides/slide3.xml><?xml version="1.0" encoding="utf-8"?>
+<p:sld xmlns:a="http://schemas.openxmlformats.org/drawingml/2006/main" xmlns:r="http://schemas.openxmlformats.org/officeDocument/2006/relationships" xmlns:p="http://schemas.openxmlformats.org/presentationml/2006/main">
+  <p:cSld>
+    <p:spTree>
+      <p:nvGrpSpPr>
+        <p:cNvPr id="1" name=""/>
+        <p:cNvGrpSpPr/>
+        <p:nvPr/>
+      </p:nvGrpSpPr>
+      <p:grpSpPr>
+        <a:xfrm>
+          <a:off x="0" y="0"/>
+          <a:ext cx="0" cy="0"/>
+          <a:chOff x="0" y="0"/>
+          <a:chExt cx="0" cy="0"/>
+        </a:xfrm>
+      </p:grpSpPr>
+      <p:sp>
+        <p:nvSpPr>
           <p:cNvPr id="2" name="Title 1">
             <a:extLst>
               <a:ext uri="{FF2B5EF4-FFF2-40B4-BE49-F238E27FC236}">
@@ -4873,7 +6048,7 @@
             <a:fld id="{106E12CD-FCB1-464E-A775-0B83FDDACE03}" type="slidenum">
               <a:rPr lang="en-US" smtClean="0"/>
               <a:pPr/>
-              <a:t>1</a:t>
+              <a:t>2</a:t>
             </a:fld>
             <a:endParaRPr lang="en-US"/>
           </a:p>
@@ -5152,830 +6327,6 @@
 </p:sld>
 </file>
 
-<file path=ppt/slides/slide20.xml><?xml version="1.0" encoding="utf-8"?>
-<p:sld xmlns:a="http://schemas.openxmlformats.org/drawingml/2006/main" xmlns:r="http://schemas.openxmlformats.org/officeDocument/2006/relationships" xmlns:p="http://schemas.openxmlformats.org/presentationml/2006/main">
-  <p:cSld>
-    <p:spTree>
-      <p:nvGrpSpPr>
-        <p:cNvPr id="1" name=""/>
-        <p:cNvGrpSpPr/>
-        <p:nvPr/>
-      </p:nvGrpSpPr>
-      <p:grpSpPr>
-        <a:xfrm>
-          <a:off x="0" y="0"/>
-          <a:ext cx="0" cy="0"/>
-          <a:chOff x="0" y="0"/>
-          <a:chExt cx="0" cy="0"/>
-        </a:xfrm>
-      </p:grpSpPr>
-      <p:sp>
-        <p:nvSpPr>
-          <p:cNvPr id="2" name="Title 1">
-            <a:extLst>
-              <a:ext uri="{FF2B5EF4-FFF2-40B4-BE49-F238E27FC236}">
-                <a16:creationId xmlns:a16="http://schemas.microsoft.com/office/drawing/2014/main" id="{C84527BE-33CE-45AD-A9D1-AC3F293BAD21}"/>
-              </a:ext>
-            </a:extLst>
-          </p:cNvPr>
-          <p:cNvSpPr>
-            <a:spLocks noGrp="1"/>
-          </p:cNvSpPr>
-          <p:nvPr>
-            <p:ph type="title"/>
-          </p:nvPr>
-        </p:nvSpPr>
-        <p:spPr/>
-        <p:txBody>
-          <a:bodyPr/>
-          <a:lstStyle/>
-          <a:p>
-            <a:r>
-              <a:rPr lang="en-US" dirty="0"/>
-              <a:t>Exercise 6: GitHub Issues</a:t>
-            </a:r>
-          </a:p>
-        </p:txBody>
-      </p:sp>
-      <p:sp>
-        <p:nvSpPr>
-          <p:cNvPr id="3" name="Content Placeholder 2">
-            <a:extLst>
-              <a:ext uri="{FF2B5EF4-FFF2-40B4-BE49-F238E27FC236}">
-                <a16:creationId xmlns:a16="http://schemas.microsoft.com/office/drawing/2014/main" id="{662F4B0B-B133-43A5-98CF-6ED5A64071E5}"/>
-              </a:ext>
-            </a:extLst>
-          </p:cNvPr>
-          <p:cNvSpPr>
-            <a:spLocks noGrp="1"/>
-          </p:cNvSpPr>
-          <p:nvPr>
-            <p:ph idx="1"/>
-          </p:nvPr>
-        </p:nvSpPr>
-        <p:spPr/>
-        <p:txBody>
-          <a:bodyPr>
-            <a:normAutofit lnSpcReduction="10000"/>
-          </a:bodyPr>
-          <a:lstStyle/>
-          <a:p>
-            <a:r>
-              <a:rPr lang="en-US" sz="2800" dirty="0"/>
-              <a:t>In a GitHub repository you own, create an issue and assign it to yourself. Copy the issue number.</a:t>
-            </a:r>
-            <a:endParaRPr lang="en-US" sz="2400" dirty="0">
-              <a:latin typeface="Courier New" panose="02070309020205020404" pitchFamily="49" charset="0"/>
-              <a:cs typeface="Courier New" panose="02070309020205020404" pitchFamily="49" charset="0"/>
-            </a:endParaRPr>
-          </a:p>
-          <a:p>
-            <a:r>
-              <a:rPr lang="en-US" sz="2800" dirty="0"/>
-              <a:t>Clone the repository locally (if you haven’t already) and create a branch for your issue.</a:t>
-            </a:r>
-          </a:p>
-          <a:p>
-            <a:r>
-              <a:rPr lang="en-US" sz="2800" dirty="0"/>
-              <a:t>Create a commit on that branch, and include “Closes #&lt;issue number&gt;” in the commit message. (e.g. “Closes #1”)</a:t>
-            </a:r>
-          </a:p>
-          <a:p>
-            <a:r>
-              <a:rPr lang="en-US" sz="2800" dirty="0"/>
-              <a:t>Check out </a:t>
-            </a:r>
-            <a:r>
-              <a:rPr lang="en-US" sz="2400" dirty="0">
-                <a:latin typeface="Courier New" panose="02070309020205020404" pitchFamily="49" charset="0"/>
-                <a:cs typeface="Courier New" panose="02070309020205020404" pitchFamily="49" charset="0"/>
-              </a:rPr>
-              <a:t>master</a:t>
-            </a:r>
-            <a:r>
-              <a:rPr lang="en-US" sz="2800" dirty="0"/>
-              <a:t> and merge in your issue branch, then push.</a:t>
-            </a:r>
-          </a:p>
-          <a:p>
-            <a:r>
-              <a:rPr lang="en-US" sz="2800" dirty="0">
-                <a:cs typeface="Courier New" panose="02070309020205020404" pitchFamily="49" charset="0"/>
-              </a:rPr>
-              <a:t>Check the issue in GitHub. Did anything change?</a:t>
-            </a:r>
-            <a:endParaRPr lang="en-US" sz="2400" dirty="0">
-              <a:cs typeface="Courier New" panose="02070309020205020404" pitchFamily="49" charset="0"/>
-            </a:endParaRPr>
-          </a:p>
-          <a:p>
-            <a:endParaRPr lang="en-US" sz="2400" dirty="0"/>
-          </a:p>
-          <a:p>
-            <a:endParaRPr lang="en-US" sz="2800" dirty="0"/>
-          </a:p>
-        </p:txBody>
-      </p:sp>
-      <p:sp>
-        <p:nvSpPr>
-          <p:cNvPr id="4" name="Slide Number Placeholder 3">
-            <a:extLst>
-              <a:ext uri="{FF2B5EF4-FFF2-40B4-BE49-F238E27FC236}">
-                <a16:creationId xmlns:a16="http://schemas.microsoft.com/office/drawing/2014/main" id="{7A4FE1F8-6E58-4B5B-AF4B-87DC156DC10B}"/>
-              </a:ext>
-            </a:extLst>
-          </p:cNvPr>
-          <p:cNvSpPr>
-            <a:spLocks noGrp="1"/>
-          </p:cNvSpPr>
-          <p:nvPr>
-            <p:ph type="sldNum" sz="quarter" idx="12"/>
-          </p:nvPr>
-        </p:nvSpPr>
-        <p:spPr/>
-        <p:txBody>
-          <a:bodyPr/>
-          <a:lstStyle/>
-          <a:p>
-            <a:fld id="{106E12CD-FCB1-464E-A775-0B83FDDACE03}" type="slidenum">
-              <a:rPr lang="en-US" smtClean="0"/>
-              <a:pPr/>
-              <a:t>19</a:t>
-            </a:fld>
-            <a:endParaRPr lang="en-US"/>
-          </a:p>
-        </p:txBody>
-      </p:sp>
-    </p:spTree>
-    <p:extLst>
-      <p:ext uri="{BB962C8B-B14F-4D97-AF65-F5344CB8AC3E}">
-        <p14:creationId xmlns:p14="http://schemas.microsoft.com/office/powerpoint/2010/main" val="3070136670"/>
-      </p:ext>
-    </p:extLst>
-  </p:cSld>
-  <p:clrMapOvr>
-    <a:masterClrMapping/>
-  </p:clrMapOvr>
-</p:sld>
-</file>
-
-<file path=ppt/slides/slide21.xml><?xml version="1.0" encoding="utf-8"?>
-<p:sld xmlns:a="http://schemas.openxmlformats.org/drawingml/2006/main" xmlns:r="http://schemas.openxmlformats.org/officeDocument/2006/relationships" xmlns:p="http://schemas.openxmlformats.org/presentationml/2006/main">
-  <p:cSld>
-    <p:spTree>
-      <p:nvGrpSpPr>
-        <p:cNvPr id="1" name=""/>
-        <p:cNvGrpSpPr/>
-        <p:nvPr/>
-      </p:nvGrpSpPr>
-      <p:grpSpPr>
-        <a:xfrm>
-          <a:off x="0" y="0"/>
-          <a:ext cx="0" cy="0"/>
-          <a:chOff x="0" y="0"/>
-          <a:chExt cx="0" cy="0"/>
-        </a:xfrm>
-      </p:grpSpPr>
-      <p:sp>
-        <p:nvSpPr>
-          <p:cNvPr id="2" name="Title 1">
-            <a:extLst>
-              <a:ext uri="{FF2B5EF4-FFF2-40B4-BE49-F238E27FC236}">
-                <a16:creationId xmlns:a16="http://schemas.microsoft.com/office/drawing/2014/main" id="{10D811A8-B810-4455-B0FC-ABFEF7BC021F}"/>
-              </a:ext>
-            </a:extLst>
-          </p:cNvPr>
-          <p:cNvSpPr>
-            <a:spLocks noGrp="1"/>
-          </p:cNvSpPr>
-          <p:nvPr>
-            <p:ph type="title"/>
-          </p:nvPr>
-        </p:nvSpPr>
-        <p:spPr/>
-        <p:txBody>
-          <a:bodyPr/>
-          <a:lstStyle/>
-          <a:p>
-            <a:r>
-              <a:rPr lang="en-US" dirty="0"/>
-              <a:t>GitHub Forks</a:t>
-            </a:r>
-          </a:p>
-        </p:txBody>
-      </p:sp>
-      <p:sp>
-        <p:nvSpPr>
-          <p:cNvPr id="3" name="Content Placeholder 2">
-            <a:extLst>
-              <a:ext uri="{FF2B5EF4-FFF2-40B4-BE49-F238E27FC236}">
-                <a16:creationId xmlns:a16="http://schemas.microsoft.com/office/drawing/2014/main" id="{721E01CD-06A0-4FE6-BD7B-FE233F59E2B6}"/>
-              </a:ext>
-            </a:extLst>
-          </p:cNvPr>
-          <p:cNvSpPr>
-            <a:spLocks noGrp="1"/>
-          </p:cNvSpPr>
-          <p:nvPr>
-            <p:ph idx="1"/>
-          </p:nvPr>
-        </p:nvSpPr>
-        <p:spPr/>
-        <p:txBody>
-          <a:bodyPr/>
-          <a:lstStyle/>
-          <a:p>
-            <a:r>
-              <a:rPr lang="en-US" dirty="0"/>
-              <a:t>A Fork in GitHub is a repository that is a copy of an “upstream” repository, and can track changes in the upstream repository.</a:t>
-            </a:r>
-          </a:p>
-          <a:p>
-            <a:r>
-              <a:rPr lang="en-US" dirty="0"/>
-              <a:t>Useful for contributing to large projects, or making your own customizations to a project.</a:t>
-            </a:r>
-          </a:p>
-        </p:txBody>
-      </p:sp>
-      <p:sp>
-        <p:nvSpPr>
-          <p:cNvPr id="4" name="Slide Number Placeholder 3">
-            <a:extLst>
-              <a:ext uri="{FF2B5EF4-FFF2-40B4-BE49-F238E27FC236}">
-                <a16:creationId xmlns:a16="http://schemas.microsoft.com/office/drawing/2014/main" id="{E1F161B3-354D-4A70-BD86-8DBD5CF43F8B}"/>
-              </a:ext>
-            </a:extLst>
-          </p:cNvPr>
-          <p:cNvSpPr>
-            <a:spLocks noGrp="1"/>
-          </p:cNvSpPr>
-          <p:nvPr>
-            <p:ph type="sldNum" sz="quarter" idx="12"/>
-          </p:nvPr>
-        </p:nvSpPr>
-        <p:spPr/>
-        <p:txBody>
-          <a:bodyPr/>
-          <a:lstStyle/>
-          <a:p>
-            <a:fld id="{106E12CD-FCB1-464E-A775-0B83FDDACE03}" type="slidenum">
-              <a:rPr lang="en-US" smtClean="0"/>
-              <a:pPr/>
-              <a:t>20</a:t>
-            </a:fld>
-            <a:endParaRPr lang="en-US"/>
-          </a:p>
-        </p:txBody>
-      </p:sp>
-    </p:spTree>
-    <p:extLst>
-      <p:ext uri="{BB962C8B-B14F-4D97-AF65-F5344CB8AC3E}">
-        <p14:creationId xmlns:p14="http://schemas.microsoft.com/office/powerpoint/2010/main" val="985377529"/>
-      </p:ext>
-    </p:extLst>
-  </p:cSld>
-  <p:clrMapOvr>
-    <a:masterClrMapping/>
-  </p:clrMapOvr>
-</p:sld>
-</file>
-
-<file path=ppt/slides/slide22.xml><?xml version="1.0" encoding="utf-8"?>
-<p:sld xmlns:a="http://schemas.openxmlformats.org/drawingml/2006/main" xmlns:r="http://schemas.openxmlformats.org/officeDocument/2006/relationships" xmlns:p="http://schemas.openxmlformats.org/presentationml/2006/main">
-  <p:cSld>
-    <p:spTree>
-      <p:nvGrpSpPr>
-        <p:cNvPr id="1" name=""/>
-        <p:cNvGrpSpPr/>
-        <p:nvPr/>
-      </p:nvGrpSpPr>
-      <p:grpSpPr>
-        <a:xfrm>
-          <a:off x="0" y="0"/>
-          <a:ext cx="0" cy="0"/>
-          <a:chOff x="0" y="0"/>
-          <a:chExt cx="0" cy="0"/>
-        </a:xfrm>
-      </p:grpSpPr>
-      <p:sp>
-        <p:nvSpPr>
-          <p:cNvPr id="2" name="Title 1">
-            <a:extLst>
-              <a:ext uri="{FF2B5EF4-FFF2-40B4-BE49-F238E27FC236}">
-                <a16:creationId xmlns:a16="http://schemas.microsoft.com/office/drawing/2014/main" id="{C84527BE-33CE-45AD-A9D1-AC3F293BAD21}"/>
-              </a:ext>
-            </a:extLst>
-          </p:cNvPr>
-          <p:cNvSpPr>
-            <a:spLocks noGrp="1"/>
-          </p:cNvSpPr>
-          <p:nvPr>
-            <p:ph type="title"/>
-          </p:nvPr>
-        </p:nvSpPr>
-        <p:spPr/>
-        <p:txBody>
-          <a:bodyPr/>
-          <a:lstStyle/>
-          <a:p>
-            <a:r>
-              <a:rPr lang="en-US" dirty="0"/>
-              <a:t>Exercise 7: GitHub Forks</a:t>
-            </a:r>
-          </a:p>
-        </p:txBody>
-      </p:sp>
-      <p:sp>
-        <p:nvSpPr>
-          <p:cNvPr id="3" name="Content Placeholder 2">
-            <a:extLst>
-              <a:ext uri="{FF2B5EF4-FFF2-40B4-BE49-F238E27FC236}">
-                <a16:creationId xmlns:a16="http://schemas.microsoft.com/office/drawing/2014/main" id="{662F4B0B-B133-43A5-98CF-6ED5A64071E5}"/>
-              </a:ext>
-            </a:extLst>
-          </p:cNvPr>
-          <p:cNvSpPr>
-            <a:spLocks noGrp="1"/>
-          </p:cNvSpPr>
-          <p:nvPr>
-            <p:ph idx="1"/>
-          </p:nvPr>
-        </p:nvSpPr>
-        <p:spPr/>
-        <p:txBody>
-          <a:bodyPr>
-            <a:normAutofit lnSpcReduction="10000"/>
-          </a:bodyPr>
-          <a:lstStyle/>
-          <a:p>
-            <a:r>
-              <a:rPr lang="en-US" sz="2800" dirty="0"/>
-              <a:t>Create a fork of </a:t>
-            </a:r>
-            <a:r>
-              <a:rPr lang="en-US" sz="2400" dirty="0" err="1">
-                <a:latin typeface="Courier New" panose="02070309020205020404" pitchFamily="49" charset="0"/>
-                <a:cs typeface="Courier New" panose="02070309020205020404" pitchFamily="49" charset="0"/>
-              </a:rPr>
-              <a:t>nuitrcs</a:t>
-            </a:r>
-            <a:r>
-              <a:rPr lang="en-US" sz="2400" dirty="0">
-                <a:latin typeface="Courier New" panose="02070309020205020404" pitchFamily="49" charset="0"/>
-                <a:cs typeface="Courier New" panose="02070309020205020404" pitchFamily="49" charset="0"/>
-              </a:rPr>
-              <a:t>/</a:t>
-            </a:r>
-            <a:r>
-              <a:rPr lang="en-US" sz="2400" dirty="0" err="1">
-                <a:latin typeface="Courier New" panose="02070309020205020404" pitchFamily="49" charset="0"/>
-                <a:cs typeface="Courier New" panose="02070309020205020404" pitchFamily="49" charset="0"/>
-              </a:rPr>
-              <a:t>github</a:t>
-            </a:r>
-            <a:r>
-              <a:rPr lang="en-US" sz="2400" dirty="0">
-                <a:latin typeface="Courier New" panose="02070309020205020404" pitchFamily="49" charset="0"/>
-                <a:cs typeface="Courier New" panose="02070309020205020404" pitchFamily="49" charset="0"/>
-              </a:rPr>
-              <a:t>-playground</a:t>
-            </a:r>
-            <a:r>
-              <a:rPr lang="en-US" sz="2800" dirty="0"/>
-              <a:t> in your own account and clone the fork to your computer.</a:t>
-            </a:r>
-          </a:p>
-          <a:p>
-            <a:r>
-              <a:rPr lang="en-US" sz="2800" dirty="0"/>
-              <a:t>Add the original repository as a remote called “upstream”:</a:t>
-            </a:r>
-          </a:p>
-          <a:p>
-            <a:pPr lvl="1"/>
-            <a:r>
-              <a:rPr lang="en-US" sz="1800" dirty="0">
-                <a:latin typeface="Courier New" panose="02070309020205020404" pitchFamily="49" charset="0"/>
-                <a:cs typeface="Courier New" panose="02070309020205020404" pitchFamily="49" charset="0"/>
-              </a:rPr>
-              <a:t>git remote add upstream \  https://github.com/nuitrcs/github-playground.git</a:t>
-            </a:r>
-          </a:p>
-          <a:p>
-            <a:r>
-              <a:rPr lang="en-US" sz="2800" dirty="0"/>
-              <a:t>Wait for the instructor to push to the upstream repo, then pull in the change:</a:t>
-            </a:r>
-          </a:p>
-          <a:p>
-            <a:pPr lvl="1"/>
-            <a:r>
-              <a:rPr lang="en-US" sz="2000" dirty="0">
-                <a:latin typeface="Courier New" panose="02070309020205020404" pitchFamily="49" charset="0"/>
-                <a:cs typeface="Courier New" panose="02070309020205020404" pitchFamily="49" charset="0"/>
-              </a:rPr>
-              <a:t>git checkout master</a:t>
-            </a:r>
-          </a:p>
-          <a:p>
-            <a:pPr lvl="1"/>
-            <a:r>
-              <a:rPr lang="en-US" sz="2000" dirty="0">
-                <a:latin typeface="Courier New" panose="02070309020205020404" pitchFamily="49" charset="0"/>
-                <a:cs typeface="Courier New" panose="02070309020205020404" pitchFamily="49" charset="0"/>
-              </a:rPr>
-              <a:t>git pull upstream master</a:t>
-            </a:r>
-          </a:p>
-          <a:p>
-            <a:endParaRPr lang="en-US" sz="2800" dirty="0"/>
-          </a:p>
-        </p:txBody>
-      </p:sp>
-      <p:sp>
-        <p:nvSpPr>
-          <p:cNvPr id="4" name="Slide Number Placeholder 3">
-            <a:extLst>
-              <a:ext uri="{FF2B5EF4-FFF2-40B4-BE49-F238E27FC236}">
-                <a16:creationId xmlns:a16="http://schemas.microsoft.com/office/drawing/2014/main" id="{7A4FE1F8-6E58-4B5B-AF4B-87DC156DC10B}"/>
-              </a:ext>
-            </a:extLst>
-          </p:cNvPr>
-          <p:cNvSpPr>
-            <a:spLocks noGrp="1"/>
-          </p:cNvSpPr>
-          <p:nvPr>
-            <p:ph type="sldNum" sz="quarter" idx="12"/>
-          </p:nvPr>
-        </p:nvSpPr>
-        <p:spPr/>
-        <p:txBody>
-          <a:bodyPr/>
-          <a:lstStyle/>
-          <a:p>
-            <a:fld id="{106E12CD-FCB1-464E-A775-0B83FDDACE03}" type="slidenum">
-              <a:rPr lang="en-US" smtClean="0"/>
-              <a:pPr/>
-              <a:t>21</a:t>
-            </a:fld>
-            <a:endParaRPr lang="en-US"/>
-          </a:p>
-        </p:txBody>
-      </p:sp>
-    </p:spTree>
-    <p:extLst>
-      <p:ext uri="{BB962C8B-B14F-4D97-AF65-F5344CB8AC3E}">
-        <p14:creationId xmlns:p14="http://schemas.microsoft.com/office/powerpoint/2010/main" val="2534167975"/>
-      </p:ext>
-    </p:extLst>
-  </p:cSld>
-  <p:clrMapOvr>
-    <a:masterClrMapping/>
-  </p:clrMapOvr>
-</p:sld>
-</file>
-
-<file path=ppt/slides/slide23.xml><?xml version="1.0" encoding="utf-8"?>
-<p:sld xmlns:a="http://schemas.openxmlformats.org/drawingml/2006/main" xmlns:r="http://schemas.openxmlformats.org/officeDocument/2006/relationships" xmlns:p="http://schemas.openxmlformats.org/presentationml/2006/main">
-  <p:cSld>
-    <p:spTree>
-      <p:nvGrpSpPr>
-        <p:cNvPr id="1" name=""/>
-        <p:cNvGrpSpPr/>
-        <p:nvPr/>
-      </p:nvGrpSpPr>
-      <p:grpSpPr>
-        <a:xfrm>
-          <a:off x="0" y="0"/>
-          <a:ext cx="0" cy="0"/>
-          <a:chOff x="0" y="0"/>
-          <a:chExt cx="0" cy="0"/>
-        </a:xfrm>
-      </p:grpSpPr>
-      <p:sp>
-        <p:nvSpPr>
-          <p:cNvPr id="2" name="Title 1">
-            <a:extLst>
-              <a:ext uri="{FF2B5EF4-FFF2-40B4-BE49-F238E27FC236}">
-                <a16:creationId xmlns:a16="http://schemas.microsoft.com/office/drawing/2014/main" id="{10D811A8-B810-4455-B0FC-ABFEF7BC021F}"/>
-              </a:ext>
-            </a:extLst>
-          </p:cNvPr>
-          <p:cNvSpPr>
-            <a:spLocks noGrp="1"/>
-          </p:cNvSpPr>
-          <p:nvPr>
-            <p:ph type="title"/>
-          </p:nvPr>
-        </p:nvSpPr>
-        <p:spPr/>
-        <p:txBody>
-          <a:bodyPr/>
-          <a:lstStyle/>
-          <a:p>
-            <a:r>
-              <a:rPr lang="en-US" dirty="0"/>
-              <a:t>Pull Requests</a:t>
-            </a:r>
-          </a:p>
-        </p:txBody>
-      </p:sp>
-      <p:sp>
-        <p:nvSpPr>
-          <p:cNvPr id="3" name="Content Placeholder 2">
-            <a:extLst>
-              <a:ext uri="{FF2B5EF4-FFF2-40B4-BE49-F238E27FC236}">
-                <a16:creationId xmlns:a16="http://schemas.microsoft.com/office/drawing/2014/main" id="{721E01CD-06A0-4FE6-BD7B-FE233F59E2B6}"/>
-              </a:ext>
-            </a:extLst>
-          </p:cNvPr>
-          <p:cNvSpPr>
-            <a:spLocks noGrp="1"/>
-          </p:cNvSpPr>
-          <p:nvPr>
-            <p:ph idx="1"/>
-          </p:nvPr>
-        </p:nvSpPr>
-        <p:spPr/>
-        <p:txBody>
-          <a:bodyPr/>
-          <a:lstStyle/>
-          <a:p>
-            <a:r>
-              <a:rPr lang="en-US" dirty="0"/>
-              <a:t>Pull requests let you tell others about changes you’ve pushed to GitHub.</a:t>
-            </a:r>
-          </a:p>
-          <a:p>
-            <a:r>
-              <a:rPr lang="en-US" dirty="0"/>
-              <a:t>They offer a place to discuss and review changes before they are accepted.</a:t>
-            </a:r>
-          </a:p>
-          <a:p>
-            <a:r>
-              <a:rPr lang="en-US" dirty="0"/>
-              <a:t>You can add commits to a pull request after it has been opened.</a:t>
-            </a:r>
-          </a:p>
-          <a:p>
-            <a:r>
-              <a:rPr lang="en-US" dirty="0"/>
-              <a:t>All the commits will be merged if/when the pull request is accepted.</a:t>
-            </a:r>
-          </a:p>
-        </p:txBody>
-      </p:sp>
-      <p:sp>
-        <p:nvSpPr>
-          <p:cNvPr id="4" name="Slide Number Placeholder 3">
-            <a:extLst>
-              <a:ext uri="{FF2B5EF4-FFF2-40B4-BE49-F238E27FC236}">
-                <a16:creationId xmlns:a16="http://schemas.microsoft.com/office/drawing/2014/main" id="{E1F161B3-354D-4A70-BD86-8DBD5CF43F8B}"/>
-              </a:ext>
-            </a:extLst>
-          </p:cNvPr>
-          <p:cNvSpPr>
-            <a:spLocks noGrp="1"/>
-          </p:cNvSpPr>
-          <p:nvPr>
-            <p:ph type="sldNum" sz="quarter" idx="12"/>
-          </p:nvPr>
-        </p:nvSpPr>
-        <p:spPr/>
-        <p:txBody>
-          <a:bodyPr/>
-          <a:lstStyle/>
-          <a:p>
-            <a:fld id="{106E12CD-FCB1-464E-A775-0B83FDDACE03}" type="slidenum">
-              <a:rPr lang="en-US" smtClean="0"/>
-              <a:pPr/>
-              <a:t>22</a:t>
-            </a:fld>
-            <a:endParaRPr lang="en-US"/>
-          </a:p>
-        </p:txBody>
-      </p:sp>
-    </p:spTree>
-    <p:extLst>
-      <p:ext uri="{BB962C8B-B14F-4D97-AF65-F5344CB8AC3E}">
-        <p14:creationId xmlns:p14="http://schemas.microsoft.com/office/powerpoint/2010/main" val="3262534954"/>
-      </p:ext>
-    </p:extLst>
-  </p:cSld>
-  <p:clrMapOvr>
-    <a:masterClrMapping/>
-  </p:clrMapOvr>
-</p:sld>
-</file>
-
-<file path=ppt/slides/slide24.xml><?xml version="1.0" encoding="utf-8"?>
-<p:sld xmlns:a="http://schemas.openxmlformats.org/drawingml/2006/main" xmlns:r="http://schemas.openxmlformats.org/officeDocument/2006/relationships" xmlns:p="http://schemas.openxmlformats.org/presentationml/2006/main">
-  <p:cSld>
-    <p:spTree>
-      <p:nvGrpSpPr>
-        <p:cNvPr id="1" name=""/>
-        <p:cNvGrpSpPr/>
-        <p:nvPr/>
-      </p:nvGrpSpPr>
-      <p:grpSpPr>
-        <a:xfrm>
-          <a:off x="0" y="0"/>
-          <a:ext cx="0" cy="0"/>
-          <a:chOff x="0" y="0"/>
-          <a:chExt cx="0" cy="0"/>
-        </a:xfrm>
-      </p:grpSpPr>
-      <p:sp>
-        <p:nvSpPr>
-          <p:cNvPr id="2" name="Title 1">
-            <a:extLst>
-              <a:ext uri="{FF2B5EF4-FFF2-40B4-BE49-F238E27FC236}">
-                <a16:creationId xmlns:a16="http://schemas.microsoft.com/office/drawing/2014/main" id="{C84527BE-33CE-45AD-A9D1-AC3F293BAD21}"/>
-              </a:ext>
-            </a:extLst>
-          </p:cNvPr>
-          <p:cNvSpPr>
-            <a:spLocks noGrp="1"/>
-          </p:cNvSpPr>
-          <p:nvPr>
-            <p:ph type="title"/>
-          </p:nvPr>
-        </p:nvSpPr>
-        <p:spPr/>
-        <p:txBody>
-          <a:bodyPr/>
-          <a:lstStyle/>
-          <a:p>
-            <a:r>
-              <a:rPr lang="en-US" dirty="0"/>
-              <a:t>Exercise 8: Pull Requests</a:t>
-            </a:r>
-          </a:p>
-        </p:txBody>
-      </p:sp>
-      <p:sp>
-        <p:nvSpPr>
-          <p:cNvPr id="3" name="Content Placeholder 2">
-            <a:extLst>
-              <a:ext uri="{FF2B5EF4-FFF2-40B4-BE49-F238E27FC236}">
-                <a16:creationId xmlns:a16="http://schemas.microsoft.com/office/drawing/2014/main" id="{662F4B0B-B133-43A5-98CF-6ED5A64071E5}"/>
-              </a:ext>
-            </a:extLst>
-          </p:cNvPr>
-          <p:cNvSpPr>
-            <a:spLocks noGrp="1"/>
-          </p:cNvSpPr>
-          <p:nvPr>
-            <p:ph idx="1"/>
-          </p:nvPr>
-        </p:nvSpPr>
-        <p:spPr/>
-        <p:txBody>
-          <a:bodyPr>
-            <a:normAutofit/>
-          </a:bodyPr>
-          <a:lstStyle/>
-          <a:p>
-            <a:r>
-              <a:rPr lang="en-US" sz="2800" dirty="0"/>
-              <a:t>Pair up with a partner.</a:t>
-            </a:r>
-          </a:p>
-          <a:p>
-            <a:r>
-              <a:rPr lang="en-US" sz="2800" dirty="0"/>
-              <a:t>Partner A creates a public repository with a README file. Partner B forks and clones this repository.</a:t>
-            </a:r>
-          </a:p>
-          <a:p>
-            <a:r>
-              <a:rPr lang="en-US" sz="2800" dirty="0"/>
-              <a:t>Partner B edits the README and commits, then pushes to their fork.</a:t>
-            </a:r>
-          </a:p>
-          <a:p>
-            <a:r>
-              <a:rPr lang="en-US" sz="2800" dirty="0"/>
-              <a:t>Partner B creates a pull request.</a:t>
-            </a:r>
-          </a:p>
-          <a:p>
-            <a:r>
-              <a:rPr lang="en-US" sz="2800" dirty="0"/>
-              <a:t>Partner A accepts and merges the pull request.</a:t>
-            </a:r>
-          </a:p>
-          <a:p>
-            <a:r>
-              <a:rPr lang="en-US" sz="2800" dirty="0"/>
-              <a:t>Switch roles and do it again! Try commenting on the pull request this time.</a:t>
-            </a:r>
-          </a:p>
-        </p:txBody>
-      </p:sp>
-      <p:sp>
-        <p:nvSpPr>
-          <p:cNvPr id="4" name="Slide Number Placeholder 3">
-            <a:extLst>
-              <a:ext uri="{FF2B5EF4-FFF2-40B4-BE49-F238E27FC236}">
-                <a16:creationId xmlns:a16="http://schemas.microsoft.com/office/drawing/2014/main" id="{7A4FE1F8-6E58-4B5B-AF4B-87DC156DC10B}"/>
-              </a:ext>
-            </a:extLst>
-          </p:cNvPr>
-          <p:cNvSpPr>
-            <a:spLocks noGrp="1"/>
-          </p:cNvSpPr>
-          <p:nvPr>
-            <p:ph type="sldNum" sz="quarter" idx="12"/>
-          </p:nvPr>
-        </p:nvSpPr>
-        <p:spPr/>
-        <p:txBody>
-          <a:bodyPr/>
-          <a:lstStyle/>
-          <a:p>
-            <a:fld id="{106E12CD-FCB1-464E-A775-0B83FDDACE03}" type="slidenum">
-              <a:rPr lang="en-US" smtClean="0"/>
-              <a:pPr/>
-              <a:t>23</a:t>
-            </a:fld>
-            <a:endParaRPr lang="en-US"/>
-          </a:p>
-        </p:txBody>
-      </p:sp>
-    </p:spTree>
-    <p:extLst>
-      <p:ext uri="{BB962C8B-B14F-4D97-AF65-F5344CB8AC3E}">
-        <p14:creationId xmlns:p14="http://schemas.microsoft.com/office/powerpoint/2010/main" val="2116540745"/>
-      </p:ext>
-    </p:extLst>
-  </p:cSld>
-  <p:clrMapOvr>
-    <a:masterClrMapping/>
-  </p:clrMapOvr>
-</p:sld>
-</file>
-
-<file path=ppt/slides/slide3.xml><?xml version="1.0" encoding="utf-8"?>
-<p:sld xmlns:a="http://schemas.openxmlformats.org/drawingml/2006/main" xmlns:r="http://schemas.openxmlformats.org/officeDocument/2006/relationships" xmlns:p="http://schemas.openxmlformats.org/presentationml/2006/main">
-  <p:cSld>
-    <p:spTree>
-      <p:nvGrpSpPr>
-        <p:cNvPr id="1" name=""/>
-        <p:cNvGrpSpPr/>
-        <p:nvPr/>
-      </p:nvGrpSpPr>
-      <p:grpSpPr>
-        <a:xfrm>
-          <a:off x="0" y="0"/>
-          <a:ext cx="0" cy="0"/>
-          <a:chOff x="0" y="0"/>
-          <a:chExt cx="0" cy="0"/>
-        </a:xfrm>
-      </p:grpSpPr>
-      <p:sp>
-        <p:nvSpPr>
-          <p:cNvPr id="2" name="Title 1"/>
-          <p:cNvSpPr>
-            <a:spLocks noGrp="1"/>
-          </p:cNvSpPr>
-          <p:nvPr>
-            <p:ph type="title"/>
-          </p:nvPr>
-        </p:nvSpPr>
-        <p:spPr>
-          <a:xfrm>
-            <a:off x="0" y="2056080"/>
-            <a:ext cx="9144000" cy="2738880"/>
-          </a:xfrm>
-        </p:spPr>
-        <p:txBody>
-          <a:bodyPr/>
-          <a:lstStyle/>
-          <a:p>
-            <a:r>
-              <a:rPr lang="en-US" dirty="0"/>
-              <a:t>Branching Example</a:t>
-            </a:r>
-          </a:p>
-        </p:txBody>
-      </p:sp>
-    </p:spTree>
-    <p:extLst>
-      <p:ext uri="{BB962C8B-B14F-4D97-AF65-F5344CB8AC3E}">
-        <p14:creationId xmlns:p14="http://schemas.microsoft.com/office/powerpoint/2010/main" val="2342043198"/>
-      </p:ext>
-    </p:extLst>
-  </p:cSld>
-  <p:clrMapOvr>
-    <a:masterClrMapping/>
-  </p:clrMapOvr>
-</p:sld>
-</file>
-
 <file path=ppt/slides/slide4.xml><?xml version="1.0" encoding="utf-8"?>
 <p:sld xmlns:a="http://schemas.openxmlformats.org/drawingml/2006/main" xmlns:r="http://schemas.openxmlformats.org/officeDocument/2006/relationships" xmlns:p="http://schemas.openxmlformats.org/presentationml/2006/main">
   <p:cSld>
@@ -5995,13 +6346,7 @@
       </p:grpSpPr>
       <p:sp>
         <p:nvSpPr>
-          <p:cNvPr id="2" name="Title 1">
-            <a:extLst>
-              <a:ext uri="{FF2B5EF4-FFF2-40B4-BE49-F238E27FC236}">
-                <a16:creationId xmlns:a16="http://schemas.microsoft.com/office/drawing/2014/main" id="{C84527BE-33CE-45AD-A9D1-AC3F293BAD21}"/>
-              </a:ext>
-            </a:extLst>
-          </p:cNvPr>
+          <p:cNvPr id="2" name="Title 1"/>
           <p:cNvSpPr>
             <a:spLocks noGrp="1"/>
           </p:cNvSpPr>
@@ -6009,173 +6354,27 @@
             <p:ph type="title"/>
           </p:nvPr>
         </p:nvSpPr>
-        <p:spPr/>
+        <p:spPr>
+          <a:xfrm>
+            <a:off x="0" y="2056080"/>
+            <a:ext cx="9144000" cy="2738880"/>
+          </a:xfrm>
+        </p:spPr>
         <p:txBody>
           <a:bodyPr/>
           <a:lstStyle/>
           <a:p>
             <a:r>
               <a:rPr lang="en-US" dirty="0"/>
-              <a:t>Exercise 1: Branching</a:t>
-            </a:r>
-          </a:p>
-        </p:txBody>
-      </p:sp>
-      <p:sp>
-        <p:nvSpPr>
-          <p:cNvPr id="3" name="Content Placeholder 2">
-            <a:extLst>
-              <a:ext uri="{FF2B5EF4-FFF2-40B4-BE49-F238E27FC236}">
-                <a16:creationId xmlns:a16="http://schemas.microsoft.com/office/drawing/2014/main" id="{662F4B0B-B133-43A5-98CF-6ED5A64071E5}"/>
-              </a:ext>
-            </a:extLst>
-          </p:cNvPr>
-          <p:cNvSpPr>
-            <a:spLocks noGrp="1"/>
-          </p:cNvSpPr>
-          <p:nvPr>
-            <p:ph idx="1"/>
-          </p:nvPr>
-        </p:nvSpPr>
-        <p:spPr/>
-        <p:txBody>
-          <a:bodyPr>
-            <a:normAutofit/>
-          </a:bodyPr>
-          <a:lstStyle/>
-          <a:p>
-            <a:r>
-              <a:rPr lang="en-US" sz="2800" dirty="0"/>
-              <a:t>Create a new folder and initialize a git repository inside it (</a:t>
-            </a:r>
-            <a:r>
-              <a:rPr lang="en-US" sz="2400" dirty="0">
-                <a:latin typeface="Courier New" panose="02070309020205020404" pitchFamily="49" charset="0"/>
-                <a:cs typeface="Courier New" panose="02070309020205020404" pitchFamily="49" charset="0"/>
-              </a:rPr>
-              <a:t>git </a:t>
-            </a:r>
-            <a:r>
-              <a:rPr lang="en-US" sz="2400" dirty="0" err="1">
-                <a:latin typeface="Courier New" panose="02070309020205020404" pitchFamily="49" charset="0"/>
-                <a:cs typeface="Courier New" panose="02070309020205020404" pitchFamily="49" charset="0"/>
-              </a:rPr>
-              <a:t>init</a:t>
-            </a:r>
-            <a:r>
-              <a:rPr lang="en-US" sz="2800" dirty="0"/>
-              <a:t>)</a:t>
-            </a:r>
-          </a:p>
-          <a:p>
-            <a:r>
-              <a:rPr lang="en-US" sz="2800" dirty="0"/>
-              <a:t>Create a file and commit it.</a:t>
-            </a:r>
-          </a:p>
-          <a:p>
-            <a:r>
-              <a:rPr lang="en-US" sz="2800" dirty="0"/>
-              <a:t>Create and check out a new branch (</a:t>
-            </a:r>
-            <a:r>
-              <a:rPr lang="en-US" sz="2400" dirty="0">
-                <a:latin typeface="Courier New" panose="02070309020205020404" pitchFamily="49" charset="0"/>
-                <a:cs typeface="Courier New" panose="02070309020205020404" pitchFamily="49" charset="0"/>
-              </a:rPr>
-              <a:t>git branch &lt;name&gt;; git checkout &lt;name&gt;</a:t>
-            </a:r>
-            <a:r>
-              <a:rPr lang="en-US" sz="2800" dirty="0"/>
-              <a:t>)</a:t>
-            </a:r>
-          </a:p>
-          <a:p>
-            <a:r>
-              <a:rPr lang="en-US" sz="2800" dirty="0"/>
-              <a:t>Create another file and commit it.</a:t>
-            </a:r>
-          </a:p>
-          <a:p>
-            <a:r>
-              <a:rPr lang="en-US" sz="2800" dirty="0"/>
-              <a:t>Check out the master branch and merge your other branch into it (</a:t>
-            </a:r>
-            <a:r>
-              <a:rPr lang="en-US" sz="2400" dirty="0">
-                <a:latin typeface="Courier New" panose="02070309020205020404" pitchFamily="49" charset="0"/>
-                <a:cs typeface="Courier New" panose="02070309020205020404" pitchFamily="49" charset="0"/>
-              </a:rPr>
-              <a:t>git merge &lt;name&gt;</a:t>
-            </a:r>
-            <a:r>
-              <a:rPr lang="en-US" sz="2800" dirty="0"/>
-              <a:t>)</a:t>
-            </a:r>
-          </a:p>
-          <a:p>
-            <a:r>
-              <a:rPr lang="en-US" sz="2800" dirty="0"/>
-              <a:t>View commit history (</a:t>
-            </a:r>
-            <a:r>
-              <a:rPr lang="en-US" sz="2400" dirty="0">
-                <a:latin typeface="Courier New" panose="02070309020205020404" pitchFamily="49" charset="0"/>
-                <a:cs typeface="Courier New" panose="02070309020205020404" pitchFamily="49" charset="0"/>
-              </a:rPr>
-              <a:t>git log --</a:t>
-            </a:r>
-            <a:r>
-              <a:rPr lang="en-US" sz="2400" dirty="0" err="1">
-                <a:latin typeface="Courier New" panose="02070309020205020404" pitchFamily="49" charset="0"/>
-                <a:cs typeface="Courier New" panose="02070309020205020404" pitchFamily="49" charset="0"/>
-              </a:rPr>
-              <a:t>oneline</a:t>
-            </a:r>
-            <a:r>
-              <a:rPr lang="en-US" sz="2800" dirty="0"/>
-              <a:t>)</a:t>
-            </a:r>
-          </a:p>
-          <a:p>
-            <a:endParaRPr lang="en-US" sz="2800" dirty="0"/>
-          </a:p>
-        </p:txBody>
-      </p:sp>
-      <p:sp>
-        <p:nvSpPr>
-          <p:cNvPr id="4" name="Slide Number Placeholder 3">
-            <a:extLst>
-              <a:ext uri="{FF2B5EF4-FFF2-40B4-BE49-F238E27FC236}">
-                <a16:creationId xmlns:a16="http://schemas.microsoft.com/office/drawing/2014/main" id="{7A4FE1F8-6E58-4B5B-AF4B-87DC156DC10B}"/>
-              </a:ext>
-            </a:extLst>
-          </p:cNvPr>
-          <p:cNvSpPr>
-            <a:spLocks noGrp="1"/>
-          </p:cNvSpPr>
-          <p:nvPr>
-            <p:ph type="sldNum" sz="quarter" idx="12"/>
-          </p:nvPr>
-        </p:nvSpPr>
-        <p:spPr/>
-        <p:txBody>
-          <a:bodyPr/>
-          <a:lstStyle/>
-          <a:p>
-            <a:fld id="{106E12CD-FCB1-464E-A775-0B83FDDACE03}" type="slidenum">
-              <a:rPr lang="en-US" smtClean="0"/>
-              <a:pPr/>
-              <a:t>3</a:t>
-            </a:fld>
-            <a:endParaRPr lang="en-US"/>
+              <a:t>Branching Example</a:t>
+            </a:r>
           </a:p>
         </p:txBody>
       </p:sp>
     </p:spTree>
     <p:extLst>
       <p:ext uri="{BB962C8B-B14F-4D97-AF65-F5344CB8AC3E}">
-        <p14:creationId xmlns:p14="http://schemas.microsoft.com/office/powerpoint/2010/main" val="125442498"/>
+        <p14:creationId xmlns:p14="http://schemas.microsoft.com/office/powerpoint/2010/main" val="2342043198"/>
       </p:ext>
     </p:extLst>
   </p:cSld>
@@ -6225,7 +6424,7 @@
           <a:p>
             <a:r>
               <a:rPr lang="en-US" dirty="0"/>
-              <a:t>Exercise 2: Merge Conflicts</a:t>
+              <a:t>Exercise 1: Branching</a:t>
             </a:r>
           </a:p>
         </p:txBody>
@@ -6246,84 +6445,86 @@
             <p:ph idx="1"/>
           </p:nvPr>
         </p:nvSpPr>
-        <p:spPr>
-          <a:xfrm>
-            <a:off x="457200" y="1292974"/>
-            <a:ext cx="8229600" cy="4833190"/>
-          </a:xfrm>
-        </p:spPr>
+        <p:spPr/>
         <p:txBody>
           <a:bodyPr>
-            <a:normAutofit lnSpcReduction="10000"/>
+            <a:normAutofit/>
           </a:bodyPr>
           <a:lstStyle/>
           <a:p>
             <a:r>
               <a:rPr lang="en-US" sz="2800" dirty="0"/>
-              <a:t>Create and check out a new branch called </a:t>
+              <a:t>Create a new folder and initialize a git repository inside it (</a:t>
             </a:r>
             <a:r>
               <a:rPr lang="en-US" sz="2400" dirty="0">
                 <a:latin typeface="Courier New" panose="02070309020205020404" pitchFamily="49" charset="0"/>
                 <a:cs typeface="Courier New" panose="02070309020205020404" pitchFamily="49" charset="0"/>
               </a:rPr>
-              <a:t>conflict</a:t>
-            </a:r>
-            <a:r>
-              <a:rPr lang="en-US" sz="2400" dirty="0"/>
-              <a:t>.</a:t>
-            </a:r>
-          </a:p>
-          <a:p>
+              <a:t>git </a:t>
+            </a:r>
+            <a:r>
+              <a:rPr lang="en-US" sz="2400" dirty="0" err="1">
+                <a:latin typeface="Courier New" panose="02070309020205020404" pitchFamily="49" charset="0"/>
+                <a:cs typeface="Courier New" panose="02070309020205020404" pitchFamily="49" charset="0"/>
+              </a:rPr>
+              <a:t>init</a:t>
+            </a:r>
             <a:r>
               <a:rPr lang="en-US" sz="2800" dirty="0"/>
-              <a:t>Add 4 lines of text to one of your files and commit.</a:t>
+              <a:t>)</a:t>
             </a:r>
           </a:p>
           <a:p>
             <a:r>
               <a:rPr lang="en-US" sz="2800" dirty="0"/>
-              <a:t>Check out the </a:t>
+              <a:t>Create a file and commit it.</a:t>
+            </a:r>
+          </a:p>
+          <a:p>
+            <a:r>
+              <a:rPr lang="en-US" sz="2800" dirty="0"/>
+              <a:t>Create and check out a new branch (</a:t>
             </a:r>
             <a:r>
               <a:rPr lang="en-US" sz="2400" dirty="0">
                 <a:latin typeface="Courier New" panose="02070309020205020404" pitchFamily="49" charset="0"/>
                 <a:cs typeface="Courier New" panose="02070309020205020404" pitchFamily="49" charset="0"/>
               </a:rPr>
-              <a:t>master</a:t>
+              <a:t>git branch &lt;name&gt;; git checkout &lt;name&gt;</a:t>
             </a:r>
             <a:r>
               <a:rPr lang="en-US" sz="2800" dirty="0"/>
-              <a:t> branch, edit the same file, add 4 different lines of text and commit.</a:t>
+              <a:t>)</a:t>
             </a:r>
           </a:p>
           <a:p>
             <a:r>
               <a:rPr lang="en-US" sz="2800" dirty="0"/>
-              <a:t>Try to merge the </a:t>
+              <a:t>Create another file and commit it.</a:t>
+            </a:r>
+          </a:p>
+          <a:p>
+            <a:r>
+              <a:rPr lang="en-US" sz="2800" dirty="0"/>
+              <a:t>Check out the master branch and merge your other branch into it (</a:t>
             </a:r>
             <a:r>
               <a:rPr lang="en-US" sz="2400" dirty="0">
                 <a:latin typeface="Courier New" panose="02070309020205020404" pitchFamily="49" charset="0"/>
                 <a:cs typeface="Courier New" panose="02070309020205020404" pitchFamily="49" charset="0"/>
               </a:rPr>
-              <a:t>conflict</a:t>
+              <a:t>git merge &lt;name&gt;</a:t>
             </a:r>
             <a:r>
               <a:rPr lang="en-US" sz="2800" dirty="0"/>
-              <a:t> branch.</a:t>
+              <a:t>)</a:t>
             </a:r>
           </a:p>
           <a:p>
             <a:r>
               <a:rPr lang="en-US" sz="2800" dirty="0"/>
-              <a:t>Work out the merge conflict and commit.</a:t>
-            </a:r>
-          </a:p>
-          <a:p>
-            <a:r>
-              <a:rPr lang="en-US" sz="2800" dirty="0"/>
-              <a:t>View commit log (</a:t>
+              <a:t>View commit history (</a:t>
             </a:r>
             <a:r>
               <a:rPr lang="en-US" sz="2400" dirty="0">
@@ -6340,27 +6541,8 @@
               <a:t>oneline</a:t>
             </a:r>
             <a:r>
-              <a:rPr lang="en-US" sz="2400" dirty="0">
-                <a:latin typeface="Courier New" panose="02070309020205020404" pitchFamily="49" charset="0"/>
-                <a:cs typeface="Courier New" panose="02070309020205020404" pitchFamily="49" charset="0"/>
-              </a:rPr>
-              <a:t> --graph</a:t>
-            </a:r>
-            <a:r>
               <a:rPr lang="en-US" sz="2800" dirty="0"/>
               <a:t>)</a:t>
-            </a:r>
-          </a:p>
-          <a:p>
-            <a:r>
-              <a:rPr lang="en-US" sz="2800" dirty="0"/>
-              <a:t>How many parent commits does each commit have?</a:t>
-            </a:r>
-          </a:p>
-          <a:p>
-            <a:r>
-              <a:rPr lang="en-US" sz="2800" dirty="0"/>
-              <a:t>Delete conflict branch and view log again. What changed?</a:t>
             </a:r>
           </a:p>
           <a:p>
@@ -6401,7 +6583,7 @@
     </p:spTree>
     <p:extLst>
       <p:ext uri="{BB962C8B-B14F-4D97-AF65-F5344CB8AC3E}">
-        <p14:creationId xmlns:p14="http://schemas.microsoft.com/office/powerpoint/2010/main" val="2721231183"/>
+        <p14:creationId xmlns:p14="http://schemas.microsoft.com/office/powerpoint/2010/main" val="125442498"/>
       </p:ext>
     </p:extLst>
   </p:cSld>
@@ -6433,6 +6615,232 @@
           <p:cNvPr id="2" name="Title 1">
             <a:extLst>
               <a:ext uri="{FF2B5EF4-FFF2-40B4-BE49-F238E27FC236}">
+                <a16:creationId xmlns:a16="http://schemas.microsoft.com/office/drawing/2014/main" id="{C84527BE-33CE-45AD-A9D1-AC3F293BAD21}"/>
+              </a:ext>
+            </a:extLst>
+          </p:cNvPr>
+          <p:cNvSpPr>
+            <a:spLocks noGrp="1"/>
+          </p:cNvSpPr>
+          <p:nvPr>
+            <p:ph type="title"/>
+          </p:nvPr>
+        </p:nvSpPr>
+        <p:spPr/>
+        <p:txBody>
+          <a:bodyPr/>
+          <a:lstStyle/>
+          <a:p>
+            <a:r>
+              <a:rPr lang="en-US" dirty="0"/>
+              <a:t>Exercise 2: Merge Conflicts</a:t>
+            </a:r>
+          </a:p>
+        </p:txBody>
+      </p:sp>
+      <p:sp>
+        <p:nvSpPr>
+          <p:cNvPr id="3" name="Content Placeholder 2">
+            <a:extLst>
+              <a:ext uri="{FF2B5EF4-FFF2-40B4-BE49-F238E27FC236}">
+                <a16:creationId xmlns:a16="http://schemas.microsoft.com/office/drawing/2014/main" id="{662F4B0B-B133-43A5-98CF-6ED5A64071E5}"/>
+              </a:ext>
+            </a:extLst>
+          </p:cNvPr>
+          <p:cNvSpPr>
+            <a:spLocks noGrp="1"/>
+          </p:cNvSpPr>
+          <p:nvPr>
+            <p:ph idx="1"/>
+          </p:nvPr>
+        </p:nvSpPr>
+        <p:spPr>
+          <a:xfrm>
+            <a:off x="457200" y="1292974"/>
+            <a:ext cx="8229600" cy="4833190"/>
+          </a:xfrm>
+        </p:spPr>
+        <p:txBody>
+          <a:bodyPr>
+            <a:normAutofit lnSpcReduction="10000"/>
+          </a:bodyPr>
+          <a:lstStyle/>
+          <a:p>
+            <a:r>
+              <a:rPr lang="en-US" sz="2800" dirty="0"/>
+              <a:t>Create and check out a new branch called </a:t>
+            </a:r>
+            <a:r>
+              <a:rPr lang="en-US" sz="2400" dirty="0">
+                <a:latin typeface="Courier New" panose="02070309020205020404" pitchFamily="49" charset="0"/>
+                <a:cs typeface="Courier New" panose="02070309020205020404" pitchFamily="49" charset="0"/>
+              </a:rPr>
+              <a:t>conflict</a:t>
+            </a:r>
+            <a:r>
+              <a:rPr lang="en-US" sz="2400" dirty="0"/>
+              <a:t>.</a:t>
+            </a:r>
+          </a:p>
+          <a:p>
+            <a:r>
+              <a:rPr lang="en-US" sz="2800" dirty="0"/>
+              <a:t>Add 4 lines of text to one of your files and commit.</a:t>
+            </a:r>
+          </a:p>
+          <a:p>
+            <a:r>
+              <a:rPr lang="en-US" sz="2800" dirty="0"/>
+              <a:t>Check out the </a:t>
+            </a:r>
+            <a:r>
+              <a:rPr lang="en-US" sz="2400" dirty="0">
+                <a:latin typeface="Courier New" panose="02070309020205020404" pitchFamily="49" charset="0"/>
+                <a:cs typeface="Courier New" panose="02070309020205020404" pitchFamily="49" charset="0"/>
+              </a:rPr>
+              <a:t>master</a:t>
+            </a:r>
+            <a:r>
+              <a:rPr lang="en-US" sz="2800" dirty="0"/>
+              <a:t> branch, edit the same file, add 4 different lines of text and commit.</a:t>
+            </a:r>
+          </a:p>
+          <a:p>
+            <a:r>
+              <a:rPr lang="en-US" sz="2800" dirty="0"/>
+              <a:t>Try to merge the </a:t>
+            </a:r>
+            <a:r>
+              <a:rPr lang="en-US" sz="2400" dirty="0">
+                <a:latin typeface="Courier New" panose="02070309020205020404" pitchFamily="49" charset="0"/>
+                <a:cs typeface="Courier New" panose="02070309020205020404" pitchFamily="49" charset="0"/>
+              </a:rPr>
+              <a:t>conflict</a:t>
+            </a:r>
+            <a:r>
+              <a:rPr lang="en-US" sz="2800" dirty="0"/>
+              <a:t> branch.</a:t>
+            </a:r>
+          </a:p>
+          <a:p>
+            <a:r>
+              <a:rPr lang="en-US" sz="2800" dirty="0"/>
+              <a:t>Work out the merge conflict and commit.</a:t>
+            </a:r>
+          </a:p>
+          <a:p>
+            <a:r>
+              <a:rPr lang="en-US" sz="2800" dirty="0"/>
+              <a:t>View commit log (</a:t>
+            </a:r>
+            <a:r>
+              <a:rPr lang="en-US" sz="2400" dirty="0">
+                <a:latin typeface="Courier New" panose="02070309020205020404" pitchFamily="49" charset="0"/>
+                <a:cs typeface="Courier New" panose="02070309020205020404" pitchFamily="49" charset="0"/>
+              </a:rPr>
+              <a:t>git log --</a:t>
+            </a:r>
+            <a:r>
+              <a:rPr lang="en-US" sz="2400" dirty="0" err="1">
+                <a:latin typeface="Courier New" panose="02070309020205020404" pitchFamily="49" charset="0"/>
+                <a:cs typeface="Courier New" panose="02070309020205020404" pitchFamily="49" charset="0"/>
+              </a:rPr>
+              <a:t>oneline</a:t>
+            </a:r>
+            <a:r>
+              <a:rPr lang="en-US" sz="2400" dirty="0">
+                <a:latin typeface="Courier New" panose="02070309020205020404" pitchFamily="49" charset="0"/>
+                <a:cs typeface="Courier New" panose="02070309020205020404" pitchFamily="49" charset="0"/>
+              </a:rPr>
+              <a:t> --graph</a:t>
+            </a:r>
+            <a:r>
+              <a:rPr lang="en-US" sz="2800" dirty="0"/>
+              <a:t>)</a:t>
+            </a:r>
+          </a:p>
+          <a:p>
+            <a:r>
+              <a:rPr lang="en-US" sz="2800" dirty="0"/>
+              <a:t>How many parent commits does each commit have?</a:t>
+            </a:r>
+          </a:p>
+          <a:p>
+            <a:r>
+              <a:rPr lang="en-US" sz="2800" dirty="0"/>
+              <a:t>Delete conflict branch and view log again. What changed?</a:t>
+            </a:r>
+          </a:p>
+          <a:p>
+            <a:endParaRPr lang="en-US" sz="2800" dirty="0"/>
+          </a:p>
+        </p:txBody>
+      </p:sp>
+      <p:sp>
+        <p:nvSpPr>
+          <p:cNvPr id="4" name="Slide Number Placeholder 3">
+            <a:extLst>
+              <a:ext uri="{FF2B5EF4-FFF2-40B4-BE49-F238E27FC236}">
+                <a16:creationId xmlns:a16="http://schemas.microsoft.com/office/drawing/2014/main" id="{7A4FE1F8-6E58-4B5B-AF4B-87DC156DC10B}"/>
+              </a:ext>
+            </a:extLst>
+          </p:cNvPr>
+          <p:cNvSpPr>
+            <a:spLocks noGrp="1"/>
+          </p:cNvSpPr>
+          <p:nvPr>
+            <p:ph type="sldNum" sz="quarter" idx="12"/>
+          </p:nvPr>
+        </p:nvSpPr>
+        <p:spPr/>
+        <p:txBody>
+          <a:bodyPr/>
+          <a:lstStyle/>
+          <a:p>
+            <a:fld id="{106E12CD-FCB1-464E-A775-0B83FDDACE03}" type="slidenum">
+              <a:rPr lang="en-US" smtClean="0"/>
+              <a:pPr/>
+              <a:t>5</a:t>
+            </a:fld>
+            <a:endParaRPr lang="en-US"/>
+          </a:p>
+        </p:txBody>
+      </p:sp>
+    </p:spTree>
+    <p:extLst>
+      <p:ext uri="{BB962C8B-B14F-4D97-AF65-F5344CB8AC3E}">
+        <p14:creationId xmlns:p14="http://schemas.microsoft.com/office/powerpoint/2010/main" val="2721231183"/>
+      </p:ext>
+    </p:extLst>
+  </p:cSld>
+  <p:clrMapOvr>
+    <a:masterClrMapping/>
+  </p:clrMapOvr>
+</p:sld>
+</file>
+
+<file path=ppt/slides/slide7.xml><?xml version="1.0" encoding="utf-8"?>
+<p:sld xmlns:a="http://schemas.openxmlformats.org/drawingml/2006/main" xmlns:r="http://schemas.openxmlformats.org/officeDocument/2006/relationships" xmlns:p="http://schemas.openxmlformats.org/presentationml/2006/main">
+  <p:cSld>
+    <p:spTree>
+      <p:nvGrpSpPr>
+        <p:cNvPr id="1" name=""/>
+        <p:cNvGrpSpPr/>
+        <p:nvPr/>
+      </p:nvGrpSpPr>
+      <p:grpSpPr>
+        <a:xfrm>
+          <a:off x="0" y="0"/>
+          <a:ext cx="0" cy="0"/>
+          <a:chOff x="0" y="0"/>
+          <a:chExt cx="0" cy="0"/>
+        </a:xfrm>
+      </p:grpSpPr>
+      <p:sp>
+        <p:nvSpPr>
+          <p:cNvPr id="2" name="Title 1">
+            <a:extLst>
+              <a:ext uri="{FF2B5EF4-FFF2-40B4-BE49-F238E27FC236}">
                 <a16:creationId xmlns:a16="http://schemas.microsoft.com/office/drawing/2014/main" id="{9E45623A-85A0-49BE-817D-F302D4596DB6}"/>
               </a:ext>
             </a:extLst>
@@ -6544,7 +6952,7 @@
             <a:fld id="{106E12CD-FCB1-464E-A775-0B83FDDACE03}" type="slidenum">
               <a:rPr lang="en-US" smtClean="0"/>
               <a:pPr/>
-              <a:t>5</a:t>
+              <a:t>6</a:t>
             </a:fld>
             <a:endParaRPr lang="en-US"/>
           </a:p>
@@ -6743,270 +7151,6 @@
 </p:sld>
 </file>
 
-<file path=ppt/slides/slide7.xml><?xml version="1.0" encoding="utf-8"?>
-<p:sld xmlns:a="http://schemas.openxmlformats.org/drawingml/2006/main" xmlns:r="http://schemas.openxmlformats.org/officeDocument/2006/relationships" xmlns:p="http://schemas.openxmlformats.org/presentationml/2006/main">
-  <p:cSld>
-    <p:spTree>
-      <p:nvGrpSpPr>
-        <p:cNvPr id="1" name=""/>
-        <p:cNvGrpSpPr/>
-        <p:nvPr/>
-      </p:nvGrpSpPr>
-      <p:grpSpPr>
-        <a:xfrm>
-          <a:off x="0" y="0"/>
-          <a:ext cx="0" cy="0"/>
-          <a:chOff x="0" y="0"/>
-          <a:chExt cx="0" cy="0"/>
-        </a:xfrm>
-      </p:grpSpPr>
-      <p:sp>
-        <p:nvSpPr>
-          <p:cNvPr id="2" name="Title 1">
-            <a:extLst>
-              <a:ext uri="{FF2B5EF4-FFF2-40B4-BE49-F238E27FC236}">
-                <a16:creationId xmlns:a16="http://schemas.microsoft.com/office/drawing/2014/main" id="{9707FE84-4F2B-4477-B350-8707EF4C0F73}"/>
-              </a:ext>
-            </a:extLst>
-          </p:cNvPr>
-          <p:cNvSpPr>
-            <a:spLocks noGrp="1"/>
-          </p:cNvSpPr>
-          <p:nvPr>
-            <p:ph type="title"/>
-          </p:nvPr>
-        </p:nvSpPr>
-        <p:spPr/>
-        <p:txBody>
-          <a:bodyPr/>
-          <a:lstStyle/>
-          <a:p>
-            <a:r>
-              <a:rPr lang="en-US" dirty="0"/>
-              <a:t>Remotes</a:t>
-            </a:r>
-          </a:p>
-        </p:txBody>
-      </p:sp>
-      <p:sp>
-        <p:nvSpPr>
-          <p:cNvPr id="3" name="Content Placeholder 2">
-            <a:extLst>
-              <a:ext uri="{FF2B5EF4-FFF2-40B4-BE49-F238E27FC236}">
-                <a16:creationId xmlns:a16="http://schemas.microsoft.com/office/drawing/2014/main" id="{A97684BD-312E-488E-9F4A-E1D75149EF2D}"/>
-              </a:ext>
-            </a:extLst>
-          </p:cNvPr>
-          <p:cNvSpPr>
-            <a:spLocks noGrp="1"/>
-          </p:cNvSpPr>
-          <p:nvPr>
-            <p:ph idx="1"/>
-          </p:nvPr>
-        </p:nvSpPr>
-        <p:spPr/>
-        <p:txBody>
-          <a:bodyPr/>
-          <a:lstStyle/>
-          <a:p>
-            <a:r>
-              <a:rPr lang="en-US" dirty="0"/>
-              <a:t>A “remote” is a reference to another git repository.</a:t>
-            </a:r>
-          </a:p>
-          <a:p>
-            <a:r>
-              <a:rPr lang="en-US" dirty="0"/>
-              <a:t>When a repository is cloned, a remote named </a:t>
-            </a:r>
-            <a:r>
-              <a:rPr lang="en-US" sz="2800" dirty="0">
-                <a:latin typeface="Courier New" panose="02070309020205020404" pitchFamily="49" charset="0"/>
-                <a:cs typeface="Courier New" panose="02070309020205020404" pitchFamily="49" charset="0"/>
-              </a:rPr>
-              <a:t>origin</a:t>
-            </a:r>
-            <a:r>
-              <a:rPr lang="en-US" dirty="0"/>
-              <a:t> is created by default.</a:t>
-            </a:r>
-          </a:p>
-        </p:txBody>
-      </p:sp>
-      <p:sp>
-        <p:nvSpPr>
-          <p:cNvPr id="4" name="Slide Number Placeholder 3">
-            <a:extLst>
-              <a:ext uri="{FF2B5EF4-FFF2-40B4-BE49-F238E27FC236}">
-                <a16:creationId xmlns:a16="http://schemas.microsoft.com/office/drawing/2014/main" id="{AF765A00-50C5-4EC9-BB04-83EBCFFFF9CC}"/>
-              </a:ext>
-            </a:extLst>
-          </p:cNvPr>
-          <p:cNvSpPr>
-            <a:spLocks noGrp="1"/>
-          </p:cNvSpPr>
-          <p:nvPr>
-            <p:ph type="sldNum" sz="quarter" idx="12"/>
-          </p:nvPr>
-        </p:nvSpPr>
-        <p:spPr/>
-        <p:txBody>
-          <a:bodyPr/>
-          <a:lstStyle/>
-          <a:p>
-            <a:fld id="{106E12CD-FCB1-464E-A775-0B83FDDACE03}" type="slidenum">
-              <a:rPr lang="en-US" smtClean="0"/>
-              <a:pPr/>
-              <a:t>6</a:t>
-            </a:fld>
-            <a:endParaRPr lang="en-US"/>
-          </a:p>
-        </p:txBody>
-      </p:sp>
-    </p:spTree>
-    <p:extLst>
-      <p:ext uri="{BB962C8B-B14F-4D97-AF65-F5344CB8AC3E}">
-        <p14:creationId xmlns:p14="http://schemas.microsoft.com/office/powerpoint/2010/main" val="4276611867"/>
-      </p:ext>
-    </p:extLst>
-  </p:cSld>
-  <p:clrMapOvr>
-    <a:masterClrMapping/>
-  </p:clrMapOvr>
-  <p:timing>
-    <p:tnLst>
-      <p:par>
-        <p:cTn id="1" dur="indefinite" restart="never" nodeType="tmRoot">
-          <p:childTnLst>
-            <p:seq concurrent="1" nextAc="seek">
-              <p:cTn id="2" dur="indefinite" nodeType="mainSeq">
-                <p:childTnLst>
-                  <p:par>
-                    <p:cTn id="3" fill="hold">
-                      <p:stCondLst>
-                        <p:cond delay="indefinite"/>
-                      </p:stCondLst>
-                      <p:childTnLst>
-                        <p:par>
-                          <p:cTn id="4" fill="hold">
-                            <p:stCondLst>
-                              <p:cond delay="0"/>
-                            </p:stCondLst>
-                            <p:childTnLst>
-                              <p:par>
-                                <p:cTn id="5" presetID="1" presetClass="entr" presetSubtype="0" fill="hold" grpId="0" nodeType="clickEffect">
-                                  <p:stCondLst>
-                                    <p:cond delay="0"/>
-                                  </p:stCondLst>
-                                  <p:childTnLst>
-                                    <p:set>
-                                      <p:cBhvr>
-                                        <p:cTn id="6" dur="1" fill="hold">
-                                          <p:stCondLst>
-                                            <p:cond delay="0"/>
-                                          </p:stCondLst>
-                                        </p:cTn>
-                                        <p:tgtEl>
-                                          <p:spTgt spid="3">
-                                            <p:txEl>
-                                              <p:pRg st="0" end="0"/>
-                                            </p:txEl>
-                                          </p:spTgt>
-                                        </p:tgtEl>
-                                        <p:attrNameLst>
-                                          <p:attrName>style.visibility</p:attrName>
-                                        </p:attrNameLst>
-                                      </p:cBhvr>
-                                      <p:to>
-                                        <p:strVal val="visible"/>
-                                      </p:to>
-                                    </p:set>
-                                  </p:childTnLst>
-                                </p:cTn>
-                              </p:par>
-                            </p:childTnLst>
-                          </p:cTn>
-                        </p:par>
-                      </p:childTnLst>
-                    </p:cTn>
-                  </p:par>
-                  <p:par>
-                    <p:cTn id="7" fill="hold">
-                      <p:stCondLst>
-                        <p:cond delay="indefinite"/>
-                      </p:stCondLst>
-                      <p:childTnLst>
-                        <p:par>
-                          <p:cTn id="8" fill="hold">
-                            <p:stCondLst>
-                              <p:cond delay="0"/>
-                            </p:stCondLst>
-                            <p:childTnLst>
-                              <p:par>
-                                <p:cTn id="9" presetID="1" presetClass="entr" presetSubtype="0" fill="hold" grpId="0" nodeType="clickEffect">
-                                  <p:stCondLst>
-                                    <p:cond delay="0"/>
-                                  </p:stCondLst>
-                                  <p:childTnLst>
-                                    <p:set>
-                                      <p:cBhvr>
-                                        <p:cTn id="10" dur="1" fill="hold">
-                                          <p:stCondLst>
-                                            <p:cond delay="0"/>
-                                          </p:stCondLst>
-                                        </p:cTn>
-                                        <p:tgtEl>
-                                          <p:spTgt spid="3">
-                                            <p:txEl>
-                                              <p:pRg st="1" end="1"/>
-                                            </p:txEl>
-                                          </p:spTgt>
-                                        </p:tgtEl>
-                                        <p:attrNameLst>
-                                          <p:attrName>style.visibility</p:attrName>
-                                        </p:attrNameLst>
-                                      </p:cBhvr>
-                                      <p:to>
-                                        <p:strVal val="visible"/>
-                                      </p:to>
-                                    </p:set>
-                                  </p:childTnLst>
-                                </p:cTn>
-                              </p:par>
-                            </p:childTnLst>
-                          </p:cTn>
-                        </p:par>
-                      </p:childTnLst>
-                    </p:cTn>
-                  </p:par>
-                </p:childTnLst>
-              </p:cTn>
-              <p:prevCondLst>
-                <p:cond evt="onPrev" delay="0">
-                  <p:tgtEl>
-                    <p:sldTgt/>
-                  </p:tgtEl>
-                </p:cond>
-              </p:prevCondLst>
-              <p:nextCondLst>
-                <p:cond evt="onNext" delay="0">
-                  <p:tgtEl>
-                    <p:sldTgt/>
-                  </p:tgtEl>
-                </p:cond>
-              </p:nextCondLst>
-            </p:seq>
-          </p:childTnLst>
-        </p:cTn>
-      </p:par>
-    </p:tnLst>
-    <p:bldLst>
-      <p:bldP spid="3" grpId="0" build="p"/>
-    </p:bldLst>
-  </p:timing>
-</p:sld>
-</file>
-
 <file path=ppt/slides/slide8.xml><?xml version="1.0" encoding="utf-8"?>
 <p:sld xmlns:a="http://schemas.openxmlformats.org/drawingml/2006/main" xmlns:r="http://schemas.openxmlformats.org/officeDocument/2006/relationships" xmlns:p="http://schemas.openxmlformats.org/presentationml/2006/main">
   <p:cSld>
@@ -7075,29 +7219,24 @@
           <a:p>
             <a:r>
               <a:rPr lang="en-US" dirty="0"/>
-              <a:t>“Tracking branches” are references to the state of branches on a remote and are managed for you. E.g. </a:t>
+              <a:t>A “remote” is a reference to another git repository.</a:t>
+            </a:r>
+          </a:p>
+          <a:p>
+            <a:r>
+              <a:rPr lang="en-US" dirty="0"/>
+              <a:t>When a repository is cloned, a remote named </a:t>
             </a:r>
             <a:r>
               <a:rPr lang="en-US" sz="2800" dirty="0">
                 <a:latin typeface="Courier New" panose="02070309020205020404" pitchFamily="49" charset="0"/>
                 <a:cs typeface="Courier New" panose="02070309020205020404" pitchFamily="49" charset="0"/>
               </a:rPr>
-              <a:t>origin/master</a:t>
-            </a:r>
-          </a:p>
-          <a:p>
-            <a:r>
-              <a:rPr lang="en-US" sz="2800" dirty="0">
-                <a:latin typeface="Courier New" panose="02070309020205020404" pitchFamily="49" charset="0"/>
-                <a:cs typeface="Courier New" panose="02070309020205020404" pitchFamily="49" charset="0"/>
-              </a:rPr>
-              <a:t>git fetch &lt;remote&gt;</a:t>
-            </a:r>
-            <a:r>
-              <a:rPr lang="en-US" dirty="0">
-                <a:cs typeface="Courier New" panose="02070309020205020404" pitchFamily="49" charset="0"/>
-              </a:rPr>
-              <a:t> gets updates from the remote repository.</a:t>
+              <a:t>origin</a:t>
+            </a:r>
+            <a:r>
+              <a:rPr lang="en-US" dirty="0"/>
+              <a:t> is created by default.</a:t>
             </a:r>
           </a:p>
         </p:txBody>
@@ -7135,7 +7274,7 @@
     </p:spTree>
     <p:extLst>
       <p:ext uri="{BB962C8B-B14F-4D97-AF65-F5344CB8AC3E}">
-        <p14:creationId xmlns:p14="http://schemas.microsoft.com/office/powerpoint/2010/main" val="3716946761"/>
+        <p14:creationId xmlns:p14="http://schemas.microsoft.com/office/powerpoint/2010/main" val="4276611867"/>
       </p:ext>
     </p:extLst>
   </p:cSld>
@@ -7344,49 +7483,29 @@
           <a:p>
             <a:r>
               <a:rPr lang="en-US" dirty="0"/>
-              <a:t>Commits from a remote are not merged in automatically!</a:t>
-            </a:r>
-          </a:p>
-          <a:p>
-            <a:r>
-              <a:rPr lang="en-US" dirty="0">
-                <a:cs typeface="Courier New" panose="02070309020205020404" pitchFamily="49" charset="0"/>
-              </a:rPr>
-              <a:t>You still need to merge them into your local branches with </a:t>
+              <a:t>“Tracking branches” are references to the state of branches on a remote and are managed for you. E.g. </a:t>
             </a:r>
             <a:r>
               <a:rPr lang="en-US" sz="2800" dirty="0">
                 <a:latin typeface="Courier New" panose="02070309020205020404" pitchFamily="49" charset="0"/>
                 <a:cs typeface="Courier New" panose="02070309020205020404" pitchFamily="49" charset="0"/>
               </a:rPr>
-              <a:t>git merge</a:t>
-            </a:r>
-            <a:r>
-              <a:rPr lang="en-US" dirty="0">
-                <a:cs typeface="Courier New" panose="02070309020205020404" pitchFamily="49" charset="0"/>
-              </a:rPr>
-              <a:t>.</a:t>
-            </a:r>
-          </a:p>
-          <a:p>
-            <a:r>
-              <a:rPr lang="en-US" dirty="0">
-                <a:cs typeface="Courier New" panose="02070309020205020404" pitchFamily="49" charset="0"/>
-              </a:rPr>
-              <a:t>(or use </a:t>
-            </a:r>
+              <a:t>origin/master</a:t>
+            </a:r>
+          </a:p>
+          <a:p>
             <a:r>
               <a:rPr lang="en-US" sz="2800" dirty="0">
                 <a:latin typeface="Courier New" panose="02070309020205020404" pitchFamily="49" charset="0"/>
                 <a:cs typeface="Courier New" panose="02070309020205020404" pitchFamily="49" charset="0"/>
               </a:rPr>
-              <a:t>git pull</a:t>
+              <a:t>git fetch &lt;remote&gt;</a:t>
             </a:r>
             <a:r>
               <a:rPr lang="en-US" dirty="0">
                 <a:cs typeface="Courier New" panose="02070309020205020404" pitchFamily="49" charset="0"/>
               </a:rPr>
-              <a:t> which does fetch + merge)</a:t>
+              <a:t> gets updates from the remote repository.</a:t>
             </a:r>
           </a:p>
         </p:txBody>
@@ -7424,7 +7543,7 @@
     </p:spTree>
     <p:extLst>
       <p:ext uri="{BB962C8B-B14F-4D97-AF65-F5344CB8AC3E}">
-        <p14:creationId xmlns:p14="http://schemas.microsoft.com/office/powerpoint/2010/main" val="327696006"/>
+        <p14:creationId xmlns:p14="http://schemas.microsoft.com/office/powerpoint/2010/main" val="3716946761"/>
       </p:ext>
     </p:extLst>
   </p:cSld>
@@ -7517,55 +7636,6 @@
                                           <p:spTgt spid="3">
                                             <p:txEl>
                                               <p:pRg st="1" end="1"/>
-                                            </p:txEl>
-                                          </p:spTgt>
-                                        </p:tgtEl>
-                                        <p:attrNameLst>
-                                          <p:attrName>style.visibility</p:attrName>
-                                        </p:attrNameLst>
-                                      </p:cBhvr>
-                                      <p:to>
-                                        <p:strVal val="visible"/>
-                                      </p:to>
-                                    </p:set>
-                                  </p:childTnLst>
-                                </p:cTn>
-                              </p:par>
-                            </p:childTnLst>
-                          </p:cTn>
-                        </p:par>
-                      </p:childTnLst>
-                    </p:cTn>
-                  </p:par>
-                  <p:par>
-                    <p:cTn id="11" fill="hold">
-                      <p:stCondLst>
-                        <p:cond delay="indefinite"/>
-                      </p:stCondLst>
-                      <p:childTnLst>
-                        <p:par>
-                          <p:cTn id="12" fill="hold">
-                            <p:stCondLst>
-                              <p:cond delay="0"/>
-                            </p:stCondLst>
-                            <p:childTnLst>
-                              <p:par>
-                                <p:cTn id="13" presetID="1" presetClass="entr" presetSubtype="0" fill="hold" grpId="0" nodeType="clickEffect">
-                                  <p:stCondLst>
-                                    <p:cond delay="0"/>
-                                  </p:stCondLst>
-                                  <p:childTnLst>
-                                    <p:set>
-                                      <p:cBhvr>
-                                        <p:cTn id="14" dur="1" fill="hold">
-                                          <p:stCondLst>
-                                            <p:cond delay="0"/>
-                                          </p:stCondLst>
-                                        </p:cTn>
-                                        <p:tgtEl>
-                                          <p:spTgt spid="3">
-                                            <p:txEl>
-                                              <p:pRg st="2" end="2"/>
                                             </p:txEl>
                                           </p:spTgt>
                                         </p:tgtEl>

</xml_diff>